<commit_message>
presentation preperaation is ongoing
</commit_message>
<xml_diff>
--- a/docs/crash_investigations.pptx
+++ b/docs/crash_investigations.pptx
@@ -5,18 +5,14 @@
     <p:sldMasterId id="2147483660" r:id="rId1"/>
   </p:sldMasterIdLst>
   <p:notesMasterIdLst>
-    <p:notesMasterId r:id="rId11"/>
+    <p:notesMasterId r:id="rId7"/>
   </p:notesMasterIdLst>
   <p:sldIdLst>
     <p:sldId id="263" r:id="rId2"/>
     <p:sldId id="335" r:id="rId3"/>
-    <p:sldId id="343" r:id="rId4"/>
-    <p:sldId id="344" r:id="rId5"/>
-    <p:sldId id="345" r:id="rId6"/>
-    <p:sldId id="346" r:id="rId7"/>
-    <p:sldId id="347" r:id="rId8"/>
-    <p:sldId id="349" r:id="rId9"/>
-    <p:sldId id="348" r:id="rId10"/>
+    <p:sldId id="336" r:id="rId4"/>
+    <p:sldId id="337" r:id="rId5"/>
+    <p:sldId id="338" r:id="rId6"/>
   </p:sldIdLst>
   <p:sldSz cx="9144000" cy="6858000" type="screen4x3"/>
   <p:notesSz cx="7104063" cy="10234613"/>
@@ -3453,7 +3449,30 @@
           <a:p>
             <a:r>
               <a:rPr lang="en-US" dirty="0" smtClean="0"/>
-              <a:t>Investigating memory corruption issues</a:t>
+              <a:t>Investigating memory corruption </a:t>
+            </a:r>
+            <a:r>
+              <a:rPr lang="en-US" dirty="0"/>
+              <a:t>issues</a:t>
+            </a:r>
+            <a:br>
+              <a:rPr lang="en-US" dirty="0"/>
+            </a:br>
+            <a:r>
+              <a:rPr lang="en-US" dirty="0">
+                <a:hlinkClick r:id="rId2"/>
+              </a:rPr>
+              <a:t>https://</a:t>
+            </a:r>
+            <a:r>
+              <a:rPr lang="en-US" dirty="0" smtClean="0">
+                <a:hlinkClick r:id="rId2"/>
+              </a:rPr>
+              <a:t>gitlab.zeuthen.desy.de/ers/crash_investigator</a:t>
+            </a:r>
+            <a:r>
+              <a:rPr lang="en-US" dirty="0" smtClean="0"/>
+              <a:t> </a:t>
             </a:r>
             <a:endParaRPr lang="de-DE" dirty="0"/>
           </a:p>
@@ -3610,7 +3629,12 @@
             <p:ph idx="1"/>
           </p:nvPr>
         </p:nvSpPr>
-        <p:spPr/>
+        <p:spPr>
+          <a:xfrm>
+            <a:off x="162072" y="843221"/>
+            <a:ext cx="8825984" cy="5309486"/>
+          </a:xfrm>
+        </p:spPr>
         <p:txBody>
           <a:bodyPr/>
           <a:lstStyle/>
@@ -3623,68 +3647,24 @@
           </a:p>
           <a:p>
             <a:r>
-              <a:rPr lang="de-DE" dirty="0" err="1" smtClean="0"/>
-              <a:t>Mehods</a:t>
-            </a:r>
-            <a:r>
-              <a:rPr lang="de-DE" dirty="0" smtClean="0"/>
+              <a:rPr lang="en-US" dirty="0"/>
+              <a:t>Tools for investigations of memory-related problems</a:t>
+            </a:r>
+            <a:endParaRPr lang="de-DE" dirty="0" smtClean="0"/>
+          </a:p>
+          <a:p>
+            <a:pPr lvl="1"/>
+            <a:r>
+              <a:rPr lang="en-US" dirty="0" err="1" smtClean="0"/>
+              <a:t>valgrind</a:t>
+            </a:r>
+            <a:r>
+              <a:rPr lang="en-US" dirty="0" smtClean="0"/>
               <a:t> </a:t>
             </a:r>
             <a:r>
-              <a:rPr lang="de-DE" dirty="0" err="1" smtClean="0"/>
-              <a:t>of</a:t>
-            </a:r>
-            <a:r>
-              <a:rPr lang="de-DE" dirty="0" smtClean="0"/>
-              <a:t> </a:t>
-            </a:r>
-            <a:r>
-              <a:rPr lang="de-DE" dirty="0" err="1" smtClean="0"/>
-              <a:t>investigations</a:t>
-            </a:r>
-            <a:r>
-              <a:rPr lang="de-DE" dirty="0" smtClean="0"/>
-              <a:t> </a:t>
-            </a:r>
-            <a:r>
-              <a:rPr lang="de-DE" dirty="0" err="1" smtClean="0"/>
-              <a:t>of</a:t>
-            </a:r>
-            <a:r>
-              <a:rPr lang="de-DE" dirty="0" smtClean="0"/>
-              <a:t> </a:t>
-            </a:r>
-            <a:r>
-              <a:rPr lang="de-DE" dirty="0" err="1" smtClean="0"/>
-              <a:t>memory</a:t>
-            </a:r>
-            <a:r>
-              <a:rPr lang="de-DE" dirty="0" smtClean="0"/>
-              <a:t> </a:t>
-            </a:r>
-            <a:r>
-              <a:rPr lang="de-DE" dirty="0" err="1" smtClean="0"/>
-              <a:t>related</a:t>
-            </a:r>
-            <a:r>
-              <a:rPr lang="de-DE" dirty="0" smtClean="0"/>
-              <a:t> </a:t>
-            </a:r>
-            <a:r>
-              <a:rPr lang="de-DE" dirty="0" err="1" smtClean="0"/>
-              <a:t>problems</a:t>
-            </a:r>
-            <a:endParaRPr lang="de-DE" dirty="0" smtClean="0"/>
-          </a:p>
-          <a:p>
-            <a:pPr lvl="1"/>
-            <a:r>
-              <a:rPr lang="en-US" dirty="0" err="1" smtClean="0"/>
-              <a:t>valngrid</a:t>
-            </a:r>
-            <a:r>
               <a:rPr lang="en-US" dirty="0"/>
-              <a:t> (https://valgrind.org/): </a:t>
+              <a:t>(https://valgrind.org/): </a:t>
             </a:r>
             <a:r>
               <a:rPr lang="en-US" dirty="0" smtClean="0"/>
@@ -3771,12 +3751,76 @@
               <a:rPr lang="de-DE" dirty="0" smtClean="0"/>
               <a:t>Windows</a:t>
             </a:r>
-            <a:endParaRPr lang="de-DE" dirty="0" smtClean="0"/>
           </a:p>
           <a:p>
             <a:r>
               <a:rPr lang="en-US" dirty="0" smtClean="0"/>
-              <a:t>Crash investigator</a:t>
+              <a:t>Crash </a:t>
+            </a:r>
+            <a:r>
+              <a:rPr lang="en-US" dirty="0"/>
+              <a:t>investigator (</a:t>
+            </a:r>
+            <a:r>
+              <a:rPr lang="en-US" dirty="0">
+                <a:hlinkClick r:id="rId2"/>
+              </a:rPr>
+              <a:t>https://</a:t>
+            </a:r>
+            <a:r>
+              <a:rPr lang="en-US" dirty="0" smtClean="0">
+                <a:hlinkClick r:id="rId2"/>
+              </a:rPr>
+              <a:t>gitlab.zeuthen.desy.de/ers/crash_investigator</a:t>
+            </a:r>
+            <a:r>
+              <a:rPr lang="en-US" dirty="0" smtClean="0"/>
+              <a:t>)</a:t>
+            </a:r>
+            <a:endParaRPr lang="en-US" dirty="0" smtClean="0"/>
+          </a:p>
+          <a:p>
+            <a:pPr lvl="1"/>
+            <a:r>
+              <a:rPr lang="en-US" dirty="0"/>
+              <a:t>Reasons to implement this (cases when </a:t>
+            </a:r>
+            <a:r>
+              <a:rPr lang="en-US" dirty="0" err="1"/>
+              <a:t>Valgrind</a:t>
+            </a:r>
+            <a:r>
+              <a:rPr lang="en-US" dirty="0"/>
+              <a:t> will not help or will behave poorly)</a:t>
+            </a:r>
+            <a:endParaRPr lang="en-US" dirty="0" smtClean="0"/>
+          </a:p>
+          <a:p>
+            <a:pPr lvl="1"/>
+            <a:r>
+              <a:rPr lang="en-US" dirty="0"/>
+              <a:t>How it is implemented (the idea behind)</a:t>
+            </a:r>
+            <a:endParaRPr lang="en-US" dirty="0" smtClean="0"/>
+          </a:p>
+          <a:p>
+            <a:pPr lvl="1"/>
+            <a:r>
+              <a:rPr lang="en-US" dirty="0" smtClean="0"/>
+              <a:t>How to use it</a:t>
+            </a:r>
+          </a:p>
+          <a:p>
+            <a:pPr lvl="1"/>
+            <a:r>
+              <a:rPr lang="en-US" dirty="0" smtClean="0"/>
+              <a:t>How to extend it</a:t>
+            </a:r>
+          </a:p>
+          <a:p>
+            <a:r>
+              <a:rPr lang="en-US" dirty="0" smtClean="0"/>
+              <a:t>Demo</a:t>
             </a:r>
             <a:endParaRPr lang="de-DE" dirty="0" smtClean="0"/>
           </a:p>
@@ -3836,15 +3880,7 @@
           <a:p>
             <a:r>
               <a:rPr lang="en-US" dirty="0" smtClean="0"/>
-              <a:t>PITZ DAQ (Data </a:t>
-            </a:r>
-            <a:r>
-              <a:rPr lang="en-US" dirty="0" err="1" smtClean="0"/>
-              <a:t>AcQuisition</a:t>
-            </a:r>
-            <a:r>
-              <a:rPr lang="en-US" dirty="0" smtClean="0"/>
-              <a:t>). Recent activities</a:t>
+              <a:t>Memory related issues and crashes </a:t>
             </a:r>
             <a:endParaRPr lang="de-DE" dirty="0"/>
           </a:p>
@@ -3860,62 +3896,137 @@
             <p:ph idx="1"/>
           </p:nvPr>
         </p:nvSpPr>
-        <p:spPr>
-          <a:xfrm>
-            <a:off x="127591" y="822250"/>
-            <a:ext cx="8874642" cy="5224131"/>
-          </a:xfrm>
-        </p:spPr>
+        <p:spPr/>
         <p:txBody>
           <a:bodyPr/>
           <a:lstStyle/>
           <a:p>
-            <a:endParaRPr lang="en-US" dirty="0" smtClean="0"/>
-          </a:p>
-          <a:p>
+            <a:r>
+              <a:rPr lang="en-US" dirty="0" smtClean="0"/>
+              <a:t>Meaning of colors in the below list</a:t>
+            </a:r>
+          </a:p>
+          <a:p>
+            <a:pPr lvl="1"/>
+            <a:r>
+              <a:rPr lang="en-US" dirty="0">
+                <a:solidFill>
+                  <a:srgbClr val="339933"/>
+                </a:solidFill>
+              </a:rPr>
+              <a:t>Green</a:t>
+            </a:r>
             <a:r>
               <a:rPr lang="en-US" dirty="0"/>
-              <a:t>Added a new type of data collector. These collectors get data using the new DOOCS ZMQ publishing/subscribing.</a:t>
-            </a:r>
-            <a:endParaRPr lang="en-US" dirty="0" smtClean="0"/>
-          </a:p>
-          <a:p>
+              <a:t>: possible to investigate with the newly created crash </a:t>
+            </a:r>
+            <a:r>
+              <a:rPr lang="en-US" dirty="0" smtClean="0"/>
+              <a:t>investigator.</a:t>
+            </a:r>
+          </a:p>
+          <a:p>
+            <a:pPr lvl="1"/>
+            <a:r>
+              <a:rPr lang="en-US" dirty="0" smtClean="0">
+                <a:solidFill>
+                  <a:srgbClr val="FFC000"/>
+                </a:solidFill>
+              </a:rPr>
+              <a:t>Yellow</a:t>
+            </a:r>
+            <a:r>
+              <a:rPr lang="en-US" dirty="0" smtClean="0"/>
+              <a:t>: theoretically possible to investigate but not implemented.</a:t>
+            </a:r>
+          </a:p>
+          <a:p>
+            <a:pPr lvl="1"/>
+            <a:r>
+              <a:rPr lang="en-US" dirty="0" smtClean="0">
+                <a:solidFill>
+                  <a:srgbClr val="FF0000"/>
+                </a:solidFill>
+              </a:rPr>
+              <a:t>Red</a:t>
+            </a:r>
+            <a:r>
+              <a:rPr lang="en-US" dirty="0" smtClean="0"/>
+              <a:t>: not possible to investigate.</a:t>
+            </a:r>
+          </a:p>
+          <a:p>
+            <a:pPr lvl="1"/>
+            <a:r>
+              <a:rPr lang="en-US" dirty="0" smtClean="0"/>
+              <a:t>All cases are possible to investigate by </a:t>
+            </a:r>
+            <a:r>
+              <a:rPr lang="en-US" dirty="0" err="1" smtClean="0"/>
+              <a:t>Valgrind</a:t>
+            </a:r>
+            <a:r>
+              <a:rPr lang="en-US" dirty="0" smtClean="0"/>
+              <a:t> (even red cases)!</a:t>
+            </a:r>
+            <a:endParaRPr lang="en-US" dirty="0">
+              <a:solidFill>
+                <a:srgbClr val="FFCC00"/>
+              </a:solidFill>
+            </a:endParaRPr>
+          </a:p>
+          <a:p>
+            <a:r>
+              <a:rPr lang="en-US" dirty="0" smtClean="0">
+                <a:solidFill>
+                  <a:srgbClr val="FFCC00"/>
+                </a:solidFill>
+              </a:rPr>
+              <a:t>Memory </a:t>
+            </a:r>
+            <a:r>
+              <a:rPr lang="en-US" dirty="0">
+                <a:solidFill>
+                  <a:srgbClr val="FFCC00"/>
+                </a:solidFill>
+              </a:rPr>
+              <a:t>leak: this will not lead to a crash but after a long run there will not be available memory for the proper functionality of an </a:t>
+            </a:r>
+            <a:r>
+              <a:rPr lang="en-US" dirty="0" smtClean="0">
+                <a:solidFill>
+                  <a:srgbClr val="FFCC00"/>
+                </a:solidFill>
+              </a:rPr>
+              <a:t>application.</a:t>
+            </a:r>
+          </a:p>
+          <a:p>
+            <a:r>
+              <a:rPr lang="en-US" dirty="0" smtClean="0">
+                <a:solidFill>
+                  <a:srgbClr val="339933"/>
+                </a:solidFill>
+              </a:rPr>
+              <a:t>Double free issue: Most probably this will immediately crash the application.</a:t>
+            </a:r>
+            <a:r>
+              <a:rPr lang="en-US" dirty="0" smtClean="0"/>
+              <a:t> </a:t>
+            </a:r>
+          </a:p>
+          <a:p>
+            <a:r>
+              <a:rPr lang="en-US" dirty="0">
+                <a:solidFill>
+                  <a:srgbClr val="FF0000"/>
+                </a:solidFill>
+              </a:rPr>
+              <a:t>Memory overrun issue: This is a very hard detectable issue because they crash applications not immediately and not always. They crash applications when the memory behind allocated memory is responsible for sensitive data. Usually, the crash happens not during the bad call with overrun, but later when the mentioned sensitive memory is accessed.</a:t>
+            </a:r>
             <a:r>
               <a:rPr lang="en-US" dirty="0"/>
-              <a:t>Added possibility to collect secondary data alongside with main data. For example, if a spectrum is collected, then one can collect poly para alongside this spectrum, which later on will allow making physical value from raw measurement data.</a:t>
-            </a:r>
-            <a:endParaRPr lang="en-US" dirty="0" smtClean="0"/>
-          </a:p>
-          <a:p>
-            <a:r>
-              <a:rPr lang="en-US" dirty="0" smtClean="0"/>
-              <a:t>Collectors were made more </a:t>
-            </a:r>
-            <a:r>
-              <a:rPr lang="en-US" dirty="0"/>
-              <a:t>flexible</a:t>
-            </a:r>
-            <a:endParaRPr lang="en-US" dirty="0" smtClean="0"/>
-          </a:p>
-          <a:p>
-            <a:pPr lvl="1"/>
-            <a:r>
-              <a:rPr lang="en-US" dirty="0" smtClean="0"/>
-              <a:t>Add/remove entry on fly</a:t>
-            </a:r>
-          </a:p>
-          <a:p>
-            <a:pPr lvl="1"/>
-            <a:r>
-              <a:rPr lang="en-US" dirty="0" smtClean="0"/>
-              <a:t>Mask/unmask entry from the collection (with or without timeout) (can be done even runtime)</a:t>
-            </a:r>
-          </a:p>
-          <a:p>
-            <a:pPr lvl="1"/>
-            <a:r>
-              <a:rPr lang="en-US" dirty="0" smtClean="0"/>
-              <a:t>Mask/unmask entry errors (for example when server publishing data is switched off by purpose)</a:t>
+              <a:t> </a:t>
             </a:r>
             <a:endParaRPr lang="de-DE" dirty="0"/>
           </a:p>
@@ -3924,20 +4035,13 @@
     </p:spTree>
     <p:extLst>
       <p:ext uri="{BB962C8B-B14F-4D97-AF65-F5344CB8AC3E}">
-        <p14:creationId xmlns:p14="http://schemas.microsoft.com/office/powerpoint/2010/main" val="2525633856"/>
+        <p14:creationId xmlns:p14="http://schemas.microsoft.com/office/powerpoint/2010/main" val="2876077689"/>
       </p:ext>
     </p:extLst>
   </p:cSld>
   <p:clrMapOvr>
     <a:masterClrMapping/>
   </p:clrMapOvr>
-  <p:timing>
-    <p:tnLst>
-      <p:par>
-        <p:cTn id="1" dur="indefinite" restart="never" nodeType="tmRoot"/>
-      </p:par>
-    </p:tnLst>
-  </p:timing>
 </p:sld>
 </file>
 
@@ -3974,20 +4078,16 @@
           <a:lstStyle/>
           <a:p>
             <a:r>
-              <a:rPr lang="en-US" dirty="0"/>
-              <a:t>PITZ DAQ (Data </a:t>
-            </a:r>
-            <a:r>
-              <a:rPr lang="en-US" dirty="0" err="1"/>
-              <a:t>AcQuisition</a:t>
-            </a:r>
-            <a:r>
-              <a:rPr lang="en-US" dirty="0"/>
-              <a:t>). </a:t>
-            </a:r>
-            <a:r>
               <a:rPr lang="en-US" dirty="0" smtClean="0"/>
-              <a:t>Plans</a:t>
+              <a:t>How </a:t>
+            </a:r>
+            <a:r>
+              <a:rPr lang="en-US" dirty="0" err="1" smtClean="0"/>
+              <a:t>Valgrind</a:t>
+            </a:r>
+            <a:r>
+              <a:rPr lang="en-US" dirty="0" smtClean="0"/>
+              <a:t> works (notes will be deleted)</a:t>
             </a:r>
             <a:endParaRPr lang="de-DE" dirty="0"/>
           </a:p>
@@ -4009,66 +4109,16 @@
           <a:lstStyle/>
           <a:p>
             <a:r>
-              <a:rPr lang="en-US" dirty="0" smtClean="0"/>
-              <a:t>Integrate DAQ system developed by MCS for accelerators at HH DESY.</a:t>
-            </a:r>
-            <a:br>
-              <a:rPr lang="en-US" dirty="0" smtClean="0"/>
-            </a:br>
-            <a:r>
-              <a:rPr lang="en-US" dirty="0" smtClean="0"/>
-              <a:t>This is necessary because</a:t>
-            </a:r>
-          </a:p>
-          <a:p>
-            <a:pPr lvl="1"/>
-            <a:r>
-              <a:rPr lang="en-US" dirty="0" smtClean="0"/>
-              <a:t>PITZ needs software from HH, that depends on their DAQ</a:t>
-            </a:r>
-          </a:p>
-          <a:p>
-            <a:pPr lvl="1"/>
-            <a:r>
-              <a:rPr lang="en-US" dirty="0" smtClean="0"/>
-              <a:t>We will reduce maintenance effort/time (hopefully)</a:t>
-            </a:r>
-          </a:p>
-          <a:p>
-            <a:r>
-              <a:rPr lang="en-US" dirty="0" smtClean="0"/>
-              <a:t>For PITZ specific requirements we will do one of following</a:t>
-            </a:r>
-          </a:p>
-          <a:p>
-            <a:pPr lvl="1"/>
-            <a:r>
               <a:rPr lang="en-US" dirty="0"/>
-              <a:t>Keep minimum home-prepared systems and/or</a:t>
-            </a:r>
-            <a:endParaRPr lang="en-US" dirty="0" smtClean="0"/>
-          </a:p>
-          <a:p>
-            <a:pPr lvl="1"/>
+              <a:t>So what's the catch? The main one is that programs run significantly more slowly under </a:t>
+            </a:r>
+            <a:r>
+              <a:rPr lang="en-US" dirty="0" err="1"/>
+              <a:t>Valgrind</a:t>
+            </a:r>
             <a:r>
               <a:rPr lang="en-US" dirty="0"/>
-              <a:t>Make changes to the current DAQ system prepared by them to meet PITZ requirements. We can contribute during the development/implementation of these </a:t>
-            </a:r>
-            <a:r>
-              <a:rPr lang="en-US" dirty="0" smtClean="0"/>
-              <a:t>changes (discussion on this and integration at all will be continued with HH)</a:t>
-            </a:r>
-          </a:p>
-          <a:p>
-            <a:r>
-              <a:rPr lang="en-US" dirty="0" smtClean="0"/>
-              <a:t>Get rid of remnant AFS dependency of DAQ.</a:t>
-            </a:r>
-          </a:p>
-          <a:p>
-            <a:r>
-              <a:rPr lang="en-US" dirty="0" smtClean="0"/>
-              <a:t>Fix indexes and convert them to new indexes.</a:t>
+              <a:t>. Depending on which tool you use, the slowdown factor can range from 5--100. </a:t>
             </a:r>
             <a:endParaRPr lang="de-DE" dirty="0"/>
           </a:p>
@@ -4077,20 +4127,13 @@
     </p:spTree>
     <p:extLst>
       <p:ext uri="{BB962C8B-B14F-4D97-AF65-F5344CB8AC3E}">
-        <p14:creationId xmlns:p14="http://schemas.microsoft.com/office/powerpoint/2010/main" val="1931521969"/>
+        <p14:creationId xmlns:p14="http://schemas.microsoft.com/office/powerpoint/2010/main" val="3162719548"/>
       </p:ext>
     </p:extLst>
   </p:cSld>
   <p:clrMapOvr>
     <a:masterClrMapping/>
   </p:clrMapOvr>
-  <p:timing>
-    <p:tnLst>
-      <p:par>
-        <p:cTn id="1" dur="indefinite" restart="never" nodeType="tmRoot"/>
-      </p:par>
-    </p:tnLst>
-  </p:timing>
 </p:sld>
 </file>
 
@@ -4127,1294 +4170,16 @@
           <a:lstStyle/>
           <a:p>
             <a:r>
-              <a:rPr lang="de-DE" dirty="0" smtClean="0"/>
-              <a:t>Universal </a:t>
-            </a:r>
-            <a:r>
-              <a:rPr lang="de-DE" dirty="0" err="1" smtClean="0"/>
-              <a:t>driver</a:t>
-            </a:r>
-            <a:r>
-              <a:rPr lang="de-DE" dirty="0" smtClean="0"/>
-              <a:t> </a:t>
-            </a:r>
-            <a:r>
-              <a:rPr lang="de-DE" dirty="0" err="1" smtClean="0"/>
-              <a:t>for</a:t>
-            </a:r>
-            <a:r>
-              <a:rPr lang="de-DE" dirty="0" smtClean="0"/>
-              <a:t> </a:t>
-            </a:r>
-            <a:r>
-              <a:rPr lang="de-DE" dirty="0" err="1" smtClean="0"/>
-              <a:t>mTCA</a:t>
-            </a:r>
-            <a:r>
-              <a:rPr lang="de-DE" dirty="0" smtClean="0"/>
-              <a:t> </a:t>
-            </a:r>
-            <a:r>
-              <a:rPr lang="de-DE" dirty="0" err="1" smtClean="0"/>
-              <a:t>devices</a:t>
-            </a:r>
-            <a:endParaRPr lang="de-DE" dirty="0"/>
-          </a:p>
-        </p:txBody>
-      </p:sp>
-      <p:sp>
-        <p:nvSpPr>
-          <p:cNvPr id="3" name="Content Placeholder 2"/>
-          <p:cNvSpPr>
-            <a:spLocks noGrp="1"/>
-          </p:cNvSpPr>
-          <p:nvPr>
-            <p:ph idx="1"/>
-          </p:nvPr>
-        </p:nvSpPr>
-        <p:spPr/>
-        <p:txBody>
-          <a:bodyPr/>
-          <a:lstStyle/>
-          <a:p>
-            <a:pPr marL="0" indent="0">
-              <a:buNone/>
-            </a:pPr>
-            <a:r>
               <a:rPr lang="en-US" dirty="0"/>
-              <a:t>This driver exports APIs, which are used by different </a:t>
+              <a:t>How </a:t>
             </a:r>
             <a:r>
               <a:rPr lang="en-US" dirty="0" err="1"/>
-              <a:t>mTCA</a:t>
+              <a:t>Valgrind</a:t>
             </a:r>
             <a:r>
               <a:rPr lang="en-US" dirty="0"/>
-              <a:t> device </a:t>
-            </a:r>
-            <a:r>
-              <a:rPr lang="en-US" dirty="0" smtClean="0"/>
-              <a:t>drivers. Development is ongoing together with MCS4 colleagues from HH</a:t>
-            </a:r>
-            <a:endParaRPr lang="de-DE" dirty="0"/>
-          </a:p>
-        </p:txBody>
-      </p:sp>
-      <p:grpSp>
-        <p:nvGrpSpPr>
-          <p:cNvPr id="22" name="Group 21"/>
-          <p:cNvGrpSpPr/>
-          <p:nvPr/>
-        </p:nvGrpSpPr>
-        <p:grpSpPr>
-          <a:xfrm>
-            <a:off x="949842" y="2721934"/>
-            <a:ext cx="4720856" cy="2629787"/>
-            <a:chOff x="949842" y="2721934"/>
-            <a:chExt cx="4720856" cy="2629787"/>
-          </a:xfrm>
-        </p:grpSpPr>
-        <p:sp>
-          <p:nvSpPr>
-            <p:cNvPr id="4" name="Rounded Rectangle 3"/>
-            <p:cNvSpPr/>
-            <p:nvPr/>
-          </p:nvSpPr>
-          <p:spPr bwMode="auto">
-            <a:xfrm>
-              <a:off x="949842" y="2721934"/>
-              <a:ext cx="4720856" cy="1672857"/>
-            </a:xfrm>
-            <a:prstGeom prst="roundRect">
-              <a:avLst/>
-            </a:prstGeom>
-            <a:solidFill>
-              <a:schemeClr val="accent1"/>
-            </a:solidFill>
-            <a:ln w="9525" cap="flat" cmpd="sng" algn="ctr">
-              <a:solidFill>
-                <a:schemeClr val="tx1"/>
-              </a:solidFill>
-              <a:prstDash val="solid"/>
-              <a:round/>
-              <a:headEnd type="none" w="med" len="med"/>
-              <a:tailEnd type="none" w="med" len="med"/>
-            </a:ln>
-            <a:effectLst/>
-            <a:extLst>
-              <a:ext uri="{AF507438-7753-43E0-B8FC-AC1667EBCBE1}">
-                <a14:hiddenEffects xmlns:a14="http://schemas.microsoft.com/office/drawing/2010/main">
-                  <a:effectLst>
-                    <a:outerShdw dist="35921" dir="2700000" algn="ctr" rotWithShape="0">
-                      <a:schemeClr val="bg2"/>
-                    </a:outerShdw>
-                  </a:effectLst>
-                </a14:hiddenEffects>
-              </a:ext>
-            </a:extLst>
-          </p:spPr>
-          <p:txBody>
-            <a:bodyPr vert="horz" wrap="square" lIns="91440" tIns="45720" rIns="91440" bIns="45720" numCol="1" rtlCol="0" anchor="t" anchorCtr="0" compatLnSpc="1">
-              <a:prstTxWarp prst="textNoShape">
-                <a:avLst/>
-              </a:prstTxWarp>
-            </a:bodyPr>
-            <a:lstStyle/>
-            <a:p>
-              <a:pPr marL="0" marR="0" indent="0" algn="l" defTabSz="914400" rtl="0" eaLnBrk="0" fontAlgn="base" latinLnBrk="0" hangingPunct="0">
-                <a:lnSpc>
-                  <a:spcPct val="100000"/>
-                </a:lnSpc>
-                <a:spcBef>
-                  <a:spcPct val="0"/>
-                </a:spcBef>
-                <a:spcAft>
-                  <a:spcPct val="0"/>
-                </a:spcAft>
-                <a:buClrTx/>
-                <a:buSzTx/>
-                <a:buFontTx/>
-                <a:buNone/>
-                <a:tabLst/>
-              </a:pPr>
-              <a:endParaRPr kumimoji="0" lang="de-DE" sz="1600" b="0" i="0" u="none" strike="noStrike" cap="none" normalizeH="0" baseline="0" dirty="0" smtClean="0">
-                <a:ln>
-                  <a:noFill/>
-                </a:ln>
-                <a:solidFill>
-                  <a:schemeClr val="tx1"/>
-                </a:solidFill>
-                <a:effectLst/>
-                <a:latin typeface="Arial" charset="0"/>
-              </a:endParaRPr>
-            </a:p>
-          </p:txBody>
-        </p:sp>
-        <p:sp>
-          <p:nvSpPr>
-            <p:cNvPr id="5" name="Rectangle 4"/>
-            <p:cNvSpPr/>
-            <p:nvPr/>
-          </p:nvSpPr>
-          <p:spPr bwMode="auto">
-            <a:xfrm>
-              <a:off x="1282995" y="3625702"/>
-              <a:ext cx="1864242" cy="591880"/>
-            </a:xfrm>
-            <a:prstGeom prst="rect">
-              <a:avLst/>
-            </a:prstGeom>
-            <a:solidFill>
-              <a:srgbClr val="FF0000"/>
-            </a:solidFill>
-            <a:ln w="9525" cap="flat" cmpd="sng" algn="ctr">
-              <a:solidFill>
-                <a:schemeClr val="tx1"/>
-              </a:solidFill>
-              <a:prstDash val="solid"/>
-              <a:round/>
-              <a:headEnd type="none" w="med" len="med"/>
-              <a:tailEnd type="none" w="med" len="med"/>
-            </a:ln>
-            <a:effectLst/>
-            <a:extLst/>
-          </p:spPr>
-          <p:txBody>
-            <a:bodyPr vert="horz" wrap="square" lIns="91440" tIns="45720" rIns="91440" bIns="45720" numCol="1" rtlCol="0" anchor="t" anchorCtr="0" compatLnSpc="1">
-              <a:prstTxWarp prst="textNoShape">
-                <a:avLst/>
-              </a:prstTxWarp>
-            </a:bodyPr>
-            <a:lstStyle/>
-            <a:p>
-              <a:pPr marL="0" marR="0" indent="0" algn="ctr" defTabSz="914400" rtl="0" eaLnBrk="0" fontAlgn="base" latinLnBrk="0" hangingPunct="0">
-                <a:lnSpc>
-                  <a:spcPct val="100000"/>
-                </a:lnSpc>
-                <a:spcBef>
-                  <a:spcPct val="0"/>
-                </a:spcBef>
-                <a:spcAft>
-                  <a:spcPct val="0"/>
-                </a:spcAft>
-                <a:buClrTx/>
-                <a:buSzTx/>
-                <a:buFontTx/>
-                <a:buNone/>
-                <a:tabLst/>
-              </a:pPr>
-              <a:r>
-                <a:rPr lang="en-US" dirty="0" smtClean="0">
-                  <a:solidFill>
-                    <a:schemeClr val="bg1"/>
-                  </a:solidFill>
-                </a:rPr>
-                <a:t>Universal driver</a:t>
-              </a:r>
-            </a:p>
-            <a:p>
-              <a:pPr marL="0" marR="0" indent="0" algn="ctr" defTabSz="914400" rtl="0" eaLnBrk="0" fontAlgn="base" latinLnBrk="0" hangingPunct="0">
-                <a:lnSpc>
-                  <a:spcPct val="100000"/>
-                </a:lnSpc>
-                <a:spcBef>
-                  <a:spcPct val="0"/>
-                </a:spcBef>
-                <a:spcAft>
-                  <a:spcPct val="0"/>
-                </a:spcAft>
-                <a:buClrTx/>
-                <a:buSzTx/>
-                <a:buFontTx/>
-                <a:buNone/>
-                <a:tabLst/>
-              </a:pPr>
-              <a:r>
-                <a:rPr kumimoji="0" lang="en-US" sz="1600" b="0" i="0" u="none" strike="noStrike" cap="none" normalizeH="0" baseline="0" dirty="0" smtClean="0">
-                  <a:ln>
-                    <a:noFill/>
-                  </a:ln>
-                  <a:solidFill>
-                    <a:schemeClr val="bg1"/>
-                  </a:solidFill>
-                  <a:effectLst/>
-                  <a:latin typeface="Arial" charset="0"/>
-                </a:rPr>
-                <a:t>Provides API</a:t>
-              </a:r>
-              <a:endParaRPr kumimoji="0" lang="de-DE" sz="1600" b="0" i="0" u="none" strike="noStrike" cap="none" normalizeH="0" baseline="0" dirty="0" smtClean="0">
-                <a:ln>
-                  <a:noFill/>
-                </a:ln>
-                <a:solidFill>
-                  <a:schemeClr val="bg1"/>
-                </a:solidFill>
-                <a:effectLst/>
-                <a:latin typeface="Arial" charset="0"/>
-              </a:endParaRPr>
-            </a:p>
-          </p:txBody>
-        </p:sp>
-        <p:sp>
-          <p:nvSpPr>
-            <p:cNvPr id="6" name="Rectangle 5"/>
-            <p:cNvSpPr/>
-            <p:nvPr/>
-          </p:nvSpPr>
-          <p:spPr bwMode="auto">
-            <a:xfrm>
-              <a:off x="3427227" y="3625702"/>
-              <a:ext cx="1864242" cy="591880"/>
-            </a:xfrm>
-            <a:prstGeom prst="rect">
-              <a:avLst/>
-            </a:prstGeom>
-            <a:solidFill>
-              <a:srgbClr val="FF0000"/>
-            </a:solidFill>
-            <a:ln w="9525" cap="flat" cmpd="sng" algn="ctr">
-              <a:solidFill>
-                <a:schemeClr val="tx1"/>
-              </a:solidFill>
-              <a:prstDash val="solid"/>
-              <a:round/>
-              <a:headEnd type="none" w="med" len="med"/>
-              <a:tailEnd type="none" w="med" len="med"/>
-            </a:ln>
-            <a:effectLst/>
-            <a:extLst/>
-          </p:spPr>
-          <p:txBody>
-            <a:bodyPr vert="horz" wrap="square" lIns="91440" tIns="45720" rIns="91440" bIns="45720" numCol="1" rtlCol="0" anchor="ctr" anchorCtr="0" compatLnSpc="1">
-              <a:prstTxWarp prst="textNoShape">
-                <a:avLst/>
-              </a:prstTxWarp>
-            </a:bodyPr>
-            <a:lstStyle/>
-            <a:p>
-              <a:pPr marL="0" marR="0" indent="0" algn="ctr" defTabSz="914400" rtl="0" eaLnBrk="0" fontAlgn="base" latinLnBrk="0" hangingPunct="0">
-                <a:lnSpc>
-                  <a:spcPct val="100000"/>
-                </a:lnSpc>
-                <a:spcBef>
-                  <a:spcPct val="0"/>
-                </a:spcBef>
-                <a:spcAft>
-                  <a:spcPct val="0"/>
-                </a:spcAft>
-                <a:buClrTx/>
-                <a:buSzTx/>
-                <a:buFontTx/>
-                <a:buNone/>
-                <a:tabLst/>
-              </a:pPr>
-              <a:r>
-                <a:rPr kumimoji="0" lang="en-US" sz="1600" b="0" i="0" u="none" strike="noStrike" cap="none" normalizeH="0" baseline="0" dirty="0" smtClean="0">
-                  <a:ln>
-                    <a:noFill/>
-                  </a:ln>
-                  <a:solidFill>
-                    <a:schemeClr val="bg1"/>
-                  </a:solidFill>
-                  <a:effectLst/>
-                  <a:latin typeface="Arial" charset="0"/>
-                </a:rPr>
-                <a:t>Specific driver</a:t>
-              </a:r>
-              <a:endParaRPr kumimoji="0" lang="de-DE" sz="1600" b="0" i="0" u="none" strike="noStrike" cap="none" normalizeH="0" baseline="0" dirty="0" smtClean="0">
-                <a:ln>
-                  <a:noFill/>
-                </a:ln>
-                <a:solidFill>
-                  <a:schemeClr val="bg1"/>
-                </a:solidFill>
-                <a:effectLst/>
-                <a:latin typeface="Arial" charset="0"/>
-              </a:endParaRPr>
-            </a:p>
-          </p:txBody>
-        </p:sp>
-        <p:sp>
-          <p:nvSpPr>
-            <p:cNvPr id="7" name="Rectangle 6"/>
-            <p:cNvSpPr/>
-            <p:nvPr/>
-          </p:nvSpPr>
-          <p:spPr bwMode="auto">
-            <a:xfrm>
-              <a:off x="2215116" y="4720856"/>
-              <a:ext cx="2388781" cy="630865"/>
-            </a:xfrm>
-            <a:prstGeom prst="rect">
-              <a:avLst/>
-            </a:prstGeom>
-            <a:solidFill>
-              <a:schemeClr val="bg1">
-                <a:lumMod val="50000"/>
-              </a:schemeClr>
-            </a:solidFill>
-            <a:ln w="9525" cap="flat" cmpd="sng" algn="ctr">
-              <a:solidFill>
-                <a:schemeClr val="tx1"/>
-              </a:solidFill>
-              <a:prstDash val="solid"/>
-              <a:round/>
-              <a:headEnd type="none" w="med" len="med"/>
-              <a:tailEnd type="none" w="med" len="med"/>
-            </a:ln>
-            <a:effectLst/>
-            <a:extLst/>
-          </p:spPr>
-          <p:txBody>
-            <a:bodyPr vert="horz" wrap="square" lIns="91440" tIns="45720" rIns="91440" bIns="45720" numCol="1" rtlCol="0" anchor="ctr" anchorCtr="1" compatLnSpc="1">
-              <a:prstTxWarp prst="textNoShape">
-                <a:avLst/>
-              </a:prstTxWarp>
-            </a:bodyPr>
-            <a:lstStyle/>
-            <a:p>
-              <a:pPr marL="0" marR="0" indent="0" algn="l" defTabSz="914400" rtl="0" eaLnBrk="0" fontAlgn="base" latinLnBrk="0" hangingPunct="0">
-                <a:lnSpc>
-                  <a:spcPct val="100000"/>
-                </a:lnSpc>
-                <a:spcBef>
-                  <a:spcPct val="0"/>
-                </a:spcBef>
-                <a:spcAft>
-                  <a:spcPct val="0"/>
-                </a:spcAft>
-                <a:buClrTx/>
-                <a:buSzTx/>
-                <a:buFontTx/>
-                <a:buNone/>
-                <a:tabLst/>
-              </a:pPr>
-              <a:r>
-                <a:rPr kumimoji="0" lang="en-US" sz="2800" b="0" i="0" u="none" strike="noStrike" cap="none" normalizeH="0" baseline="0" dirty="0" smtClean="0">
-                  <a:ln>
-                    <a:noFill/>
-                  </a:ln>
-                  <a:solidFill>
-                    <a:schemeClr val="bg1"/>
-                  </a:solidFill>
-                  <a:effectLst/>
-                  <a:latin typeface="Arial" charset="0"/>
-                </a:rPr>
-                <a:t>Device</a:t>
-              </a:r>
-            </a:p>
-          </p:txBody>
-        </p:sp>
-        <p:sp>
-          <p:nvSpPr>
-            <p:cNvPr id="8" name="Left-Right Arrow 7"/>
-            <p:cNvSpPr/>
-            <p:nvPr/>
-          </p:nvSpPr>
-          <p:spPr bwMode="auto">
-            <a:xfrm>
-              <a:off x="3147237" y="3899491"/>
-              <a:ext cx="279990" cy="150628"/>
-            </a:xfrm>
-            <a:prstGeom prst="leftRightArrow">
-              <a:avLst/>
-            </a:prstGeom>
-            <a:solidFill>
-              <a:srgbClr val="FF0000"/>
-            </a:solidFill>
-            <a:ln w="9525" cap="flat" cmpd="sng" algn="ctr">
-              <a:solidFill>
-                <a:schemeClr val="tx1"/>
-              </a:solidFill>
-              <a:prstDash val="solid"/>
-              <a:round/>
-              <a:headEnd type="none" w="med" len="med"/>
-              <a:tailEnd type="none" w="med" len="med"/>
-            </a:ln>
-            <a:effectLst/>
-            <a:extLst/>
-          </p:spPr>
-          <p:txBody>
-            <a:bodyPr vert="horz" wrap="square" lIns="91440" tIns="45720" rIns="91440" bIns="45720" numCol="1" rtlCol="0" anchor="t" anchorCtr="0" compatLnSpc="1">
-              <a:prstTxWarp prst="textNoShape">
-                <a:avLst/>
-              </a:prstTxWarp>
-            </a:bodyPr>
-            <a:lstStyle/>
-            <a:p>
-              <a:pPr marL="0" marR="0" indent="0" algn="l" defTabSz="914400" rtl="0" eaLnBrk="0" fontAlgn="base" latinLnBrk="0" hangingPunct="0">
-                <a:lnSpc>
-                  <a:spcPct val="100000"/>
-                </a:lnSpc>
-                <a:spcBef>
-                  <a:spcPct val="0"/>
-                </a:spcBef>
-                <a:spcAft>
-                  <a:spcPct val="0"/>
-                </a:spcAft>
-                <a:buClrTx/>
-                <a:buSzTx/>
-                <a:buFontTx/>
-                <a:buNone/>
-                <a:tabLst/>
-              </a:pPr>
-              <a:endParaRPr kumimoji="0" lang="de-DE" sz="1600" b="0" i="0" u="none" strike="noStrike" cap="none" normalizeH="0" baseline="0" smtClean="0">
-                <a:ln>
-                  <a:noFill/>
-                </a:ln>
-                <a:solidFill>
-                  <a:schemeClr val="tx1"/>
-                </a:solidFill>
-                <a:effectLst/>
-                <a:latin typeface="Arial" charset="0"/>
-              </a:endParaRPr>
-            </a:p>
-          </p:txBody>
-        </p:sp>
-        <p:sp>
-          <p:nvSpPr>
-            <p:cNvPr id="10" name="Up-Down Arrow 9"/>
-            <p:cNvSpPr/>
-            <p:nvPr/>
-          </p:nvSpPr>
-          <p:spPr bwMode="auto">
-            <a:xfrm>
-              <a:off x="4040372" y="4167963"/>
-              <a:ext cx="198475" cy="567070"/>
-            </a:xfrm>
-            <a:prstGeom prst="upDownArrow">
-              <a:avLst/>
-            </a:prstGeom>
-            <a:solidFill>
-              <a:schemeClr val="accent2">
-                <a:lumMod val="60000"/>
-                <a:lumOff val="40000"/>
-              </a:schemeClr>
-            </a:solidFill>
-            <a:ln w="9525" cap="flat" cmpd="sng" algn="ctr">
-              <a:solidFill>
-                <a:schemeClr val="tx1"/>
-              </a:solidFill>
-              <a:prstDash val="solid"/>
-              <a:round/>
-              <a:headEnd type="none" w="med" len="med"/>
-              <a:tailEnd type="none" w="med" len="med"/>
-            </a:ln>
-            <a:effectLst/>
-            <a:extLst/>
-          </p:spPr>
-          <p:txBody>
-            <a:bodyPr vert="horz" wrap="square" lIns="91440" tIns="45720" rIns="91440" bIns="45720" numCol="1" rtlCol="0" anchor="t" anchorCtr="0" compatLnSpc="1">
-              <a:prstTxWarp prst="textNoShape">
-                <a:avLst/>
-              </a:prstTxWarp>
-            </a:bodyPr>
-            <a:lstStyle/>
-            <a:p>
-              <a:pPr marL="0" marR="0" indent="0" algn="l" defTabSz="914400" rtl="0" eaLnBrk="0" fontAlgn="base" latinLnBrk="0" hangingPunct="0">
-                <a:lnSpc>
-                  <a:spcPct val="100000"/>
-                </a:lnSpc>
-                <a:spcBef>
-                  <a:spcPct val="0"/>
-                </a:spcBef>
-                <a:spcAft>
-                  <a:spcPct val="0"/>
-                </a:spcAft>
-                <a:buClrTx/>
-                <a:buSzTx/>
-                <a:buFontTx/>
-                <a:buNone/>
-                <a:tabLst/>
-              </a:pPr>
-              <a:endParaRPr kumimoji="0" lang="de-DE" sz="1600" b="0" i="0" u="none" strike="noStrike" cap="none" normalizeH="0" baseline="0" smtClean="0">
-                <a:ln>
-                  <a:noFill/>
-                </a:ln>
-                <a:solidFill>
-                  <a:schemeClr val="tx1"/>
-                </a:solidFill>
-                <a:effectLst/>
-                <a:latin typeface="Arial" charset="0"/>
-              </a:endParaRPr>
-            </a:p>
-          </p:txBody>
-        </p:sp>
-        <p:sp>
-          <p:nvSpPr>
-            <p:cNvPr id="13" name="TextBox 12"/>
-            <p:cNvSpPr txBox="1"/>
-            <p:nvPr/>
-          </p:nvSpPr>
-          <p:spPr>
-            <a:xfrm>
-              <a:off x="2456984" y="3301325"/>
-              <a:ext cx="1380506" cy="338554"/>
-            </a:xfrm>
-            <a:prstGeom prst="rect">
-              <a:avLst/>
-            </a:prstGeom>
-            <a:noFill/>
-          </p:spPr>
-          <p:txBody>
-            <a:bodyPr wrap="none" rtlCol="0">
-              <a:spAutoFit/>
-            </a:bodyPr>
-            <a:lstStyle/>
-            <a:p>
-              <a:pPr algn="ctr"/>
-              <a:r>
-                <a:rPr lang="en-US" dirty="0" smtClean="0">
-                  <a:solidFill>
-                    <a:schemeClr val="bg1"/>
-                  </a:solidFill>
-                </a:rPr>
-                <a:t>Kernel space</a:t>
-              </a:r>
-              <a:endParaRPr lang="de-DE" dirty="0">
-                <a:solidFill>
-                  <a:schemeClr val="bg1"/>
-                </a:solidFill>
-              </a:endParaRPr>
-            </a:p>
-          </p:txBody>
-        </p:sp>
-        <p:sp>
-          <p:nvSpPr>
-            <p:cNvPr id="15" name="TextBox 14"/>
-            <p:cNvSpPr txBox="1"/>
-            <p:nvPr/>
-          </p:nvSpPr>
-          <p:spPr>
-            <a:xfrm>
-              <a:off x="2422925" y="2779486"/>
-              <a:ext cx="1221809" cy="338554"/>
-            </a:xfrm>
-            <a:prstGeom prst="rect">
-              <a:avLst/>
-            </a:prstGeom>
-            <a:noFill/>
-          </p:spPr>
-          <p:txBody>
-            <a:bodyPr wrap="none" rtlCol="0">
-              <a:spAutoFit/>
-            </a:bodyPr>
-            <a:lstStyle/>
-            <a:p>
-              <a:pPr algn="ctr"/>
-              <a:r>
-                <a:rPr lang="en-US" dirty="0" smtClean="0">
-                  <a:solidFill>
-                    <a:schemeClr val="bg1"/>
-                  </a:solidFill>
-                </a:rPr>
-                <a:t>User space</a:t>
-              </a:r>
-              <a:endParaRPr lang="de-DE" dirty="0">
-                <a:solidFill>
-                  <a:schemeClr val="bg1"/>
-                </a:solidFill>
-              </a:endParaRPr>
-            </a:p>
-          </p:txBody>
-        </p:sp>
-        <p:cxnSp>
-          <p:nvCxnSpPr>
-            <p:cNvPr id="18" name="Straight Connector 17"/>
-            <p:cNvCxnSpPr/>
-            <p:nvPr/>
-          </p:nvCxnSpPr>
-          <p:spPr bwMode="auto">
-            <a:xfrm>
-              <a:off x="949842" y="3301325"/>
-              <a:ext cx="4720856" cy="0"/>
-            </a:xfrm>
-            <a:prstGeom prst="line">
-              <a:avLst/>
-            </a:prstGeom>
-            <a:solidFill>
-              <a:schemeClr val="accent1"/>
-            </a:solidFill>
-            <a:ln w="28575" cap="flat" cmpd="sng" algn="ctr">
-              <a:solidFill>
-                <a:schemeClr val="tx1"/>
-              </a:solidFill>
-              <a:prstDash val="solid"/>
-              <a:round/>
-              <a:headEnd type="none" w="med" len="med"/>
-              <a:tailEnd type="none" w="med" len="med"/>
-            </a:ln>
-            <a:effectLst/>
-            <a:extLst>
-              <a:ext uri="{AF507438-7753-43E0-B8FC-AC1667EBCBE1}">
-                <a14:hiddenEffects xmlns:a14="http://schemas.microsoft.com/office/drawing/2010/main">
-                  <a:effectLst>
-                    <a:outerShdw dist="35921" dir="2700000" algn="ctr" rotWithShape="0">
-                      <a:schemeClr val="bg2"/>
-                    </a:outerShdw>
-                  </a:effectLst>
-                </a14:hiddenEffects>
-              </a:ext>
-            </a:extLst>
-          </p:spPr>
-        </p:cxnSp>
-        <p:sp>
-          <p:nvSpPr>
-            <p:cNvPr id="19" name="Rectangle 18"/>
-            <p:cNvSpPr/>
-            <p:nvPr/>
-          </p:nvSpPr>
-          <p:spPr bwMode="auto">
-            <a:xfrm>
-              <a:off x="3837490" y="2779486"/>
-              <a:ext cx="1578026" cy="422603"/>
-            </a:xfrm>
-            <a:prstGeom prst="rect">
-              <a:avLst/>
-            </a:prstGeom>
-            <a:solidFill>
-              <a:srgbClr val="FF0000"/>
-            </a:solidFill>
-            <a:ln w="9525" cap="flat" cmpd="sng" algn="ctr">
-              <a:solidFill>
-                <a:schemeClr val="tx1"/>
-              </a:solidFill>
-              <a:prstDash val="solid"/>
-              <a:round/>
-              <a:headEnd type="none" w="med" len="med"/>
-              <a:tailEnd type="none" w="med" len="med"/>
-            </a:ln>
-            <a:effectLst/>
-            <a:extLst/>
-          </p:spPr>
-          <p:txBody>
-            <a:bodyPr vert="horz" wrap="square" lIns="91440" tIns="45720" rIns="91440" bIns="45720" numCol="1" rtlCol="0" anchor="ctr" anchorCtr="0" compatLnSpc="1">
-              <a:prstTxWarp prst="textNoShape">
-                <a:avLst/>
-              </a:prstTxWarp>
-            </a:bodyPr>
-            <a:lstStyle/>
-            <a:p>
-              <a:pPr marL="0" marR="0" indent="0" algn="ctr" defTabSz="914400" rtl="0" eaLnBrk="0" fontAlgn="base" latinLnBrk="0" hangingPunct="0">
-                <a:lnSpc>
-                  <a:spcPct val="100000"/>
-                </a:lnSpc>
-                <a:spcBef>
-                  <a:spcPct val="0"/>
-                </a:spcBef>
-                <a:spcAft>
-                  <a:spcPct val="0"/>
-                </a:spcAft>
-                <a:buClrTx/>
-                <a:buSzTx/>
-                <a:buFontTx/>
-                <a:buNone/>
-                <a:tabLst/>
-              </a:pPr>
-              <a:r>
-                <a:rPr kumimoji="0" lang="en-US" sz="1600" b="0" i="0" u="none" strike="noStrike" cap="none" normalizeH="0" baseline="0" dirty="0" smtClean="0">
-                  <a:ln>
-                    <a:noFill/>
-                  </a:ln>
-                  <a:solidFill>
-                    <a:schemeClr val="bg1"/>
-                  </a:solidFill>
-                  <a:effectLst/>
-                  <a:latin typeface="Arial" charset="0"/>
-                </a:rPr>
-                <a:t>DOOCS server</a:t>
-              </a:r>
-              <a:endParaRPr kumimoji="0" lang="de-DE" sz="1600" b="0" i="0" u="none" strike="noStrike" cap="none" normalizeH="0" baseline="0" dirty="0" smtClean="0">
-                <a:ln>
-                  <a:noFill/>
-                </a:ln>
-                <a:solidFill>
-                  <a:schemeClr val="bg1"/>
-                </a:solidFill>
-                <a:effectLst/>
-                <a:latin typeface="Arial" charset="0"/>
-              </a:endParaRPr>
-            </a:p>
-          </p:txBody>
-        </p:sp>
-        <p:sp>
-          <p:nvSpPr>
-            <p:cNvPr id="20" name="Up-Down Arrow 19"/>
-            <p:cNvSpPr/>
-            <p:nvPr/>
-          </p:nvSpPr>
-          <p:spPr bwMode="auto">
-            <a:xfrm>
-              <a:off x="4527265" y="3175000"/>
-              <a:ext cx="198475" cy="444035"/>
-            </a:xfrm>
-            <a:prstGeom prst="upDownArrow">
-              <a:avLst/>
-            </a:prstGeom>
-            <a:solidFill>
-              <a:schemeClr val="accent2">
-                <a:lumMod val="60000"/>
-                <a:lumOff val="40000"/>
-              </a:schemeClr>
-            </a:solidFill>
-            <a:ln w="9525" cap="flat" cmpd="sng" algn="ctr">
-              <a:solidFill>
-                <a:schemeClr val="tx1"/>
-              </a:solidFill>
-              <a:prstDash val="solid"/>
-              <a:round/>
-              <a:headEnd type="none" w="med" len="med"/>
-              <a:tailEnd type="none" w="med" len="med"/>
-            </a:ln>
-            <a:effectLst/>
-            <a:extLst/>
-          </p:spPr>
-          <p:txBody>
-            <a:bodyPr vert="horz" wrap="square" lIns="91440" tIns="45720" rIns="91440" bIns="45720" numCol="1" rtlCol="0" anchor="t" anchorCtr="0" compatLnSpc="1">
-              <a:prstTxWarp prst="textNoShape">
-                <a:avLst/>
-              </a:prstTxWarp>
-            </a:bodyPr>
-            <a:lstStyle/>
-            <a:p>
-              <a:pPr marL="0" marR="0" indent="0" algn="l" defTabSz="914400" rtl="0" eaLnBrk="0" fontAlgn="base" latinLnBrk="0" hangingPunct="0">
-                <a:lnSpc>
-                  <a:spcPct val="100000"/>
-                </a:lnSpc>
-                <a:spcBef>
-                  <a:spcPct val="0"/>
-                </a:spcBef>
-                <a:spcAft>
-                  <a:spcPct val="0"/>
-                </a:spcAft>
-                <a:buClrTx/>
-                <a:buSzTx/>
-                <a:buFontTx/>
-                <a:buNone/>
-                <a:tabLst/>
-              </a:pPr>
-              <a:endParaRPr kumimoji="0" lang="de-DE" sz="1600" b="0" i="0" u="none" strike="noStrike" cap="none" normalizeH="0" baseline="0" smtClean="0">
-                <a:ln>
-                  <a:noFill/>
-                </a:ln>
-                <a:solidFill>
-                  <a:schemeClr val="tx1"/>
-                </a:solidFill>
-                <a:effectLst/>
-                <a:latin typeface="Arial" charset="0"/>
-              </a:endParaRPr>
-            </a:p>
-          </p:txBody>
-        </p:sp>
-      </p:grpSp>
-      <p:sp>
-        <p:nvSpPr>
-          <p:cNvPr id="21" name="TextBox 20"/>
-          <p:cNvSpPr txBox="1"/>
-          <p:nvPr/>
-        </p:nvSpPr>
-        <p:spPr>
-          <a:xfrm>
-            <a:off x="5741580" y="1842823"/>
-            <a:ext cx="3289005" cy="1708160"/>
-          </a:xfrm>
-          <a:prstGeom prst="rect">
-            <a:avLst/>
-          </a:prstGeom>
-          <a:noFill/>
-        </p:spPr>
-        <p:txBody>
-          <a:bodyPr wrap="square" rtlCol="0">
-            <a:spAutoFit/>
-          </a:bodyPr>
-          <a:lstStyle/>
-          <a:p>
-            <a:pPr marL="285750" indent="-285750">
-              <a:buFont typeface="Arial" panose="020B0604020202020204" pitchFamily="34" charset="0"/>
-              <a:buChar char="•"/>
-            </a:pPr>
-            <a:r>
-              <a:rPr lang="en-US" sz="1500" dirty="0" smtClean="0"/>
-              <a:t>Migration to </a:t>
-            </a:r>
-            <a:r>
-              <a:rPr lang="en-US" sz="1500" dirty="0"/>
-              <a:t>U</a:t>
-            </a:r>
-            <a:r>
-              <a:rPr lang="en-US" sz="1500" dirty="0" smtClean="0"/>
-              <a:t>buntu 20</a:t>
-            </a:r>
-          </a:p>
-          <a:p>
-            <a:pPr marL="285750" indent="-285750">
-              <a:buFont typeface="Arial" panose="020B0604020202020204" pitchFamily="34" charset="0"/>
-              <a:buChar char="•"/>
-            </a:pPr>
-            <a:r>
-              <a:rPr lang="en-US" sz="1500" dirty="0"/>
-              <a:t>Making our device-specific drivers compatible with this scheme (for Ubuntu 16 and earlier we had one more layer in between) </a:t>
-            </a:r>
-            <a:endParaRPr lang="en-US" sz="1500" dirty="0" smtClean="0"/>
-          </a:p>
-          <a:p>
-            <a:pPr marL="285750" indent="-285750">
-              <a:buFont typeface="Arial" panose="020B0604020202020204" pitchFamily="34" charset="0"/>
-              <a:buChar char="•"/>
-            </a:pPr>
-            <a:endParaRPr lang="de-DE" sz="1500" dirty="0"/>
-          </a:p>
-        </p:txBody>
-      </p:sp>
-      <p:sp>
-        <p:nvSpPr>
-          <p:cNvPr id="23" name="TextBox 22"/>
-          <p:cNvSpPr txBox="1"/>
-          <p:nvPr/>
-        </p:nvSpPr>
-        <p:spPr>
-          <a:xfrm>
-            <a:off x="5741581" y="3397017"/>
-            <a:ext cx="3289003" cy="2893100"/>
-          </a:xfrm>
-          <a:prstGeom prst="rect">
-            <a:avLst/>
-          </a:prstGeom>
-          <a:noFill/>
-          <a:ln>
-            <a:solidFill>
-              <a:schemeClr val="tx1"/>
-            </a:solidFill>
-          </a:ln>
-        </p:spPr>
-        <p:txBody>
-          <a:bodyPr wrap="square" rtlCol="0">
-            <a:spAutoFit/>
-          </a:bodyPr>
-          <a:lstStyle/>
-          <a:p>
-            <a:r>
-              <a:rPr lang="en-US" sz="1700" b="1" dirty="0" smtClean="0"/>
-              <a:t>Plans</a:t>
-            </a:r>
-          </a:p>
-          <a:p>
-            <a:pPr marL="342900" indent="-342900">
-              <a:buFont typeface="+mj-lt"/>
-              <a:buAutoNum type="arabicPeriod"/>
-            </a:pPr>
-            <a:r>
-              <a:rPr lang="en-US" sz="1500" dirty="0" smtClean="0"/>
-              <a:t>Improving error handling by using </a:t>
-            </a:r>
-            <a:r>
-              <a:rPr lang="en-US" sz="1500" dirty="0" err="1" smtClean="0"/>
-              <a:t>PCIe</a:t>
-            </a:r>
-            <a:r>
-              <a:rPr lang="en-US" sz="1500" dirty="0"/>
-              <a:t> AER (</a:t>
-            </a:r>
-            <a:r>
-              <a:rPr lang="en-US" sz="1100" dirty="0">
-                <a:hlinkClick r:id="rId2"/>
-              </a:rPr>
-              <a:t>https://www.kernel.org/doc/Documentation/PCI/pcieaer-howto.txt</a:t>
-            </a:r>
-            <a:r>
-              <a:rPr lang="en-US" sz="1500" dirty="0" smtClean="0"/>
-              <a:t>) driver.</a:t>
-            </a:r>
-          </a:p>
-          <a:p>
-            <a:pPr marL="342900" indent="-342900">
-              <a:buFont typeface="+mj-lt"/>
-              <a:buAutoNum type="arabicPeriod"/>
-            </a:pPr>
-            <a:r>
-              <a:rPr lang="en-US" sz="1500" dirty="0"/>
-              <a:t>Make it possible to handle a simple device with this driver.</a:t>
-            </a:r>
-            <a:endParaRPr lang="en-US" sz="1500" dirty="0" smtClean="0"/>
-          </a:p>
-          <a:p>
-            <a:pPr marL="342900" indent="-342900">
-              <a:buFont typeface="+mj-lt"/>
-              <a:buAutoNum type="arabicPeriod"/>
-            </a:pPr>
-            <a:r>
-              <a:rPr lang="en-US" sz="1500" dirty="0"/>
-              <a:t>To have the possibility to handle interrupt of simple devices from the universal driver (when point 2 is done).</a:t>
-            </a:r>
-            <a:endParaRPr lang="en-US" sz="1500" dirty="0" smtClean="0"/>
-          </a:p>
-          <a:p>
-            <a:pPr marL="285750" indent="-285750">
-              <a:buFont typeface="Arial" panose="020B0604020202020204" pitchFamily="34" charset="0"/>
-              <a:buChar char="•"/>
-            </a:pPr>
-            <a:endParaRPr lang="de-DE" sz="1500" dirty="0"/>
-          </a:p>
-        </p:txBody>
-      </p:sp>
-    </p:spTree>
-    <p:extLst>
-      <p:ext uri="{BB962C8B-B14F-4D97-AF65-F5344CB8AC3E}">
-        <p14:creationId xmlns:p14="http://schemas.microsoft.com/office/powerpoint/2010/main" val="1347251138"/>
-      </p:ext>
-    </p:extLst>
-  </p:cSld>
-  <p:clrMapOvr>
-    <a:masterClrMapping/>
-  </p:clrMapOvr>
-  <p:timing>
-    <p:tnLst>
-      <p:par>
-        <p:cTn id="1" dur="indefinite" restart="never" nodeType="tmRoot"/>
-      </p:par>
-    </p:tnLst>
-  </p:timing>
-</p:sld>
-</file>
-
-<file path=ppt/slides/slide6.xml><?xml version="1.0" encoding="utf-8"?>
-<p:sld xmlns:a="http://schemas.openxmlformats.org/drawingml/2006/main" xmlns:r="http://schemas.openxmlformats.org/officeDocument/2006/relationships" xmlns:p="http://schemas.openxmlformats.org/presentationml/2006/main">
-  <p:cSld>
-    <p:spTree>
-      <p:nvGrpSpPr>
-        <p:cNvPr id="1" name=""/>
-        <p:cNvGrpSpPr/>
-        <p:nvPr/>
-      </p:nvGrpSpPr>
-      <p:grpSpPr>
-        <a:xfrm>
-          <a:off x="0" y="0"/>
-          <a:ext cx="0" cy="0"/>
-          <a:chOff x="0" y="0"/>
-          <a:chExt cx="0" cy="0"/>
-        </a:xfrm>
-      </p:grpSpPr>
-      <p:sp>
-        <p:nvSpPr>
-          <p:cNvPr id="2" name="Title 1"/>
-          <p:cNvSpPr>
-            <a:spLocks noGrp="1"/>
-          </p:cNvSpPr>
-          <p:nvPr>
-            <p:ph type="title"/>
-          </p:nvPr>
-        </p:nvSpPr>
-        <p:spPr/>
-        <p:txBody>
-          <a:bodyPr/>
-          <a:lstStyle/>
-          <a:p>
-            <a:r>
-              <a:rPr lang="en-US" dirty="0" smtClean="0"/>
-              <a:t>Device specific driver development</a:t>
-            </a:r>
-            <a:endParaRPr lang="de-DE" dirty="0"/>
-          </a:p>
-        </p:txBody>
-      </p:sp>
-      <p:sp>
-        <p:nvSpPr>
-          <p:cNvPr id="3" name="Content Placeholder 2"/>
-          <p:cNvSpPr>
-            <a:spLocks noGrp="1"/>
-          </p:cNvSpPr>
-          <p:nvPr>
-            <p:ph idx="1"/>
-          </p:nvPr>
-        </p:nvSpPr>
-        <p:spPr/>
-        <p:txBody>
-          <a:bodyPr/>
-          <a:lstStyle/>
-          <a:p>
-            <a:r>
-              <a:rPr lang="en-US" dirty="0" smtClean="0"/>
-              <a:t>Driver for TAMC200 (</a:t>
-            </a:r>
-            <a:r>
-              <a:rPr lang="en-US" dirty="0" err="1" smtClean="0"/>
-              <a:t>Tews</a:t>
-            </a:r>
-            <a:r>
-              <a:rPr lang="en-US" dirty="0" smtClean="0"/>
-              <a:t> </a:t>
-            </a:r>
-            <a:r>
-              <a:rPr lang="en-US" dirty="0"/>
-              <a:t>AMC) (</a:t>
-            </a:r>
-            <a:r>
-              <a:rPr lang="en-US" dirty="0">
-                <a:hlinkClick r:id="rId2"/>
-              </a:rPr>
-              <a:t>https://</a:t>
-            </a:r>
-            <a:r>
-              <a:rPr lang="en-US" dirty="0" smtClean="0">
-                <a:hlinkClick r:id="rId2"/>
-              </a:rPr>
-              <a:t>www.tews.com/Products/ArticleGroup/TAMC/TAMC200.html</a:t>
-            </a:r>
-            <a:r>
-              <a:rPr lang="en-US" dirty="0" smtClean="0"/>
-              <a:t>)</a:t>
-            </a:r>
-            <a:r>
-              <a:rPr lang="de-DE" dirty="0" smtClean="0"/>
-              <a:t/>
-            </a:r>
-            <a:br>
-              <a:rPr lang="de-DE" dirty="0" smtClean="0"/>
-            </a:br>
-            <a:r>
-              <a:rPr lang="en-US" dirty="0"/>
-              <a:t>Migrated to Ubuntu 20. DKMS </a:t>
-            </a:r>
-            <a:r>
-              <a:rPr lang="en-US" dirty="0" err="1"/>
-              <a:t>Debian</a:t>
-            </a:r>
-            <a:r>
-              <a:rPr lang="en-US" dirty="0"/>
-              <a:t> package is hosted by </a:t>
-            </a:r>
-            <a:r>
-              <a:rPr lang="en-US" dirty="0" err="1"/>
-              <a:t>Debian</a:t>
-            </a:r>
-            <a:r>
-              <a:rPr lang="en-US" dirty="0"/>
-              <a:t> repository supported by MCS4.</a:t>
-            </a:r>
-            <a:endParaRPr lang="de-DE" dirty="0" smtClean="0"/>
-          </a:p>
-          <a:p>
-            <a:endParaRPr lang="en-US" dirty="0" smtClean="0"/>
-          </a:p>
-          <a:p>
-            <a:endParaRPr lang="en-US" dirty="0"/>
-          </a:p>
-          <a:p>
-            <a:endParaRPr lang="en-US" dirty="0" smtClean="0"/>
-          </a:p>
-          <a:p>
-            <a:endParaRPr lang="en-US" dirty="0"/>
-          </a:p>
-          <a:p>
-            <a:endParaRPr lang="en-US" dirty="0" smtClean="0"/>
-          </a:p>
-          <a:p>
-            <a:r>
-              <a:rPr lang="en-US" dirty="0" smtClean="0"/>
-              <a:t>There </a:t>
-            </a:r>
-            <a:r>
-              <a:rPr lang="en-US" dirty="0"/>
-              <a:t>are plans to investigate and optimize drivers for ADC measurement devices. There is a test driver developed and tested at </a:t>
-            </a:r>
-            <a:r>
-              <a:rPr lang="en-US" dirty="0" err="1"/>
-              <a:t>Zeuthen</a:t>
-            </a:r>
-            <a:r>
-              <a:rPr lang="en-US" dirty="0"/>
-              <a:t> as well there is a driver developed by MCS colleagues. The goal is to use statistics on both drivers and make one with better performance and memory usage. </a:t>
-            </a:r>
-            <a:endParaRPr lang="en-US" dirty="0" smtClean="0"/>
-          </a:p>
-        </p:txBody>
-      </p:sp>
-      <p:grpSp>
-        <p:nvGrpSpPr>
-          <p:cNvPr id="6" name="Group 5"/>
-          <p:cNvGrpSpPr/>
-          <p:nvPr/>
-        </p:nvGrpSpPr>
-        <p:grpSpPr>
-          <a:xfrm>
-            <a:off x="4171710" y="1991833"/>
-            <a:ext cx="3427026" cy="2273494"/>
-            <a:chOff x="641701" y="4061638"/>
-            <a:chExt cx="3427026" cy="2273494"/>
-          </a:xfrm>
-        </p:grpSpPr>
-        <p:pic>
-          <p:nvPicPr>
-            <p:cNvPr id="4" name="Picture 3"/>
-            <p:cNvPicPr>
-              <a:picLocks noChangeAspect="1"/>
-            </p:cNvPicPr>
-            <p:nvPr/>
-          </p:nvPicPr>
-          <p:blipFill>
-            <a:blip r:embed="rId3">
-              <a:extLst>
-                <a:ext uri="{28A0092B-C50C-407E-A947-70E740481C1C}">
-                  <a14:useLocalDpi xmlns:a14="http://schemas.microsoft.com/office/drawing/2010/main" val="0"/>
-                </a:ext>
-              </a:extLst>
-            </a:blip>
-            <a:stretch>
-              <a:fillRect/>
-            </a:stretch>
-          </p:blipFill>
-          <p:spPr>
-            <a:xfrm>
-              <a:off x="641701" y="4061638"/>
-              <a:ext cx="3345730" cy="2055627"/>
-            </a:xfrm>
-            <a:prstGeom prst="rect">
-              <a:avLst/>
-            </a:prstGeom>
-          </p:spPr>
-        </p:pic>
-        <p:sp>
-          <p:nvSpPr>
-            <p:cNvPr id="5" name="TextBox 4"/>
-            <p:cNvSpPr txBox="1"/>
-            <p:nvPr/>
-          </p:nvSpPr>
-          <p:spPr>
-            <a:xfrm>
-              <a:off x="1020727" y="6088911"/>
-              <a:ext cx="3048000" cy="246221"/>
-            </a:xfrm>
-            <a:prstGeom prst="rect">
-              <a:avLst/>
-            </a:prstGeom>
-            <a:noFill/>
-          </p:spPr>
-          <p:txBody>
-            <a:bodyPr wrap="square" rtlCol="0">
-              <a:spAutoFit/>
-            </a:bodyPr>
-            <a:lstStyle/>
-            <a:p>
-              <a:r>
-                <a:rPr lang="de-DE" sz="1000" b="1" dirty="0"/>
-                <a:t>TAMC200 3 Slot </a:t>
-              </a:r>
-              <a:r>
-                <a:rPr lang="de-DE" sz="1000" b="1" dirty="0" err="1"/>
-                <a:t>IndustryPack</a:t>
-              </a:r>
-              <a:r>
-                <a:rPr lang="de-DE" sz="1000" b="1" dirty="0"/>
-                <a:t> Carrier </a:t>
-              </a:r>
-              <a:r>
-                <a:rPr lang="de-DE" sz="1000" b="1" dirty="0" err="1"/>
-                <a:t>for</a:t>
-              </a:r>
-              <a:r>
-                <a:rPr lang="de-DE" sz="1000" b="1" dirty="0"/>
-                <a:t> AMC</a:t>
-              </a:r>
-              <a:endParaRPr lang="de-DE" sz="1000" dirty="0"/>
-            </a:p>
-          </p:txBody>
-        </p:sp>
-      </p:grpSp>
-    </p:spTree>
-    <p:extLst>
-      <p:ext uri="{BB962C8B-B14F-4D97-AF65-F5344CB8AC3E}">
-        <p14:creationId xmlns:p14="http://schemas.microsoft.com/office/powerpoint/2010/main" val="3179875872"/>
-      </p:ext>
-    </p:extLst>
-  </p:cSld>
-  <p:clrMapOvr>
-    <a:masterClrMapping/>
-  </p:clrMapOvr>
-  <p:timing>
-    <p:tnLst>
-      <p:par>
-        <p:cTn id="1" dur="indefinite" restart="never" nodeType="tmRoot"/>
-      </p:par>
-    </p:tnLst>
-  </p:timing>
-</p:sld>
-</file>
-
-<file path=ppt/slides/slide7.xml><?xml version="1.0" encoding="utf-8"?>
-<p:sld xmlns:a="http://schemas.openxmlformats.org/drawingml/2006/main" xmlns:r="http://schemas.openxmlformats.org/officeDocument/2006/relationships" xmlns:p="http://schemas.openxmlformats.org/presentationml/2006/main">
-  <p:cSld>
-    <p:spTree>
-      <p:nvGrpSpPr>
-        <p:cNvPr id="1" name=""/>
-        <p:cNvGrpSpPr/>
-        <p:nvPr/>
-      </p:nvGrpSpPr>
-      <p:grpSpPr>
-        <a:xfrm>
-          <a:off x="0" y="0"/>
-          <a:ext cx="0" cy="0"/>
-          <a:chOff x="0" y="0"/>
-          <a:chExt cx="0" cy="0"/>
-        </a:xfrm>
-      </p:grpSpPr>
-      <p:sp>
-        <p:nvSpPr>
-          <p:cNvPr id="2" name="Title 1"/>
-          <p:cNvSpPr>
-            <a:spLocks noGrp="1"/>
-          </p:cNvSpPr>
-          <p:nvPr>
-            <p:ph type="title"/>
-          </p:nvPr>
-        </p:nvSpPr>
-        <p:spPr/>
-        <p:txBody>
-          <a:bodyPr/>
-          <a:lstStyle/>
-          <a:p>
-            <a:r>
-              <a:rPr lang="en-US" dirty="0" smtClean="0"/>
-              <a:t>Windows DOOCS</a:t>
+              <a:t> works</a:t>
             </a:r>
             <a:endParaRPr lang="de-DE" dirty="0"/>
           </a:p>
@@ -5432,8 +4197,8 @@
         </p:nvSpPr>
         <p:spPr>
           <a:xfrm>
-            <a:off x="183338" y="836133"/>
-            <a:ext cx="8818895" cy="5224425"/>
+            <a:off x="98278" y="790934"/>
+            <a:ext cx="8854337" cy="5283801"/>
           </a:xfrm>
         </p:spPr>
         <p:txBody>
@@ -5441,494 +4206,331 @@
           <a:lstStyle/>
           <a:p>
             <a:r>
+              <a:rPr lang="en-US" sz="1900" dirty="0"/>
+              <a:t>In the previous slide, there was a note that </a:t>
+            </a:r>
+            <a:r>
+              <a:rPr lang="en-US" sz="1900" dirty="0" err="1"/>
+              <a:t>Valgrind</a:t>
+            </a:r>
+            <a:r>
+              <a:rPr lang="en-US" sz="1900" dirty="0"/>
+              <a:t> works for all mentioned cases. Then the question arises why do we need something else?</a:t>
+            </a:r>
+            <a:endParaRPr lang="en-US" sz="1900" dirty="0" smtClean="0"/>
+          </a:p>
+          <a:p>
+            <a:pPr lvl="1"/>
+            <a:r>
+              <a:rPr lang="en-US" sz="1400" dirty="0" smtClean="0"/>
+              <a:t>It slows down application 5-100 times.</a:t>
+            </a:r>
+          </a:p>
+          <a:p>
+            <a:pPr lvl="1"/>
+            <a:r>
+              <a:rPr lang="en-US" sz="1400" dirty="0" smtClean="0"/>
+              <a:t>Installation is needed and I’m not sure</a:t>
+            </a:r>
+            <a:br>
+              <a:rPr lang="en-US" sz="1400" dirty="0" smtClean="0"/>
+            </a:br>
+            <a:r>
+              <a:rPr lang="en-US" sz="1400" dirty="0" smtClean="0"/>
+              <a:t>if we will have permission to install</a:t>
+            </a:r>
+            <a:br>
+              <a:rPr lang="en-US" sz="1400" dirty="0" smtClean="0"/>
+            </a:br>
+            <a:r>
+              <a:rPr lang="en-US" sz="1400" dirty="0" err="1" smtClean="0"/>
+              <a:t>Valgrind</a:t>
+            </a:r>
+            <a:r>
+              <a:rPr lang="en-US" sz="1400" dirty="0" smtClean="0"/>
+              <a:t> on our server hosts.</a:t>
+            </a:r>
+          </a:p>
+          <a:p>
+            <a:pPr lvl="1"/>
+            <a:r>
+              <a:rPr lang="en-US" sz="1400" dirty="0" smtClean="0"/>
+              <a:t>Missing details on some moments in </a:t>
+            </a:r>
+            <a:br>
+              <a:rPr lang="en-US" sz="1400" dirty="0" smtClean="0"/>
+            </a:br>
+            <a:r>
+              <a:rPr lang="en-US" sz="1400" dirty="0" smtClean="0"/>
+              <a:t>some cases (details will be presented later).</a:t>
+            </a:r>
+            <a:r>
+              <a:rPr lang="en-US" dirty="0" smtClean="0"/>
+              <a:t> </a:t>
+            </a:r>
+          </a:p>
+          <a:p>
+            <a:pPr lvl="1"/>
+            <a:r>
+              <a:rPr lang="en-US" sz="1400" dirty="0"/>
+              <a:t>Easy extendibility. </a:t>
+            </a:r>
+            <a:r>
+              <a:rPr lang="en-US" sz="1400" dirty="0" err="1"/>
+              <a:t>Valgrind</a:t>
+            </a:r>
+            <a:r>
+              <a:rPr lang="en-US" sz="1400" dirty="0"/>
+              <a:t> also mentions the possibility to extend, but I think it is very complicated and one should have very well knowledge of low-level programming (including GNU assembly) for handling </a:t>
+            </a:r>
+            <a:r>
+              <a:rPr lang="en-US" sz="1400" dirty="0" err="1"/>
+              <a:t>Valgrind</a:t>
+            </a:r>
+            <a:r>
+              <a:rPr lang="en-US" sz="1400" dirty="0"/>
+              <a:t> code. To clone and play with </a:t>
+            </a:r>
+            <a:r>
+              <a:rPr lang="en-US" sz="1400" dirty="0" err="1"/>
+              <a:t>Valgrind</a:t>
+            </a:r>
+            <a:r>
+              <a:rPr lang="en-US" sz="1400" dirty="0"/>
+              <a:t> code one can use the command: ‘</a:t>
+            </a:r>
+            <a:r>
+              <a:rPr lang="en-US" sz="1400" dirty="0" err="1"/>
+              <a:t>git</a:t>
+            </a:r>
+            <a:r>
+              <a:rPr lang="en-US" sz="1400" dirty="0"/>
+              <a:t> clone </a:t>
+            </a:r>
+            <a:r>
+              <a:rPr lang="en-US" sz="1400" dirty="0" err="1"/>
+              <a:t>git</a:t>
+            </a:r>
+            <a:r>
+              <a:rPr lang="en-US" sz="1400" dirty="0"/>
+              <a:t>://sourceware.org/</a:t>
+            </a:r>
+            <a:r>
+              <a:rPr lang="en-US" sz="1400" dirty="0" err="1"/>
+              <a:t>git</a:t>
+            </a:r>
+            <a:r>
+              <a:rPr lang="en-US" sz="1400" dirty="0"/>
+              <a:t>/</a:t>
+            </a:r>
+            <a:r>
+              <a:rPr lang="en-US" sz="1400" dirty="0" err="1"/>
+              <a:t>valgrind.git</a:t>
+            </a:r>
+            <a:r>
+              <a:rPr lang="en-US" sz="1400" dirty="0" smtClean="0"/>
+              <a:t>’.</a:t>
+            </a:r>
+            <a:r>
+              <a:rPr lang="en-US" dirty="0" smtClean="0"/>
+              <a:t> </a:t>
+            </a:r>
+          </a:p>
+          <a:p>
+            <a:r>
+              <a:rPr lang="en-US" sz="1900" dirty="0" err="1"/>
+              <a:t>Valgrind</a:t>
+            </a:r>
+            <a:r>
+              <a:rPr lang="en-US" sz="1900" dirty="0"/>
+              <a:t> starts applications in the virtual environment where all instructions of applications are trapped by </a:t>
+            </a:r>
+            <a:r>
+              <a:rPr lang="en-US" sz="1900" dirty="0" err="1"/>
+              <a:t>Valgrind</a:t>
+            </a:r>
+            <a:r>
+              <a:rPr lang="en-US" sz="1900" dirty="0"/>
+              <a:t>, then analyzed and only after that the instructions </a:t>
+            </a:r>
+            <a:r>
               <a:rPr lang="en-US" sz="1900" dirty="0" smtClean="0"/>
-              <a:t>Supporting XDR RPC windows version.</a:t>
-            </a:r>
-          </a:p>
-          <a:p>
-            <a:r>
-              <a:rPr lang="en-US" sz="1900" dirty="0" smtClean="0"/>
-              <a:t>Contribution to port DOOCS client library to Windows.</a:t>
-            </a:r>
-          </a:p>
-          <a:p>
-            <a:r>
-              <a:rPr lang="en-US" sz="1900" dirty="0" smtClean="0"/>
-              <a:t>DOOCS server library </a:t>
-            </a:r>
-            <a:r>
-              <a:rPr lang="en-US" sz="1900" dirty="0"/>
-              <a:t>preparation and support </a:t>
-            </a:r>
-            <a:r>
-              <a:rPr lang="en-US" sz="1900" dirty="0" smtClean="0"/>
-              <a:t>for Windows.</a:t>
+              <a:t>executed.</a:t>
+            </a:r>
+          </a:p>
+          <a:p>
+            <a:pPr lvl="1"/>
+            <a:r>
+              <a:rPr lang="en-US" sz="1400" dirty="0" smtClean="0"/>
+              <a:t>This is the reason of slowing down the application dramatically</a:t>
+            </a:r>
+          </a:p>
+          <a:p>
+            <a:pPr lvl="1"/>
+            <a:r>
+              <a:rPr lang="en-US" sz="1400" dirty="0" smtClean="0"/>
+              <a:t>This allows to investigate memory overflow issues by analyzing read/write instructions and by comparing memory size with read/write size in the instruction.</a:t>
             </a:r>
             <a:br>
-              <a:rPr lang="en-US" sz="1900" dirty="0" smtClean="0"/>
+              <a:rPr lang="en-US" sz="1400" dirty="0" smtClean="0"/>
             </a:br>
             <a:r>
-              <a:rPr lang="en-US" sz="1900" dirty="0"/>
-              <a:t>For server library repository was forked and code modified to make it possible to compile it for Windows.</a:t>
-            </a:r>
-            <a:endParaRPr lang="en-US" sz="1900" dirty="0" smtClean="0"/>
-          </a:p>
-          <a:p>
-            <a:pPr marL="0" indent="0">
-              <a:buNone/>
-            </a:pPr>
-            <a:endParaRPr lang="en-US" sz="1900" dirty="0" smtClean="0"/>
-          </a:p>
-          <a:p>
-            <a:pPr marL="0" indent="0">
-              <a:buNone/>
-            </a:pPr>
-            <a:r>
-              <a:rPr lang="en-US" sz="2300" b="1" dirty="0" smtClean="0"/>
-              <a:t>Plans</a:t>
-            </a:r>
-            <a:endParaRPr lang="en-US" sz="2300" b="1" dirty="0"/>
-          </a:p>
-          <a:p>
-            <a:r>
-              <a:rPr lang="en-US" sz="1900" dirty="0" smtClean="0"/>
-              <a:t>Finalize DOOCS client part modification for making it available for Windows compilation using Microsoft compiler and finally bring it to official support by DOOCS </a:t>
-            </a:r>
-            <a:r>
-              <a:rPr lang="en-US" sz="1900" dirty="0" err="1" smtClean="0"/>
-              <a:t>devs</a:t>
-            </a:r>
-            <a:r>
-              <a:rPr lang="en-US" sz="1900" dirty="0" smtClean="0"/>
-              <a:t>.</a:t>
-            </a:r>
-          </a:p>
-          <a:p>
-            <a:r>
-              <a:rPr lang="en-US" sz="1900" dirty="0" smtClean="0"/>
-              <a:t>DOOCS client utilities (currently they are compiled from forked codes).</a:t>
-            </a:r>
-          </a:p>
-          <a:p>
-            <a:r>
-              <a:rPr lang="en-US" sz="1900" dirty="0"/>
-              <a:t>DOOCS server library (make original code compatible with Windows).</a:t>
-            </a:r>
-            <a:endParaRPr lang="en-US" sz="1900" dirty="0" smtClean="0"/>
-          </a:p>
-          <a:p>
-            <a:r>
-              <a:rPr lang="en-US" sz="1900" dirty="0" smtClean="0"/>
-              <a:t>DOOCS standard servers (watchdog for example (we are using a fork of Windows DOOCS watchdog)).</a:t>
-            </a:r>
-            <a:endParaRPr lang="de-DE" sz="1900" dirty="0"/>
+              <a:rPr lang="en-US" sz="1400" dirty="0"/>
+              <a:t/>
+            </a:r>
+            <a:br>
+              <a:rPr lang="en-US" sz="1400" dirty="0"/>
+            </a:br>
+            <a:r>
+              <a:rPr lang="en-US" sz="1400" dirty="0" smtClean="0"/>
+              <a:t>So if we have suspension that crash is there because of memory overflow </a:t>
+            </a:r>
+            <a:r>
+              <a:rPr lang="en-US" sz="1400" dirty="0" err="1" smtClean="0"/>
+              <a:t>Valgrid</a:t>
+            </a:r>
+            <a:r>
+              <a:rPr lang="en-US" sz="1400" dirty="0" smtClean="0"/>
+              <a:t> should be used (or </a:t>
+            </a:r>
+            <a:r>
+              <a:rPr lang="en-US" sz="1400" dirty="0" err="1" smtClean="0"/>
+              <a:t>Valgrind</a:t>
+            </a:r>
+            <a:r>
+              <a:rPr lang="en-US" sz="1400" dirty="0" smtClean="0"/>
+              <a:t> also should be used alongside with other tools)</a:t>
+            </a:r>
+            <a:endParaRPr lang="de-DE" sz="1400" dirty="0"/>
           </a:p>
         </p:txBody>
       </p:sp>
+      <p:grpSp>
+        <p:nvGrpSpPr>
+          <p:cNvPr id="5" name="Group 4"/>
+          <p:cNvGrpSpPr/>
+          <p:nvPr/>
+        </p:nvGrpSpPr>
+        <p:grpSpPr>
+          <a:xfrm>
+            <a:off x="4118346" y="1466945"/>
+            <a:ext cx="4359350" cy="1341881"/>
+            <a:chOff x="4593265" y="1698808"/>
+            <a:chExt cx="4359350" cy="1341881"/>
+          </a:xfrm>
+        </p:grpSpPr>
+        <p:pic>
+          <p:nvPicPr>
+            <p:cNvPr id="1026" name="Picture 2"/>
+            <p:cNvPicPr>
+              <a:picLocks noChangeAspect="1" noChangeArrowheads="1"/>
+            </p:cNvPicPr>
+            <p:nvPr/>
+          </p:nvPicPr>
+          <p:blipFill>
+            <a:blip r:embed="rId2">
+              <a:extLst>
+                <a:ext uri="{28A0092B-C50C-407E-A947-70E740481C1C}">
+                  <a14:useLocalDpi xmlns:a14="http://schemas.microsoft.com/office/drawing/2010/main" val="0"/>
+                </a:ext>
+              </a:extLst>
+            </a:blip>
+            <a:srcRect/>
+            <a:stretch>
+              <a:fillRect/>
+            </a:stretch>
+          </p:blipFill>
+          <p:spPr bwMode="auto">
+            <a:xfrm>
+              <a:off x="4593265" y="1698808"/>
+              <a:ext cx="4359350" cy="1341881"/>
+            </a:xfrm>
+            <a:prstGeom prst="rect">
+              <a:avLst/>
+            </a:prstGeom>
+            <a:noFill/>
+            <a:ln>
+              <a:noFill/>
+            </a:ln>
+            <a:extLst>
+              <a:ext uri="{909E8E84-426E-40DD-AFC4-6F175D3DCCD1}">
+                <a14:hiddenFill xmlns:a14="http://schemas.microsoft.com/office/drawing/2010/main">
+                  <a:solidFill>
+                    <a:schemeClr val="accent1"/>
+                  </a:solidFill>
+                </a14:hiddenFill>
+              </a:ext>
+              <a:ext uri="{91240B29-F687-4F45-9708-019B960494DF}">
+                <a14:hiddenLine xmlns:a14="http://schemas.microsoft.com/office/drawing/2010/main" w="9525">
+                  <a:solidFill>
+                    <a:schemeClr val="tx1"/>
+                  </a:solidFill>
+                  <a:miter lim="800000"/>
+                  <a:headEnd/>
+                  <a:tailEnd/>
+                </a14:hiddenLine>
+              </a:ext>
+            </a:extLst>
+          </p:spPr>
+        </p:pic>
+        <p:sp>
+          <p:nvSpPr>
+            <p:cNvPr id="4" name="TextBox 3"/>
+            <p:cNvSpPr txBox="1"/>
+            <p:nvPr/>
+          </p:nvSpPr>
+          <p:spPr>
+            <a:xfrm>
+              <a:off x="6315670" y="2572658"/>
+              <a:ext cx="2516451" cy="276999"/>
+            </a:xfrm>
+            <a:prstGeom prst="rect">
+              <a:avLst/>
+            </a:prstGeom>
+            <a:noFill/>
+            <a:ln>
+              <a:solidFill>
+                <a:schemeClr val="accent1"/>
+              </a:solidFill>
+            </a:ln>
+          </p:spPr>
+          <p:txBody>
+            <a:bodyPr wrap="square" rtlCol="0">
+              <a:spAutoFit/>
+            </a:bodyPr>
+            <a:lstStyle/>
+            <a:p>
+              <a:r>
+                <a:rPr lang="de-DE" sz="1200" dirty="0">
+                  <a:hlinkClick r:id="rId3"/>
+                </a:rPr>
+                <a:t>https://</a:t>
+              </a:r>
+              <a:r>
+                <a:rPr lang="de-DE" sz="1200" dirty="0" smtClean="0">
+                  <a:hlinkClick r:id="rId3"/>
+                </a:rPr>
+                <a:t>valgrind.org/info/about.html</a:t>
+              </a:r>
+              <a:r>
+                <a:rPr lang="de-DE" sz="1200" dirty="0" smtClean="0"/>
+                <a:t> </a:t>
+              </a:r>
+              <a:endParaRPr lang="de-DE" sz="1200" dirty="0"/>
+            </a:p>
+          </p:txBody>
+        </p:sp>
+      </p:grpSp>
     </p:spTree>
     <p:extLst>
       <p:ext uri="{BB962C8B-B14F-4D97-AF65-F5344CB8AC3E}">
-        <p14:creationId xmlns:p14="http://schemas.microsoft.com/office/powerpoint/2010/main" val="3003147533"/>
+        <p14:creationId xmlns:p14="http://schemas.microsoft.com/office/powerpoint/2010/main" val="3242676761"/>
       </p:ext>
     </p:extLst>
   </p:cSld>
   <p:clrMapOvr>
     <a:masterClrMapping/>
   </p:clrMapOvr>
-  <p:timing>
-    <p:tnLst>
-      <p:par>
-        <p:cTn id="1" dur="indefinite" restart="never" nodeType="tmRoot"/>
-      </p:par>
-    </p:tnLst>
-  </p:timing>
-</p:sld>
-</file>
-
-<file path=ppt/slides/slide8.xml><?xml version="1.0" encoding="utf-8"?>
-<p:sld xmlns:a="http://schemas.openxmlformats.org/drawingml/2006/main" xmlns:r="http://schemas.openxmlformats.org/officeDocument/2006/relationships" xmlns:p="http://schemas.openxmlformats.org/presentationml/2006/main">
-  <p:cSld>
-    <p:spTree>
-      <p:nvGrpSpPr>
-        <p:cNvPr id="1" name=""/>
-        <p:cNvGrpSpPr/>
-        <p:nvPr/>
-      </p:nvGrpSpPr>
-      <p:grpSpPr>
-        <a:xfrm>
-          <a:off x="0" y="0"/>
-          <a:ext cx="0" cy="0"/>
-          <a:chOff x="0" y="0"/>
-          <a:chExt cx="0" cy="0"/>
-        </a:xfrm>
-      </p:grpSpPr>
-      <p:sp>
-        <p:nvSpPr>
-          <p:cNvPr id="2" name="Title 1"/>
-          <p:cNvSpPr>
-            <a:spLocks noGrp="1"/>
-          </p:cNvSpPr>
-          <p:nvPr>
-            <p:ph type="title"/>
-          </p:nvPr>
-        </p:nvSpPr>
-        <p:spPr/>
-        <p:txBody>
-          <a:bodyPr/>
-          <a:lstStyle/>
-          <a:p>
-            <a:r>
-              <a:rPr lang="en-US" dirty="0" err="1" smtClean="0"/>
-              <a:t>Emwiz</a:t>
-            </a:r>
-            <a:r>
-              <a:rPr lang="en-US" dirty="0" smtClean="0"/>
-              <a:t> migration from SL6 to SL7</a:t>
-            </a:r>
-            <a:endParaRPr lang="de-DE" dirty="0"/>
-          </a:p>
-        </p:txBody>
-      </p:sp>
-      <p:sp>
-        <p:nvSpPr>
-          <p:cNvPr id="3" name="Content Placeholder 2"/>
-          <p:cNvSpPr>
-            <a:spLocks noGrp="1"/>
-          </p:cNvSpPr>
-          <p:nvPr>
-            <p:ph idx="1"/>
-          </p:nvPr>
-        </p:nvSpPr>
-        <p:spPr/>
-        <p:txBody>
-          <a:bodyPr/>
-          <a:lstStyle/>
-          <a:p>
-            <a:r>
-              <a:rPr lang="en-US" dirty="0" smtClean="0"/>
-              <a:t>Prepared </a:t>
-            </a:r>
-            <a:r>
-              <a:rPr lang="en-US" dirty="0" err="1" smtClean="0"/>
-              <a:t>qtRoot</a:t>
-            </a:r>
-            <a:r>
-              <a:rPr lang="en-US" dirty="0" smtClean="0"/>
-              <a:t> for SL7 </a:t>
-            </a:r>
-            <a:r>
-              <a:rPr lang="en-US" smtClean="0"/>
-              <a:t>currently needed </a:t>
-            </a:r>
-            <a:r>
-              <a:rPr lang="en-US" dirty="0" smtClean="0"/>
-              <a:t>for plotting</a:t>
-            </a:r>
-          </a:p>
-          <a:p>
-            <a:r>
-              <a:rPr lang="en-US" dirty="0" smtClean="0"/>
-              <a:t>Fixed some bugs</a:t>
-            </a:r>
-            <a:endParaRPr lang="de-DE" dirty="0"/>
-          </a:p>
-        </p:txBody>
-      </p:sp>
-    </p:spTree>
-    <p:extLst>
-      <p:ext uri="{BB962C8B-B14F-4D97-AF65-F5344CB8AC3E}">
-        <p14:creationId xmlns:p14="http://schemas.microsoft.com/office/powerpoint/2010/main" val="2336198926"/>
-      </p:ext>
-    </p:extLst>
-  </p:cSld>
-  <p:clrMapOvr>
-    <a:masterClrMapping/>
-  </p:clrMapOvr>
-  <p:timing>
-    <p:tnLst>
-      <p:par>
-        <p:cTn id="1" dur="indefinite" restart="never" nodeType="tmRoot"/>
-      </p:par>
-    </p:tnLst>
-  </p:timing>
-</p:sld>
-</file>
-
-<file path=ppt/slides/slide9.xml><?xml version="1.0" encoding="utf-8"?>
-<p:sld xmlns:a="http://schemas.openxmlformats.org/drawingml/2006/main" xmlns:r="http://schemas.openxmlformats.org/officeDocument/2006/relationships" xmlns:p="http://schemas.openxmlformats.org/presentationml/2006/main">
-  <p:cSld>
-    <p:spTree>
-      <p:nvGrpSpPr>
-        <p:cNvPr id="1" name=""/>
-        <p:cNvGrpSpPr/>
-        <p:nvPr/>
-      </p:nvGrpSpPr>
-      <p:grpSpPr>
-        <a:xfrm>
-          <a:off x="0" y="0"/>
-          <a:ext cx="0" cy="0"/>
-          <a:chOff x="0" y="0"/>
-          <a:chExt cx="0" cy="0"/>
-        </a:xfrm>
-      </p:grpSpPr>
-      <p:sp>
-        <p:nvSpPr>
-          <p:cNvPr id="2" name="Title 1"/>
-          <p:cNvSpPr>
-            <a:spLocks noGrp="1"/>
-          </p:cNvSpPr>
-          <p:nvPr>
-            <p:ph type="title"/>
-          </p:nvPr>
-        </p:nvSpPr>
-        <p:spPr/>
-        <p:txBody>
-          <a:bodyPr/>
-          <a:lstStyle/>
-          <a:p>
-            <a:r>
-              <a:rPr lang="en-US" dirty="0" smtClean="0"/>
-              <a:t>Migration from VME crates to newer technologies</a:t>
-            </a:r>
-            <a:endParaRPr lang="de-DE" dirty="0"/>
-          </a:p>
-        </p:txBody>
-      </p:sp>
-      <p:sp>
-        <p:nvSpPr>
-          <p:cNvPr id="3" name="Content Placeholder 2"/>
-          <p:cNvSpPr>
-            <a:spLocks noGrp="1"/>
-          </p:cNvSpPr>
-          <p:nvPr>
-            <p:ph idx="1"/>
-          </p:nvPr>
-        </p:nvSpPr>
-        <p:spPr/>
-        <p:txBody>
-          <a:bodyPr/>
-          <a:lstStyle/>
-          <a:p>
-            <a:r>
-              <a:rPr lang="en-US" dirty="0"/>
-              <a:t>Took part in the migration of several devices from VME to </a:t>
-            </a:r>
-            <a:r>
-              <a:rPr lang="en-US" dirty="0" err="1" smtClean="0"/>
-              <a:t>mTCA</a:t>
-            </a:r>
-            <a:r>
-              <a:rPr lang="en-US" dirty="0" smtClean="0"/>
-              <a:t>.</a:t>
-            </a:r>
-          </a:p>
-          <a:p>
-            <a:r>
-              <a:rPr lang="en-US" dirty="0"/>
-              <a:t>Migration of control of </a:t>
-            </a:r>
-            <a:r>
-              <a:rPr lang="en-US" dirty="0" err="1"/>
-              <a:t>Micos</a:t>
-            </a:r>
-            <a:r>
-              <a:rPr lang="en-US" dirty="0"/>
-              <a:t> motor controllers </a:t>
-            </a:r>
-            <a:r>
-              <a:rPr lang="en-US" dirty="0" smtClean="0"/>
-              <a:t/>
-            </a:r>
-            <a:br>
-              <a:rPr lang="en-US" dirty="0" smtClean="0"/>
-            </a:br>
-            <a:r>
-              <a:rPr lang="en-US" dirty="0" smtClean="0"/>
-              <a:t>from </a:t>
-            </a:r>
-            <a:r>
-              <a:rPr lang="en-US" dirty="0"/>
-              <a:t>VME crates to raspberry pi based newer </a:t>
-            </a:r>
-            <a:r>
-              <a:rPr lang="en-US" dirty="0" smtClean="0"/>
-              <a:t/>
-            </a:r>
-            <a:br>
-              <a:rPr lang="en-US" dirty="0" smtClean="0"/>
-            </a:br>
-            <a:r>
-              <a:rPr lang="en-US" dirty="0" smtClean="0"/>
-              <a:t>controller </a:t>
-            </a:r>
-            <a:r>
-              <a:rPr lang="en-US" dirty="0"/>
-              <a:t>box is ongoing.</a:t>
-            </a:r>
-            <a:endParaRPr lang="en-US" dirty="0" smtClean="0"/>
-          </a:p>
-          <a:p>
-            <a:pPr marL="0" indent="0">
-              <a:buNone/>
-            </a:pPr>
-            <a:r>
-              <a:rPr lang="en-US" sz="2400" b="1" dirty="0" smtClean="0"/>
-              <a:t>Plans</a:t>
-            </a:r>
-          </a:p>
-          <a:p>
-            <a:r>
-              <a:rPr lang="en-US" dirty="0" smtClean="0"/>
-              <a:t>DRS4 Evaluation </a:t>
-            </a:r>
-            <a:r>
-              <a:rPr lang="en-US" dirty="0"/>
-              <a:t>board </a:t>
-            </a:r>
-            <a:r>
-              <a:rPr lang="en-US" dirty="0" smtClean="0"/>
-              <a:t/>
-            </a:r>
-            <a:br>
-              <a:rPr lang="en-US" dirty="0" smtClean="0"/>
-            </a:br>
-            <a:r>
-              <a:rPr lang="en-US" dirty="0" smtClean="0"/>
-              <a:t>(</a:t>
-            </a:r>
-            <a:r>
-              <a:rPr lang="en-US" dirty="0">
-                <a:hlinkClick r:id="rId2"/>
-              </a:rPr>
-              <a:t>https://www.psi.ch/en/drs/evaluation-board</a:t>
-            </a:r>
-            <a:r>
-              <a:rPr lang="en-US" dirty="0" smtClean="0"/>
-              <a:t>) </a:t>
-            </a:r>
-            <a:br>
-              <a:rPr lang="en-US" dirty="0" smtClean="0"/>
-            </a:br>
-            <a:r>
-              <a:rPr lang="en-US" dirty="0" smtClean="0"/>
-              <a:t>integration to PITZ control</a:t>
-            </a:r>
-            <a:r>
-              <a:rPr lang="en-US" dirty="0"/>
-              <a:t> </a:t>
-            </a:r>
-            <a:r>
-              <a:rPr lang="en-US" dirty="0" smtClean="0"/>
-              <a:t>system </a:t>
-            </a:r>
-            <a:endParaRPr lang="en-US" dirty="0"/>
-          </a:p>
-          <a:p>
-            <a:endParaRPr lang="de-DE" dirty="0"/>
-          </a:p>
-        </p:txBody>
-      </p:sp>
-      <p:pic>
-        <p:nvPicPr>
-          <p:cNvPr id="5" name="Picture 4"/>
-          <p:cNvPicPr>
-            <a:picLocks noChangeAspect="1"/>
-          </p:cNvPicPr>
-          <p:nvPr/>
-        </p:nvPicPr>
-        <p:blipFill>
-          <a:blip r:embed="rId3" cstate="print">
-            <a:extLst>
-              <a:ext uri="{28A0092B-C50C-407E-A947-70E740481C1C}">
-                <a14:useLocalDpi xmlns:a14="http://schemas.microsoft.com/office/drawing/2010/main" val="0"/>
-              </a:ext>
-            </a:extLst>
-          </a:blip>
-          <a:stretch>
-            <a:fillRect/>
-          </a:stretch>
-        </p:blipFill>
-        <p:spPr>
-          <a:xfrm rot="5400000">
-            <a:off x="5600091" y="2388616"/>
-            <a:ext cx="4244163" cy="2387342"/>
-          </a:xfrm>
-          <a:prstGeom prst="rect">
-            <a:avLst/>
-          </a:prstGeom>
-        </p:spPr>
-      </p:pic>
-      <p:pic>
-        <p:nvPicPr>
-          <p:cNvPr id="1028" name="Picture 4"/>
-          <p:cNvPicPr>
-            <a:picLocks noChangeAspect="1" noChangeArrowheads="1"/>
-          </p:cNvPicPr>
-          <p:nvPr/>
-        </p:nvPicPr>
-        <p:blipFill>
-          <a:blip r:embed="rId4">
-            <a:extLst>
-              <a:ext uri="{28A0092B-C50C-407E-A947-70E740481C1C}">
-                <a14:useLocalDpi xmlns:a14="http://schemas.microsoft.com/office/drawing/2010/main" val="0"/>
-              </a:ext>
-            </a:extLst>
-          </a:blip>
-          <a:srcRect/>
-          <a:stretch>
-            <a:fillRect/>
-          </a:stretch>
-        </p:blipFill>
-        <p:spPr bwMode="auto">
-          <a:xfrm>
-            <a:off x="388164" y="4097078"/>
-            <a:ext cx="1830496" cy="2480283"/>
-          </a:xfrm>
-          <a:prstGeom prst="rect">
-            <a:avLst/>
-          </a:prstGeom>
-          <a:noFill/>
-          <a:ln>
-            <a:noFill/>
-          </a:ln>
-          <a:extLst>
-            <a:ext uri="{909E8E84-426E-40DD-AFC4-6F175D3DCCD1}">
-              <a14:hiddenFill xmlns:a14="http://schemas.microsoft.com/office/drawing/2010/main">
-                <a:solidFill>
-                  <a:schemeClr val="accent1"/>
-                </a:solidFill>
-              </a14:hiddenFill>
-            </a:ext>
-            <a:ext uri="{91240B29-F687-4F45-9708-019B960494DF}">
-              <a14:hiddenLine xmlns:a14="http://schemas.microsoft.com/office/drawing/2010/main" w="9525">
-                <a:solidFill>
-                  <a:schemeClr val="tx1"/>
-                </a:solidFill>
-                <a:miter lim="800000"/>
-                <a:headEnd/>
-                <a:tailEnd/>
-              </a14:hiddenLine>
-            </a:ext>
-          </a:extLst>
-        </p:spPr>
-      </p:pic>
-    </p:spTree>
-    <p:extLst>
-      <p:ext uri="{BB962C8B-B14F-4D97-AF65-F5344CB8AC3E}">
-        <p14:creationId xmlns:p14="http://schemas.microsoft.com/office/powerpoint/2010/main" val="1627304125"/>
-      </p:ext>
-    </p:extLst>
-  </p:cSld>
-  <p:clrMapOvr>
-    <a:masterClrMapping/>
-  </p:clrMapOvr>
-  <p:timing>
-    <p:tnLst>
-      <p:par>
-        <p:cTn id="1" dur="indefinite" restart="never" nodeType="tmRoot"/>
-      </p:par>
-    </p:tnLst>
-  </p:timing>
 </p:sld>
 </file>
 

</xml_diff>

<commit_message>
presentation preparation is ongoing
</commit_message>
<xml_diff>
--- a/docs/crash_investigations.pptx
+++ b/docs/crash_investigations.pptx
@@ -11,8 +11,8 @@
     <p:sldId id="263" r:id="rId2"/>
     <p:sldId id="335" r:id="rId3"/>
     <p:sldId id="336" r:id="rId4"/>
-    <p:sldId id="337" r:id="rId5"/>
-    <p:sldId id="338" r:id="rId6"/>
+    <p:sldId id="338" r:id="rId5"/>
+    <p:sldId id="339" r:id="rId6"/>
   </p:sldIdLst>
   <p:sldSz cx="9144000" cy="6858000" type="screen4x3"/>
   <p:notesSz cx="7104063" cy="10234613"/>
@@ -3777,7 +3777,6 @@
               <a:rPr lang="en-US" dirty="0" smtClean="0"/>
               <a:t>)</a:t>
             </a:r>
-            <a:endParaRPr lang="en-US" dirty="0" smtClean="0"/>
           </a:p>
           <a:p>
             <a:pPr lvl="1"/>
@@ -3896,20 +3895,25 @@
             <p:ph idx="1"/>
           </p:nvPr>
         </p:nvSpPr>
-        <p:spPr/>
+        <p:spPr>
+          <a:xfrm>
+            <a:off x="198474" y="850605"/>
+            <a:ext cx="8754140" cy="5273747"/>
+          </a:xfrm>
+        </p:spPr>
         <p:txBody>
           <a:bodyPr/>
           <a:lstStyle/>
           <a:p>
             <a:r>
-              <a:rPr lang="en-US" dirty="0" smtClean="0"/>
+              <a:rPr lang="en-US" sz="1750" dirty="0" smtClean="0"/>
               <a:t>Meaning of colors in the below list</a:t>
             </a:r>
           </a:p>
           <a:p>
             <a:pPr lvl="1"/>
             <a:r>
-              <a:rPr lang="en-US" dirty="0">
+              <a:rPr lang="en-US" sz="1450" dirty="0">
                 <a:solidFill>
                   <a:srgbClr val="339933"/>
                 </a:solidFill>
@@ -3917,18 +3921,18 @@
               <a:t>Green</a:t>
             </a:r>
             <a:r>
-              <a:rPr lang="en-US" dirty="0"/>
+              <a:rPr lang="en-US" sz="1450" dirty="0"/>
               <a:t>: possible to investigate with the newly created crash </a:t>
             </a:r>
             <a:r>
-              <a:rPr lang="en-US" dirty="0" smtClean="0"/>
+              <a:rPr lang="en-US" sz="1450" dirty="0" smtClean="0"/>
               <a:t>investigator.</a:t>
             </a:r>
           </a:p>
           <a:p>
             <a:pPr lvl="1"/>
             <a:r>
-              <a:rPr lang="en-US" dirty="0" smtClean="0">
+              <a:rPr lang="en-US" sz="1450" dirty="0" smtClean="0">
                 <a:solidFill>
                   <a:srgbClr val="FFC000"/>
                 </a:solidFill>
@@ -3936,14 +3940,14 @@
               <a:t>Yellow</a:t>
             </a:r>
             <a:r>
-              <a:rPr lang="en-US" dirty="0" smtClean="0"/>
+              <a:rPr lang="en-US" sz="1450" dirty="0" smtClean="0"/>
               <a:t>: theoretically possible to investigate but not implemented.</a:t>
             </a:r>
           </a:p>
           <a:p>
             <a:pPr lvl="1"/>
             <a:r>
-              <a:rPr lang="en-US" dirty="0" smtClean="0">
+              <a:rPr lang="en-US" sz="1450" dirty="0" smtClean="0">
                 <a:solidFill>
                   <a:srgbClr val="FF0000"/>
                 </a:solidFill>
@@ -3951,25 +3955,25 @@
               <a:t>Red</a:t>
             </a:r>
             <a:r>
-              <a:rPr lang="en-US" dirty="0" smtClean="0"/>
+              <a:rPr lang="en-US" sz="1450" dirty="0" smtClean="0"/>
               <a:t>: not possible to investigate.</a:t>
             </a:r>
           </a:p>
           <a:p>
             <a:pPr lvl="1"/>
             <a:r>
-              <a:rPr lang="en-US" dirty="0" smtClean="0"/>
+              <a:rPr lang="en-US" sz="1450" dirty="0" smtClean="0"/>
               <a:t>All cases are possible to investigate by </a:t>
             </a:r>
             <a:r>
-              <a:rPr lang="en-US" dirty="0" err="1" smtClean="0"/>
+              <a:rPr lang="en-US" sz="1450" dirty="0" err="1" smtClean="0"/>
               <a:t>Valgrind</a:t>
             </a:r>
             <a:r>
-              <a:rPr lang="en-US" dirty="0" smtClean="0"/>
+              <a:rPr lang="en-US" sz="1450" dirty="0" smtClean="0"/>
               <a:t> (even red cases)!</a:t>
             </a:r>
-            <a:endParaRPr lang="en-US" dirty="0">
+            <a:endParaRPr lang="en-US" sz="1450" dirty="0">
               <a:solidFill>
                 <a:srgbClr val="FFCC00"/>
               </a:solidFill>
@@ -3977,7 +3981,7 @@
           </a:p>
           <a:p>
             <a:r>
-              <a:rPr lang="en-US" dirty="0" smtClean="0">
+              <a:rPr lang="en-US" sz="1750" dirty="0" smtClean="0">
                 <a:solidFill>
                   <a:srgbClr val="FFCC00"/>
                 </a:solidFill>
@@ -3985,7 +3989,7 @@
               <a:t>Memory </a:t>
             </a:r>
             <a:r>
-              <a:rPr lang="en-US" dirty="0">
+              <a:rPr lang="en-US" sz="1750" dirty="0">
                 <a:solidFill>
                   <a:srgbClr val="FFCC00"/>
                 </a:solidFill>
@@ -3993,7 +3997,7 @@
               <a:t>leak: this will not lead to a crash but after a long run there will not be available memory for the proper functionality of an </a:t>
             </a:r>
             <a:r>
-              <a:rPr lang="en-US" dirty="0" smtClean="0">
+              <a:rPr lang="en-US" sz="1750" dirty="0" smtClean="0">
                 <a:solidFill>
                   <a:srgbClr val="FFCC00"/>
                 </a:solidFill>
@@ -4003,7 +4007,7 @@
           </a:p>
           <a:p>
             <a:r>
-              <a:rPr lang="en-US" dirty="0" smtClean="0">
+              <a:rPr lang="en-US" sz="1750" dirty="0" smtClean="0">
                 <a:solidFill>
                   <a:srgbClr val="339933"/>
                 </a:solidFill>
@@ -4011,24 +4015,64 @@
               <a:t>Double free issue: Most probably this will immediately crash the application.</a:t>
             </a:r>
             <a:r>
-              <a:rPr lang="en-US" dirty="0" smtClean="0"/>
+              <a:rPr lang="en-US" sz="1750" dirty="0" smtClean="0"/>
               <a:t> </a:t>
             </a:r>
-          </a:p>
-          <a:p>
-            <a:r>
-              <a:rPr lang="en-US" dirty="0">
+            <a:endParaRPr lang="en-US" sz="1750" dirty="0" smtClean="0"/>
+          </a:p>
+          <a:p>
+            <a:r>
+              <a:rPr lang="en-US" sz="1750" dirty="0" smtClean="0">
+                <a:solidFill>
+                  <a:srgbClr val="339933"/>
+                </a:solidFill>
+              </a:rPr>
+              <a:t>Allocation - deallocation mismatch</a:t>
+            </a:r>
+            <a:r>
+              <a:rPr lang="en-US" sz="1750" dirty="0">
+                <a:solidFill>
+                  <a:srgbClr val="339933"/>
+                </a:solidFill>
+              </a:rPr>
+              <a:t>: this is the case when memory is allocated using one method and memory is freed by the other method (for example new/free, new[]/delete, etc.). Similar errors will lead to crashes in some cases. Most crashes will happen immediately after corruption.</a:t>
+            </a:r>
+            <a:endParaRPr lang="en-US" sz="1750" dirty="0" smtClean="0">
+              <a:solidFill>
+                <a:srgbClr val="339933"/>
+              </a:solidFill>
+            </a:endParaRPr>
+          </a:p>
+          <a:p>
+            <a:r>
+              <a:rPr lang="en-US" sz="1750" dirty="0">
                 <a:solidFill>
                   <a:srgbClr val="FF0000"/>
                 </a:solidFill>
               </a:rPr>
-              <a:t>Memory overrun issue: This is a very hard detectable issue because they crash applications not immediately and not always. They crash applications when the memory behind allocated memory is responsible for sensitive data. Usually, the crash happens not during the bad call with overrun, but later when the mentioned sensitive memory is accessed.</a:t>
-            </a:r>
-            <a:r>
-              <a:rPr lang="en-US" dirty="0"/>
+              <a:t>Memory overrun issue: </a:t>
+            </a:r>
+            <a:r>
+              <a:rPr lang="en-US" sz="1750" dirty="0" smtClean="0">
+                <a:solidFill>
+                  <a:srgbClr val="FF0000"/>
+                </a:solidFill>
+              </a:rPr>
+              <a:t>this </a:t>
+            </a:r>
+            <a:r>
+              <a:rPr lang="en-US" sz="1750" dirty="0">
+                <a:solidFill>
+                  <a:srgbClr val="FF0000"/>
+                </a:solidFill>
+              </a:rPr>
+              <a:t>is a very hard detectable issue because they crash applications not immediately and not always. They crash applications when the memory behind allocated memory is responsible for sensitive data. Usually, the crash happens not during the bad call with overrun, but later when the mentioned sensitive memory is accessed.</a:t>
+            </a:r>
+            <a:r>
+              <a:rPr lang="en-US" sz="1750" dirty="0"/>
               <a:t> </a:t>
             </a:r>
-            <a:endParaRPr lang="de-DE" dirty="0"/>
+            <a:endParaRPr lang="de-DE" sz="1750" dirty="0"/>
           </a:p>
         </p:txBody>
       </p:sp>
@@ -4078,39 +4122,8 @@
           <a:lstStyle/>
           <a:p>
             <a:r>
-              <a:rPr lang="en-US" dirty="0" smtClean="0"/>
+              <a:rPr lang="en-US" dirty="0"/>
               <a:t>How </a:t>
-            </a:r>
-            <a:r>
-              <a:rPr lang="en-US" dirty="0" err="1" smtClean="0"/>
-              <a:t>Valgrind</a:t>
-            </a:r>
-            <a:r>
-              <a:rPr lang="en-US" dirty="0" smtClean="0"/>
-              <a:t> works (notes will be deleted)</a:t>
-            </a:r>
-            <a:endParaRPr lang="de-DE" dirty="0"/>
-          </a:p>
-        </p:txBody>
-      </p:sp>
-      <p:sp>
-        <p:nvSpPr>
-          <p:cNvPr id="3" name="Content Placeholder 2"/>
-          <p:cNvSpPr>
-            <a:spLocks noGrp="1"/>
-          </p:cNvSpPr>
-          <p:nvPr>
-            <p:ph idx="1"/>
-          </p:nvPr>
-        </p:nvSpPr>
-        <p:spPr/>
-        <p:txBody>
-          <a:bodyPr/>
-          <a:lstStyle/>
-          <a:p>
-            <a:r>
-              <a:rPr lang="en-US" dirty="0"/>
-              <a:t>So what's the catch? The main one is that programs run significantly more slowly under </a:t>
             </a:r>
             <a:r>
               <a:rPr lang="en-US" dirty="0" err="1"/>
@@ -4118,68 +4131,11 @@
             </a:r>
             <a:r>
               <a:rPr lang="en-US" dirty="0"/>
-              <a:t>. Depending on which tool you use, the slowdown factor can range from 5--100. </a:t>
-            </a:r>
-            <a:endParaRPr lang="de-DE" dirty="0"/>
-          </a:p>
-        </p:txBody>
-      </p:sp>
-    </p:spTree>
-    <p:extLst>
-      <p:ext uri="{BB962C8B-B14F-4D97-AF65-F5344CB8AC3E}">
-        <p14:creationId xmlns:p14="http://schemas.microsoft.com/office/powerpoint/2010/main" val="3162719548"/>
-      </p:ext>
-    </p:extLst>
-  </p:cSld>
-  <p:clrMapOvr>
-    <a:masterClrMapping/>
-  </p:clrMapOvr>
-</p:sld>
-</file>
-
-<file path=ppt/slides/slide5.xml><?xml version="1.0" encoding="utf-8"?>
-<p:sld xmlns:a="http://schemas.openxmlformats.org/drawingml/2006/main" xmlns:r="http://schemas.openxmlformats.org/officeDocument/2006/relationships" xmlns:p="http://schemas.openxmlformats.org/presentationml/2006/main">
-  <p:cSld>
-    <p:spTree>
-      <p:nvGrpSpPr>
-        <p:cNvPr id="1" name=""/>
-        <p:cNvGrpSpPr/>
-        <p:nvPr/>
-      </p:nvGrpSpPr>
-      <p:grpSpPr>
-        <a:xfrm>
-          <a:off x="0" y="0"/>
-          <a:ext cx="0" cy="0"/>
-          <a:chOff x="0" y="0"/>
-          <a:chExt cx="0" cy="0"/>
-        </a:xfrm>
-      </p:grpSpPr>
-      <p:sp>
-        <p:nvSpPr>
-          <p:cNvPr id="2" name="Title 1"/>
-          <p:cNvSpPr>
-            <a:spLocks noGrp="1"/>
-          </p:cNvSpPr>
-          <p:nvPr>
-            <p:ph type="title"/>
-          </p:nvPr>
-        </p:nvSpPr>
-        <p:spPr/>
-        <p:txBody>
-          <a:bodyPr/>
-          <a:lstStyle/>
-          <a:p>
-            <a:r>
-              <a:rPr lang="en-US" dirty="0"/>
-              <a:t>How </a:t>
-            </a:r>
-            <a:r>
-              <a:rPr lang="en-US" dirty="0" err="1"/>
-              <a:t>Valgrind</a:t>
-            </a:r>
-            <a:r>
-              <a:rPr lang="en-US" dirty="0"/>
-              <a:t> works</a:t>
+              <a:t> </a:t>
+            </a:r>
+            <a:r>
+              <a:rPr lang="en-US" dirty="0" smtClean="0"/>
+              <a:t>works. Reasons to have something else</a:t>
             </a:r>
             <a:endParaRPr lang="de-DE" dirty="0"/>
           </a:p>
@@ -4206,62 +4162,62 @@
           <a:lstStyle/>
           <a:p>
             <a:r>
-              <a:rPr lang="en-US" sz="1900" dirty="0"/>
+              <a:rPr lang="en-US" sz="1750" dirty="0"/>
               <a:t>In the previous slide, there was a note that </a:t>
             </a:r>
             <a:r>
-              <a:rPr lang="en-US" sz="1900" dirty="0" err="1"/>
+              <a:rPr lang="en-US" sz="1750" dirty="0" err="1"/>
               <a:t>Valgrind</a:t>
             </a:r>
             <a:r>
-              <a:rPr lang="en-US" sz="1900" dirty="0"/>
+              <a:rPr lang="en-US" sz="1750" dirty="0"/>
               <a:t> works for all mentioned cases. Then the question arises why do we need something else?</a:t>
             </a:r>
-            <a:endParaRPr lang="en-US" sz="1900" dirty="0" smtClean="0"/>
+            <a:endParaRPr lang="en-US" sz="1750" dirty="0" smtClean="0"/>
           </a:p>
           <a:p>
             <a:pPr lvl="1"/>
             <a:r>
-              <a:rPr lang="en-US" sz="1400" dirty="0" smtClean="0"/>
+              <a:rPr lang="en-US" sz="1250" dirty="0" smtClean="0"/>
               <a:t>It slows down application 5-100 times.</a:t>
             </a:r>
           </a:p>
           <a:p>
             <a:pPr lvl="1"/>
             <a:r>
-              <a:rPr lang="en-US" sz="1400" dirty="0" smtClean="0"/>
+              <a:rPr lang="en-US" sz="1250" dirty="0" smtClean="0"/>
               <a:t>Installation is needed and I’m not sure</a:t>
             </a:r>
             <a:br>
-              <a:rPr lang="en-US" sz="1400" dirty="0" smtClean="0"/>
+              <a:rPr lang="en-US" sz="1250" dirty="0" smtClean="0"/>
             </a:br>
             <a:r>
-              <a:rPr lang="en-US" sz="1400" dirty="0" smtClean="0"/>
+              <a:rPr lang="en-US" sz="1250" dirty="0" smtClean="0"/>
               <a:t>if we will have permission to install</a:t>
             </a:r>
             <a:br>
-              <a:rPr lang="en-US" sz="1400" dirty="0" smtClean="0"/>
+              <a:rPr lang="en-US" sz="1250" dirty="0" smtClean="0"/>
             </a:br>
             <a:r>
-              <a:rPr lang="en-US" sz="1400" dirty="0" err="1" smtClean="0"/>
+              <a:rPr lang="en-US" sz="1250" dirty="0" err="1" smtClean="0"/>
               <a:t>Valgrind</a:t>
             </a:r>
             <a:r>
-              <a:rPr lang="en-US" sz="1400" dirty="0" smtClean="0"/>
+              <a:rPr lang="en-US" sz="1250" dirty="0" smtClean="0"/>
               <a:t> on our server hosts.</a:t>
             </a:r>
           </a:p>
           <a:p>
             <a:pPr lvl="1"/>
             <a:r>
-              <a:rPr lang="en-US" sz="1400" dirty="0" smtClean="0"/>
+              <a:rPr lang="en-US" sz="1250" dirty="0" smtClean="0"/>
               <a:t>Missing details on some moments in </a:t>
             </a:r>
             <a:br>
-              <a:rPr lang="en-US" sz="1400" dirty="0" smtClean="0"/>
+              <a:rPr lang="en-US" sz="1250" dirty="0" smtClean="0"/>
             </a:br>
             <a:r>
-              <a:rPr lang="en-US" sz="1400" dirty="0" smtClean="0"/>
+              <a:rPr lang="en-US" sz="1250" dirty="0" smtClean="0"/>
               <a:t>some cases (details will be presented later).</a:t>
             </a:r>
             <a:r>
@@ -4272,136 +4228,158 @@
           <a:p>
             <a:pPr lvl="1"/>
             <a:r>
-              <a:rPr lang="en-US" sz="1400" dirty="0"/>
+              <a:rPr lang="en-US" sz="1250" dirty="0"/>
               <a:t>Easy extendibility. </a:t>
             </a:r>
             <a:r>
-              <a:rPr lang="en-US" sz="1400" dirty="0" err="1"/>
+              <a:rPr lang="en-US" sz="1250" dirty="0" err="1"/>
               <a:t>Valgrind</a:t>
             </a:r>
             <a:r>
-              <a:rPr lang="en-US" sz="1400" dirty="0"/>
+              <a:rPr lang="en-US" sz="1250" dirty="0"/>
               <a:t> also mentions the possibility to extend, but I think it is very complicated and one should have very well knowledge of low-level programming (including GNU assembly) for handling </a:t>
             </a:r>
             <a:r>
-              <a:rPr lang="en-US" sz="1400" dirty="0" err="1"/>
+              <a:rPr lang="en-US" sz="1250" dirty="0" err="1"/>
               <a:t>Valgrind</a:t>
             </a:r>
             <a:r>
-              <a:rPr lang="en-US" sz="1400" dirty="0"/>
+              <a:rPr lang="en-US" sz="1250" dirty="0"/>
               <a:t> code. To clone and play with </a:t>
             </a:r>
             <a:r>
-              <a:rPr lang="en-US" sz="1400" dirty="0" err="1"/>
+              <a:rPr lang="en-US" sz="1250" dirty="0" err="1"/>
               <a:t>Valgrind</a:t>
             </a:r>
             <a:r>
-              <a:rPr lang="en-US" sz="1400" dirty="0"/>
+              <a:rPr lang="en-US" sz="1250" dirty="0"/>
               <a:t> code one can use the command: ‘</a:t>
             </a:r>
             <a:r>
-              <a:rPr lang="en-US" sz="1400" dirty="0" err="1"/>
+              <a:rPr lang="en-US" sz="1250" dirty="0" err="1"/>
               <a:t>git</a:t>
             </a:r>
             <a:r>
-              <a:rPr lang="en-US" sz="1400" dirty="0"/>
+              <a:rPr lang="en-US" sz="1250" dirty="0"/>
               <a:t> clone </a:t>
             </a:r>
             <a:r>
-              <a:rPr lang="en-US" sz="1400" dirty="0" err="1"/>
+              <a:rPr lang="en-US" sz="1250" dirty="0" err="1"/>
               <a:t>git</a:t>
             </a:r>
             <a:r>
-              <a:rPr lang="en-US" sz="1400" dirty="0"/>
+              <a:rPr lang="en-US" sz="1250" dirty="0"/>
               <a:t>://sourceware.org/</a:t>
             </a:r>
             <a:r>
-              <a:rPr lang="en-US" sz="1400" dirty="0" err="1"/>
+              <a:rPr lang="en-US" sz="1250" dirty="0" err="1"/>
               <a:t>git</a:t>
             </a:r>
             <a:r>
-              <a:rPr lang="en-US" sz="1400" dirty="0"/>
+              <a:rPr lang="en-US" sz="1250" dirty="0"/>
               <a:t>/</a:t>
             </a:r>
             <a:r>
-              <a:rPr lang="en-US" sz="1400" dirty="0" err="1"/>
+              <a:rPr lang="en-US" sz="1250" dirty="0" err="1"/>
               <a:t>valgrind.git</a:t>
             </a:r>
             <a:r>
-              <a:rPr lang="en-US" sz="1400" dirty="0" smtClean="0"/>
+              <a:rPr lang="en-US" sz="1250" dirty="0" smtClean="0"/>
               <a:t>’.</a:t>
             </a:r>
             <a:r>
               <a:rPr lang="en-US" dirty="0" smtClean="0"/>
               <a:t> </a:t>
             </a:r>
-          </a:p>
-          <a:p>
-            <a:r>
-              <a:rPr lang="en-US" sz="1900" dirty="0" err="1"/>
+            <a:endParaRPr lang="en-US" dirty="0" smtClean="0"/>
+          </a:p>
+          <a:p>
+            <a:pPr lvl="1"/>
+            <a:r>
+              <a:rPr lang="en-US" sz="1250" dirty="0" smtClean="0"/>
+              <a:t>Runtime extendibility !!!</a:t>
+            </a:r>
+            <a:endParaRPr lang="en-US" sz="1250" dirty="0" smtClean="0"/>
+          </a:p>
+          <a:p>
+            <a:r>
+              <a:rPr lang="en-US" sz="1750" dirty="0" err="1"/>
               <a:t>Valgrind</a:t>
             </a:r>
             <a:r>
-              <a:rPr lang="en-US" sz="1900" dirty="0"/>
+              <a:rPr lang="en-US" sz="1750" dirty="0"/>
               <a:t> starts applications in the virtual environment where all instructions of applications are trapped by </a:t>
             </a:r>
             <a:r>
-              <a:rPr lang="en-US" sz="1900" dirty="0" err="1"/>
+              <a:rPr lang="en-US" sz="1750" dirty="0" err="1"/>
               <a:t>Valgrind</a:t>
             </a:r>
             <a:r>
-              <a:rPr lang="en-US" sz="1900" dirty="0"/>
+              <a:rPr lang="en-US" sz="1750" dirty="0"/>
               <a:t>, then analyzed and only after that the instructions </a:t>
             </a:r>
             <a:r>
-              <a:rPr lang="en-US" sz="1900" dirty="0" smtClean="0"/>
+              <a:rPr lang="en-US" sz="1750" dirty="0" smtClean="0"/>
               <a:t>executed.</a:t>
             </a:r>
           </a:p>
           <a:p>
             <a:pPr lvl="1"/>
             <a:r>
-              <a:rPr lang="en-US" sz="1400" dirty="0" smtClean="0"/>
-              <a:t>This is the reason of slowing down the application dramatically</a:t>
-            </a:r>
+              <a:rPr lang="en-US" sz="1250" dirty="0" smtClean="0"/>
+              <a:t>This is the reason of slowing down the application </a:t>
+            </a:r>
+            <a:r>
+              <a:rPr lang="en-US" sz="1250" dirty="0" smtClean="0"/>
+              <a:t>dramatically.</a:t>
+            </a:r>
+            <a:endParaRPr lang="en-US" sz="1250" dirty="0" smtClean="0"/>
           </a:p>
           <a:p>
             <a:pPr lvl="1"/>
             <a:r>
-              <a:rPr lang="en-US" sz="1400" dirty="0" smtClean="0"/>
+              <a:rPr lang="en-US" sz="1250" dirty="0" smtClean="0"/>
               <a:t>This allows to investigate memory overflow issues by analyzing read/write instructions and by comparing memory size with read/write size in the instruction.</a:t>
             </a:r>
             <a:br>
-              <a:rPr lang="en-US" sz="1400" dirty="0" smtClean="0"/>
+              <a:rPr lang="en-US" sz="1250" dirty="0" smtClean="0"/>
             </a:br>
             <a:r>
-              <a:rPr lang="en-US" sz="1400" dirty="0"/>
+              <a:rPr lang="en-US" sz="1250" dirty="0" smtClean="0"/>
               <a:t/>
             </a:r>
             <a:br>
-              <a:rPr lang="en-US" sz="1400" dirty="0"/>
+              <a:rPr lang="en-US" sz="1250" dirty="0" smtClean="0"/>
             </a:br>
             <a:r>
-              <a:rPr lang="en-US" sz="1400" dirty="0" smtClean="0"/>
-              <a:t>So if we have suspension that crash is there because of memory overflow </a:t>
-            </a:r>
-            <a:r>
-              <a:rPr lang="en-US" sz="1400" dirty="0" err="1" smtClean="0"/>
+              <a:rPr lang="en-US" sz="1250" dirty="0" smtClean="0"/>
+              <a:t>So </a:t>
+            </a:r>
+            <a:r>
+              <a:rPr lang="en-US" sz="1250" dirty="0" smtClean="0"/>
+              <a:t>if we have suspension that crash is there because of memory overflow </a:t>
+            </a:r>
+            <a:r>
+              <a:rPr lang="en-US" sz="1250" dirty="0" err="1" smtClean="0"/>
               <a:t>Valgrid</a:t>
             </a:r>
             <a:r>
-              <a:rPr lang="en-US" sz="1400" dirty="0" smtClean="0"/>
+              <a:rPr lang="en-US" sz="1250" dirty="0" smtClean="0"/>
               <a:t> should be used (or </a:t>
             </a:r>
             <a:r>
-              <a:rPr lang="en-US" sz="1400" dirty="0" err="1" smtClean="0"/>
+              <a:rPr lang="en-US" sz="1250" dirty="0" err="1" smtClean="0"/>
               <a:t>Valgrind</a:t>
             </a:r>
             <a:r>
-              <a:rPr lang="en-US" sz="1400" dirty="0" smtClean="0"/>
-              <a:t> also should be used alongside with other tools)</a:t>
-            </a:r>
-            <a:endParaRPr lang="de-DE" sz="1400" dirty="0"/>
+              <a:rPr lang="en-US" sz="1250" dirty="0" smtClean="0"/>
+              <a:t> also should be used alongside with other tools</a:t>
+            </a:r>
+            <a:r>
+              <a:rPr lang="en-US" sz="1250" dirty="0" smtClean="0"/>
+              <a:t>).</a:t>
+            </a:r>
+            <a:endParaRPr lang="de-DE" sz="1250" dirty="0"/>
           </a:p>
         </p:txBody>
       </p:sp>
@@ -4413,7 +4391,7 @@
         </p:nvGrpSpPr>
         <p:grpSpPr>
           <a:xfrm>
-            <a:off x="4118346" y="1466945"/>
+            <a:off x="4189226" y="1466945"/>
             <a:ext cx="4359350" cy="1341881"/>
             <a:chOff x="4593265" y="1698808"/>
             <a:chExt cx="4359350" cy="1341881"/>
@@ -4525,6 +4503,199 @@
     <p:extLst>
       <p:ext uri="{BB962C8B-B14F-4D97-AF65-F5344CB8AC3E}">
         <p14:creationId xmlns:p14="http://schemas.microsoft.com/office/powerpoint/2010/main" val="3242676761"/>
+      </p:ext>
+    </p:extLst>
+  </p:cSld>
+  <p:clrMapOvr>
+    <a:masterClrMapping/>
+  </p:clrMapOvr>
+</p:sld>
+</file>
+
+<file path=ppt/slides/slide5.xml><?xml version="1.0" encoding="utf-8"?>
+<p:sld xmlns:a="http://schemas.openxmlformats.org/drawingml/2006/main" xmlns:r="http://schemas.openxmlformats.org/officeDocument/2006/relationships" xmlns:p="http://schemas.openxmlformats.org/presentationml/2006/main">
+  <p:cSld>
+    <p:spTree>
+      <p:nvGrpSpPr>
+        <p:cNvPr id="1" name=""/>
+        <p:cNvGrpSpPr/>
+        <p:nvPr/>
+      </p:nvGrpSpPr>
+      <p:grpSpPr>
+        <a:xfrm>
+          <a:off x="0" y="0"/>
+          <a:ext cx="0" cy="0"/>
+          <a:chOff x="0" y="0"/>
+          <a:chExt cx="0" cy="0"/>
+        </a:xfrm>
+      </p:grpSpPr>
+      <p:sp>
+        <p:nvSpPr>
+          <p:cNvPr id="2" name="Title 1"/>
+          <p:cNvSpPr>
+            <a:spLocks noGrp="1"/>
+          </p:cNvSpPr>
+          <p:nvPr>
+            <p:ph type="title"/>
+          </p:nvPr>
+        </p:nvSpPr>
+        <p:spPr/>
+        <p:txBody>
+          <a:bodyPr/>
+          <a:lstStyle/>
+          <a:p>
+            <a:r>
+              <a:rPr lang="en-US" dirty="0" smtClean="0"/>
+              <a:t>What is the idea behind</a:t>
+            </a:r>
+            <a:endParaRPr lang="de-DE" dirty="0"/>
+          </a:p>
+        </p:txBody>
+      </p:sp>
+      <p:sp>
+        <p:nvSpPr>
+          <p:cNvPr id="3" name="Content Placeholder 2"/>
+          <p:cNvSpPr>
+            <a:spLocks noGrp="1"/>
+          </p:cNvSpPr>
+          <p:nvPr>
+            <p:ph idx="1"/>
+          </p:nvPr>
+        </p:nvSpPr>
+        <p:spPr/>
+        <p:txBody>
+          <a:bodyPr/>
+          <a:lstStyle/>
+          <a:p>
+            <a:r>
+              <a:rPr lang="en-US" dirty="0"/>
+              <a:t>Overloading </a:t>
+            </a:r>
+            <a:r>
+              <a:rPr lang="en-US" dirty="0" smtClean="0"/>
+              <a:t>C++ operators new </a:t>
+            </a:r>
+            <a:r>
+              <a:rPr lang="en-US" dirty="0"/>
+              <a:t>(</a:t>
+            </a:r>
+            <a:r>
+              <a:rPr lang="en-US" dirty="0">
+                <a:hlinkClick r:id="rId2"/>
+              </a:rPr>
+              <a:t>https://</a:t>
+            </a:r>
+            <a:r>
+              <a:rPr lang="en-US" dirty="0" smtClean="0">
+                <a:hlinkClick r:id="rId2"/>
+              </a:rPr>
+              <a:t>en.cppreference.com/w/cpp/memory/new/operator_new</a:t>
+            </a:r>
+            <a:r>
+              <a:rPr lang="en-US" dirty="0" smtClean="0"/>
+              <a:t>) and delete </a:t>
+            </a:r>
+            <a:r>
+              <a:rPr lang="en-US" dirty="0"/>
+              <a:t>(</a:t>
+            </a:r>
+            <a:r>
+              <a:rPr lang="en-US" dirty="0">
+                <a:hlinkClick r:id="rId3"/>
+              </a:rPr>
+              <a:t>https://</a:t>
+            </a:r>
+            <a:r>
+              <a:rPr lang="en-US" dirty="0" smtClean="0">
+                <a:hlinkClick r:id="rId3"/>
+              </a:rPr>
+              <a:t>en.cppreference.com/w/cpp/memory/new/operator_delete</a:t>
+            </a:r>
+            <a:r>
+              <a:rPr lang="en-US" dirty="0" smtClean="0"/>
+              <a:t>).</a:t>
+            </a:r>
+            <a:r>
+              <a:rPr lang="en-US" dirty="0"/>
+              <a:t/>
+            </a:r>
+            <a:br>
+              <a:rPr lang="en-US" dirty="0"/>
+            </a:br>
+            <a:r>
+              <a:rPr lang="en-US" dirty="0"/>
+              <a:t>Sometimes only overwriting of these functions can help to detect problems. If the problem is there because of C functions (</a:t>
+            </a:r>
+            <a:r>
+              <a:rPr lang="en-US" dirty="0" err="1"/>
+              <a:t>malloc</a:t>
+            </a:r>
+            <a:r>
+              <a:rPr lang="en-US" dirty="0"/>
+              <a:t> and friends), then these overloads will not be helpful.  </a:t>
+            </a:r>
+            <a:endParaRPr lang="en-US" dirty="0" smtClean="0"/>
+          </a:p>
+          <a:p>
+            <a:r>
+              <a:rPr lang="en-US" dirty="0" smtClean="0"/>
+              <a:t>Rewriting </a:t>
+            </a:r>
+            <a:r>
+              <a:rPr lang="en-US" dirty="0" err="1" smtClean="0"/>
+              <a:t>malloc</a:t>
+            </a:r>
+            <a:r>
+              <a:rPr lang="en-US" dirty="0" smtClean="0"/>
+              <a:t>, </a:t>
+            </a:r>
+            <a:r>
+              <a:rPr lang="en-US" dirty="0" err="1" smtClean="0"/>
+              <a:t>calloc</a:t>
+            </a:r>
+            <a:r>
+              <a:rPr lang="en-US" dirty="0" smtClean="0"/>
+              <a:t>, </a:t>
+            </a:r>
+            <a:r>
+              <a:rPr lang="en-US" dirty="0" err="1" smtClean="0"/>
+              <a:t>realloc</a:t>
+            </a:r>
+            <a:r>
+              <a:rPr lang="en-US" dirty="0" smtClean="0"/>
+              <a:t> and free.</a:t>
+            </a:r>
+            <a:r>
+              <a:rPr lang="en-US" dirty="0"/>
+              <a:t/>
+            </a:r>
+            <a:br>
+              <a:rPr lang="en-US" dirty="0"/>
+            </a:br>
+            <a:r>
+              <a:rPr lang="en-US" dirty="0"/>
+              <a:t>In case, if an application has its own </a:t>
+            </a:r>
+            <a:r>
+              <a:rPr lang="en-US" dirty="0" err="1"/>
+              <a:t>malloc</a:t>
+            </a:r>
+            <a:r>
+              <a:rPr lang="en-US" dirty="0"/>
+              <a:t> and friends function, then the application's functions will be called instead of Glibc functions. </a:t>
+            </a:r>
+            <a:r>
+              <a:rPr lang="en-US"/>
+              <a:t>This will happen because these functions are defined as weak symbols and any new symbol with the same name(s) will be used instead. </a:t>
+            </a:r>
+            <a:endParaRPr lang="de-DE" dirty="0"/>
+          </a:p>
+        </p:txBody>
+      </p:sp>
+    </p:spTree>
+    <p:extLst>
+      <p:ext uri="{BB962C8B-B14F-4D97-AF65-F5344CB8AC3E}">
+        <p14:creationId xmlns:p14="http://schemas.microsoft.com/office/powerpoint/2010/main" val="3765827145"/>
       </p:ext>
     </p:extLst>
   </p:cSld>

</xml_diff>

<commit_message>
some tests on ubuntu
</commit_message>
<xml_diff>
--- a/docs/crash_investigations.pptx
+++ b/docs/crash_investigations.pptx
@@ -5,7 +5,7 @@
     <p:sldMasterId id="2147483660" r:id="rId1"/>
   </p:sldMasterIdLst>
   <p:notesMasterIdLst>
-    <p:notesMasterId r:id="rId7"/>
+    <p:notesMasterId r:id="rId8"/>
   </p:notesMasterIdLst>
   <p:sldIdLst>
     <p:sldId id="263" r:id="rId2"/>
@@ -13,6 +13,7 @@
     <p:sldId id="336" r:id="rId4"/>
     <p:sldId id="338" r:id="rId5"/>
     <p:sldId id="339" r:id="rId6"/>
+    <p:sldId id="340" r:id="rId7"/>
   </p:sldIdLst>
   <p:sldSz cx="9144000" cy="6858000" type="screen4x3"/>
   <p:notesSz cx="7104063" cy="10234613"/>
@@ -4018,7 +4019,6 @@
               <a:rPr lang="en-US" sz="1750" dirty="0" smtClean="0"/>
               <a:t> </a:t>
             </a:r>
-            <a:endParaRPr lang="en-US" sz="1750" dirty="0" smtClean="0"/>
           </a:p>
           <a:p>
             <a:r>
@@ -4162,18 +4162,18 @@
           <a:lstStyle/>
           <a:p>
             <a:r>
-              <a:rPr lang="en-US" sz="1750" dirty="0"/>
+              <a:rPr lang="en-US" sz="1700" dirty="0"/>
               <a:t>In the previous slide, there was a note that </a:t>
             </a:r>
             <a:r>
-              <a:rPr lang="en-US" sz="1750" dirty="0" err="1"/>
+              <a:rPr lang="en-US" sz="1700" dirty="0" err="1"/>
               <a:t>Valgrind</a:t>
             </a:r>
             <a:r>
-              <a:rPr lang="en-US" sz="1750" dirty="0"/>
+              <a:rPr lang="en-US" sz="1700" dirty="0"/>
               <a:t> works for all mentioned cases. Then the question arises why do we need something else?</a:t>
             </a:r>
-            <a:endParaRPr lang="en-US" sz="1750" dirty="0" smtClean="0"/>
+            <a:endParaRPr lang="en-US" sz="1700" dirty="0" smtClean="0"/>
           </a:p>
           <a:p>
             <a:pPr lvl="1"/>
@@ -4291,35 +4291,45 @@
               <a:rPr lang="en-US" dirty="0" smtClean="0"/>
               <a:t> </a:t>
             </a:r>
-            <a:endParaRPr lang="en-US" dirty="0" smtClean="0"/>
           </a:p>
           <a:p>
             <a:pPr lvl="1"/>
             <a:r>
               <a:rPr lang="en-US" sz="1250" dirty="0" smtClean="0"/>
-              <a:t>Runtime extendibility !!!</a:t>
+              <a:t>Runtime extendibility </a:t>
+            </a:r>
+            <a:r>
+              <a:rPr lang="en-US" sz="1250" dirty="0" smtClean="0"/>
+              <a:t>!!!</a:t>
+            </a:r>
+          </a:p>
+          <a:p>
+            <a:pPr lvl="1"/>
+            <a:r>
+              <a:rPr lang="en-US" sz="1250" dirty="0" smtClean="0"/>
+              <a:t>Windows!!! (for Windows proof of concept app is done, but complete system is not prepared)</a:t>
             </a:r>
             <a:endParaRPr lang="en-US" sz="1250" dirty="0" smtClean="0"/>
           </a:p>
           <a:p>
             <a:r>
-              <a:rPr lang="en-US" sz="1750" dirty="0" err="1"/>
+              <a:rPr lang="en-US" sz="1700" dirty="0" err="1"/>
               <a:t>Valgrind</a:t>
             </a:r>
             <a:r>
-              <a:rPr lang="en-US" sz="1750" dirty="0"/>
+              <a:rPr lang="en-US" sz="1700" dirty="0"/>
               <a:t> starts applications in the virtual environment where all instructions of applications are trapped by </a:t>
             </a:r>
             <a:r>
-              <a:rPr lang="en-US" sz="1750" dirty="0" err="1"/>
+              <a:rPr lang="en-US" sz="1700" dirty="0" err="1"/>
               <a:t>Valgrind</a:t>
             </a:r>
             <a:r>
-              <a:rPr lang="en-US" sz="1750" dirty="0"/>
+              <a:rPr lang="en-US" sz="1700" dirty="0"/>
               <a:t>, then analyzed and only after that the instructions </a:t>
             </a:r>
             <a:r>
-              <a:rPr lang="en-US" sz="1750" dirty="0" smtClean="0"/>
+              <a:rPr lang="en-US" sz="1700" dirty="0" smtClean="0"/>
               <a:t>executed.</a:t>
             </a:r>
           </a:p>
@@ -4327,13 +4337,8 @@
             <a:pPr lvl="1"/>
             <a:r>
               <a:rPr lang="en-US" sz="1250" dirty="0" smtClean="0"/>
-              <a:t>This is the reason of slowing down the application </a:t>
-            </a:r>
-            <a:r>
-              <a:rPr lang="en-US" sz="1250" dirty="0" smtClean="0"/>
-              <a:t>dramatically.</a:t>
-            </a:r>
-            <a:endParaRPr lang="en-US" sz="1250" dirty="0" smtClean="0"/>
+              <a:t>This is the reason of slowing down the application dramatically.</a:t>
+            </a:r>
           </a:p>
           <a:p>
             <a:pPr lvl="1"/>
@@ -4345,19 +4350,15 @@
               <a:rPr lang="en-US" sz="1250" dirty="0" smtClean="0"/>
             </a:br>
             <a:r>
+              <a:rPr lang="en-US" sz="500" dirty="0" smtClean="0"/>
+              <a:t/>
+            </a:r>
+            <a:br>
+              <a:rPr lang="en-US" sz="500" dirty="0" smtClean="0"/>
+            </a:br>
+            <a:r>
               <a:rPr lang="en-US" sz="1250" dirty="0" smtClean="0"/>
-              <a:t/>
-            </a:r>
-            <a:br>
-              <a:rPr lang="en-US" sz="1250" dirty="0" smtClean="0"/>
-            </a:br>
-            <a:r>
-              <a:rPr lang="en-US" sz="1250" dirty="0" smtClean="0"/>
-              <a:t>So </a:t>
-            </a:r>
-            <a:r>
-              <a:rPr lang="en-US" sz="1250" dirty="0" smtClean="0"/>
-              <a:t>if we have suspension that crash is there because of memory overflow </a:t>
+              <a:t>So if we have suspension that crash is there because of memory overflow </a:t>
             </a:r>
             <a:r>
               <a:rPr lang="en-US" sz="1250" dirty="0" err="1" smtClean="0"/>
@@ -4373,11 +4374,7 @@
             </a:r>
             <a:r>
               <a:rPr lang="en-US" sz="1250" dirty="0" smtClean="0"/>
-              <a:t> also should be used alongside with other tools</a:t>
-            </a:r>
-            <a:r>
-              <a:rPr lang="en-US" sz="1250" dirty="0" smtClean="0"/>
-              <a:t>).</a:t>
+              <a:t> also should be used alongside with other tools).</a:t>
             </a:r>
             <a:endParaRPr lang="de-DE" sz="1250" dirty="0"/>
           </a:p>
@@ -4562,133 +4559,246 @@
             <p:ph idx="1"/>
           </p:nvPr>
         </p:nvSpPr>
-        <p:spPr/>
+        <p:spPr>
+          <a:xfrm>
+            <a:off x="99238" y="815163"/>
+            <a:ext cx="8966790" cy="5259572"/>
+          </a:xfrm>
+        </p:spPr>
         <p:txBody>
           <a:bodyPr/>
           <a:lstStyle/>
           <a:p>
-            <a:r>
-              <a:rPr lang="en-US" dirty="0"/>
+            <a:pPr marL="0" indent="0">
+              <a:buNone/>
+            </a:pPr>
+            <a:r>
+              <a:rPr lang="en-US" sz="1600" dirty="0" smtClean="0"/>
+              <a:t>In order to trap memory allocations functions and make some analyze the following should be done</a:t>
+            </a:r>
+          </a:p>
+          <a:p>
+            <a:r>
+              <a:rPr lang="en-US" sz="1600" dirty="0" smtClean="0"/>
               <a:t>Overloading </a:t>
             </a:r>
             <a:r>
-              <a:rPr lang="en-US" dirty="0" smtClean="0"/>
+              <a:rPr lang="en-US" sz="1600" dirty="0" smtClean="0"/>
               <a:t>C++ operators new </a:t>
             </a:r>
             <a:r>
-              <a:rPr lang="en-US" dirty="0"/>
+              <a:rPr lang="en-US" sz="1600" dirty="0"/>
               <a:t>(</a:t>
             </a:r>
             <a:r>
-              <a:rPr lang="en-US" dirty="0">
+              <a:rPr lang="en-US" sz="1600" dirty="0">
                 <a:hlinkClick r:id="rId2"/>
               </a:rPr>
               <a:t>https://</a:t>
             </a:r>
             <a:r>
-              <a:rPr lang="en-US" dirty="0" smtClean="0">
+              <a:rPr lang="en-US" sz="1600" dirty="0" smtClean="0">
                 <a:hlinkClick r:id="rId2"/>
               </a:rPr>
               <a:t>en.cppreference.com/w/cpp/memory/new/operator_new</a:t>
             </a:r>
             <a:r>
-              <a:rPr lang="en-US" dirty="0" smtClean="0"/>
+              <a:rPr lang="en-US" sz="1600" dirty="0" smtClean="0"/>
               <a:t>) and delete </a:t>
             </a:r>
             <a:r>
-              <a:rPr lang="en-US" dirty="0"/>
+              <a:rPr lang="en-US" sz="1600" dirty="0"/>
               <a:t>(</a:t>
             </a:r>
             <a:r>
-              <a:rPr lang="en-US" dirty="0">
+              <a:rPr lang="en-US" sz="1600" dirty="0">
                 <a:hlinkClick r:id="rId3"/>
               </a:rPr>
               <a:t>https://</a:t>
             </a:r>
             <a:r>
-              <a:rPr lang="en-US" dirty="0" smtClean="0">
+              <a:rPr lang="en-US" sz="1600" dirty="0" smtClean="0">
                 <a:hlinkClick r:id="rId3"/>
               </a:rPr>
               <a:t>en.cppreference.com/w/cpp/memory/new/operator_delete</a:t>
             </a:r>
             <a:r>
-              <a:rPr lang="en-US" dirty="0" smtClean="0"/>
+              <a:rPr lang="en-US" sz="1600" dirty="0" smtClean="0"/>
               <a:t>).</a:t>
             </a:r>
             <a:r>
-              <a:rPr lang="en-US" dirty="0"/>
+              <a:rPr lang="en-US" sz="1600" dirty="0"/>
               <a:t/>
             </a:r>
             <a:br>
-              <a:rPr lang="en-US" dirty="0"/>
+              <a:rPr lang="en-US" sz="1600" dirty="0"/>
             </a:br>
             <a:r>
-              <a:rPr lang="en-US" dirty="0"/>
+              <a:rPr lang="en-US" sz="1600" dirty="0"/>
               <a:t>Sometimes only overwriting of these functions can help to detect problems. If the problem is there because of C functions (</a:t>
             </a:r>
             <a:r>
-              <a:rPr lang="en-US" dirty="0" err="1"/>
+              <a:rPr lang="en-US" sz="1600" dirty="0" err="1"/>
               <a:t>malloc</a:t>
             </a:r>
             <a:r>
-              <a:rPr lang="en-US" dirty="0"/>
+              <a:rPr lang="en-US" sz="1600" dirty="0"/>
               <a:t> and friends), then these overloads will not be helpful.  </a:t>
             </a:r>
-            <a:endParaRPr lang="en-US" dirty="0" smtClean="0"/>
-          </a:p>
-          <a:p>
-            <a:r>
-              <a:rPr lang="en-US" dirty="0" smtClean="0"/>
+            <a:endParaRPr lang="en-US" sz="1600" dirty="0" smtClean="0"/>
+          </a:p>
+          <a:p>
+            <a:r>
+              <a:rPr lang="en-US" sz="1600" dirty="0" smtClean="0"/>
               <a:t>Rewriting </a:t>
             </a:r>
             <a:r>
-              <a:rPr lang="en-US" dirty="0" err="1" smtClean="0"/>
+              <a:rPr lang="en-US" sz="1600" dirty="0" err="1" smtClean="0"/>
               <a:t>malloc</a:t>
             </a:r>
             <a:r>
-              <a:rPr lang="en-US" dirty="0" smtClean="0"/>
+              <a:rPr lang="en-US" sz="1600" dirty="0" smtClean="0"/>
               <a:t>, </a:t>
             </a:r>
             <a:r>
-              <a:rPr lang="en-US" dirty="0" err="1" smtClean="0"/>
+              <a:rPr lang="en-US" sz="1600" dirty="0" err="1" smtClean="0"/>
               <a:t>calloc</a:t>
             </a:r>
             <a:r>
-              <a:rPr lang="en-US" dirty="0" smtClean="0"/>
+              <a:rPr lang="en-US" sz="1600" dirty="0" smtClean="0"/>
               <a:t>, </a:t>
             </a:r>
             <a:r>
-              <a:rPr lang="en-US" dirty="0" err="1" smtClean="0"/>
+              <a:rPr lang="en-US" sz="1600" dirty="0" err="1" smtClean="0"/>
               <a:t>realloc</a:t>
             </a:r>
             <a:r>
-              <a:rPr lang="en-US" dirty="0" smtClean="0"/>
+              <a:rPr lang="en-US" sz="1600" dirty="0" smtClean="0"/>
               <a:t> and free.</a:t>
             </a:r>
             <a:r>
-              <a:rPr lang="en-US" dirty="0"/>
+              <a:rPr lang="en-US" sz="1600" dirty="0"/>
               <a:t/>
             </a:r>
             <a:br>
-              <a:rPr lang="en-US" dirty="0"/>
+              <a:rPr lang="en-US" sz="1600" dirty="0"/>
             </a:br>
             <a:r>
-              <a:rPr lang="en-US" dirty="0"/>
+              <a:rPr lang="en-US" sz="1600" dirty="0"/>
               <a:t>In case, if an application has its own </a:t>
             </a:r>
             <a:r>
-              <a:rPr lang="en-US" dirty="0" err="1"/>
+              <a:rPr lang="en-US" sz="1600" dirty="0" err="1"/>
               <a:t>malloc</a:t>
             </a:r>
             <a:r>
-              <a:rPr lang="en-US" dirty="0"/>
-              <a:t> and friends function, then the application's functions will be called instead of Glibc functions. </a:t>
-            </a:r>
-            <a:r>
-              <a:rPr lang="en-US"/>
-              <a:t>This will happen because these functions are defined as weak symbols and any new symbol with the same name(s) will be used instead. </a:t>
-            </a:r>
-            <a:endParaRPr lang="de-DE" dirty="0"/>
+              <a:rPr lang="en-US" sz="1600" dirty="0"/>
+              <a:t> and friends function, then the application's functions will be called instead of Glibc functions. This will happen because these functions are defined as weak symbols and any new symbol with the same name(s) will be used instead. </a:t>
+            </a:r>
+            <a:r>
+              <a:rPr lang="en-US" sz="1600" dirty="0"/>
+              <a:t>This is true only for Linux, for Windows hacking </a:t>
+            </a:r>
+            <a:r>
+              <a:rPr lang="en-US" sz="1600" dirty="0" err="1"/>
+              <a:t>malloc</a:t>
+            </a:r>
+            <a:r>
+              <a:rPr lang="en-US" sz="1600" dirty="0"/>
+              <a:t> is more complicated and a topic for a separate discussion</a:t>
+            </a:r>
+            <a:r>
+              <a:rPr lang="en-US" sz="1600" dirty="0" smtClean="0"/>
+              <a:t>.</a:t>
+            </a:r>
+          </a:p>
+          <a:p>
+            <a:r>
+              <a:rPr lang="en-US" sz="1600" dirty="0"/>
+              <a:t>In order to load the analyzer library to the already compiled process address space without recompilation - the following techniques are used</a:t>
+            </a:r>
+            <a:r>
+              <a:rPr lang="en-US" sz="1600" dirty="0" smtClean="0"/>
+              <a:t> </a:t>
+            </a:r>
+            <a:r>
+              <a:rPr lang="en-US" sz="1600" dirty="0"/>
+              <a:t>(</a:t>
+            </a:r>
+            <a:r>
+              <a:rPr lang="en-US" sz="1550" dirty="0">
+                <a:hlinkClick r:id="rId4"/>
+              </a:rPr>
+              <a:t>https://</a:t>
+            </a:r>
+            <a:r>
+              <a:rPr lang="en-US" sz="1550" dirty="0" smtClean="0">
+                <a:hlinkClick r:id="rId4"/>
+              </a:rPr>
+              <a:t>en.wikipedia.org/wiki/DLL_injection</a:t>
+            </a:r>
+            <a:r>
+              <a:rPr lang="en-US" sz="1600" dirty="0" smtClean="0"/>
+              <a:t>)</a:t>
+            </a:r>
+            <a:endParaRPr lang="de-DE" sz="1600" dirty="0"/>
+          </a:p>
+          <a:p>
+            <a:pPr lvl="1"/>
+            <a:r>
+              <a:rPr lang="en-US" sz="1200" dirty="0" smtClean="0"/>
+              <a:t>Linux: LD_PRELOAD environment variable</a:t>
+            </a:r>
+          </a:p>
+          <a:p>
+            <a:pPr lvl="1"/>
+            <a:r>
+              <a:rPr lang="en-US" sz="1200" dirty="0" smtClean="0"/>
+              <a:t>Windows: DLL injection</a:t>
+            </a:r>
+          </a:p>
+          <a:p>
+            <a:pPr lvl="2"/>
+            <a:r>
+              <a:rPr lang="en-US" sz="900" dirty="0" smtClean="0"/>
+              <a:t>1. Using  </a:t>
+            </a:r>
+            <a:r>
+              <a:rPr lang="en-US" sz="900" dirty="0" err="1" smtClean="0"/>
+              <a:t>WriteProcessMemory+CreateRemoteThread</a:t>
+            </a:r>
+            <a:r>
+              <a:rPr lang="en-US" sz="900" dirty="0" smtClean="0"/>
+              <a:t> or</a:t>
+            </a:r>
+          </a:p>
+          <a:p>
+            <a:pPr lvl="2"/>
+            <a:r>
+              <a:rPr lang="en-US" sz="900" dirty="0" smtClean="0"/>
+              <a:t>2. Using registry “</a:t>
+            </a:r>
+            <a:r>
+              <a:rPr lang="de-DE" sz="900" dirty="0"/>
+              <a:t>HKEY_LOCAL_MACHINE\SOFTWARE\Microsoft\Windows NT\</a:t>
+            </a:r>
+            <a:r>
+              <a:rPr lang="de-DE" sz="900" dirty="0" err="1"/>
+              <a:t>CurrentVersion</a:t>
+            </a:r>
+            <a:r>
+              <a:rPr lang="de-DE" sz="900" dirty="0"/>
+              <a:t>\Windows\</a:t>
+            </a:r>
+            <a:r>
+              <a:rPr lang="de-DE" sz="900" dirty="0" err="1"/>
+              <a:t>AppInit_DLLs</a:t>
+            </a:r>
+            <a:r>
+              <a:rPr lang="en-US" sz="900" dirty="0" smtClean="0"/>
+              <a:t>”</a:t>
+            </a:r>
+            <a:endParaRPr lang="en-US" sz="900" dirty="0"/>
           </a:p>
         </p:txBody>
       </p:sp>
@@ -4696,6 +4806,82 @@
     <p:extLst>
       <p:ext uri="{BB962C8B-B14F-4D97-AF65-F5344CB8AC3E}">
         <p14:creationId xmlns:p14="http://schemas.microsoft.com/office/powerpoint/2010/main" val="3765827145"/>
+      </p:ext>
+    </p:extLst>
+  </p:cSld>
+  <p:clrMapOvr>
+    <a:masterClrMapping/>
+  </p:clrMapOvr>
+</p:sld>
+</file>
+
+<file path=ppt/slides/slide6.xml><?xml version="1.0" encoding="utf-8"?>
+<p:sld xmlns:a="http://schemas.openxmlformats.org/drawingml/2006/main" xmlns:r="http://schemas.openxmlformats.org/officeDocument/2006/relationships" xmlns:p="http://schemas.openxmlformats.org/presentationml/2006/main">
+  <p:cSld>
+    <p:spTree>
+      <p:nvGrpSpPr>
+        <p:cNvPr id="1" name=""/>
+        <p:cNvGrpSpPr/>
+        <p:nvPr/>
+      </p:nvGrpSpPr>
+      <p:grpSpPr>
+        <a:xfrm>
+          <a:off x="0" y="0"/>
+          <a:ext cx="0" cy="0"/>
+          <a:chOff x="0" y="0"/>
+          <a:chExt cx="0" cy="0"/>
+        </a:xfrm>
+      </p:grpSpPr>
+      <p:sp>
+        <p:nvSpPr>
+          <p:cNvPr id="2" name="Title 1"/>
+          <p:cNvSpPr>
+            <a:spLocks noGrp="1"/>
+          </p:cNvSpPr>
+          <p:nvPr>
+            <p:ph type="title"/>
+          </p:nvPr>
+        </p:nvSpPr>
+        <p:spPr/>
+        <p:txBody>
+          <a:bodyPr/>
+          <a:lstStyle/>
+          <a:p>
+            <a:r>
+              <a:rPr lang="en-US" dirty="0" smtClean="0"/>
+              <a:t>Missing details in the </a:t>
+            </a:r>
+            <a:r>
+              <a:rPr lang="en-US" dirty="0" err="1" smtClean="0"/>
+              <a:t>Valgrind</a:t>
+            </a:r>
+            <a:endParaRPr lang="de-DE" dirty="0"/>
+          </a:p>
+        </p:txBody>
+      </p:sp>
+      <p:sp>
+        <p:nvSpPr>
+          <p:cNvPr id="3" name="Content Placeholder 2"/>
+          <p:cNvSpPr>
+            <a:spLocks noGrp="1"/>
+          </p:cNvSpPr>
+          <p:nvPr>
+            <p:ph idx="1"/>
+          </p:nvPr>
+        </p:nvSpPr>
+        <p:spPr/>
+        <p:txBody>
+          <a:bodyPr/>
+          <a:lstStyle/>
+          <a:p>
+            <a:endParaRPr lang="de-DE"/>
+          </a:p>
+        </p:txBody>
+      </p:sp>
+    </p:spTree>
+    <p:extLst>
+      <p:ext uri="{BB962C8B-B14F-4D97-AF65-F5344CB8AC3E}">
+        <p14:creationId xmlns:p14="http://schemas.microsoft.com/office/powerpoint/2010/main" val="3213707003"/>
       </p:ext>
     </p:extLst>
   </p:cSld>

</xml_diff>

<commit_message>
added last version of presentation
</commit_message>
<xml_diff>
--- a/docs/crash_investigations.pptx
+++ b/docs/crash_investigations.pptx
@@ -4211,14 +4211,97 @@
             <a:pPr lvl="1"/>
             <a:r>
               <a:rPr lang="en-US" sz="1250" dirty="0" smtClean="0"/>
-              <a:t>Missing details on some moments in </a:t>
+              <a:t>Easy </a:t>
+            </a:r>
+            <a:r>
+              <a:rPr lang="en-US" sz="1250" dirty="0"/>
+              <a:t>extendibility. </a:t>
+            </a:r>
+            <a:r>
+              <a:rPr lang="en-US" sz="1250" dirty="0" err="1"/>
+              <a:t>Valgrind</a:t>
+            </a:r>
+            <a:r>
+              <a:rPr lang="en-US" sz="1250" dirty="0"/>
+              <a:t> also mentions the </a:t>
+            </a:r>
+            <a:r>
+              <a:rPr lang="en-US" sz="1250" dirty="0" smtClean="0"/>
+              <a:t/>
             </a:r>
             <a:br>
               <a:rPr lang="en-US" sz="1250" dirty="0" smtClean="0"/>
             </a:br>
             <a:r>
               <a:rPr lang="en-US" sz="1250" dirty="0" smtClean="0"/>
-              <a:t>some cases (details will be presented later).</a:t>
+              <a:t>possibility </a:t>
+            </a:r>
+            <a:r>
+              <a:rPr lang="en-US" sz="1250" dirty="0"/>
+              <a:t>to extend, but I think it is very </a:t>
+            </a:r>
+            <a:r>
+              <a:rPr lang="en-US" sz="1250" dirty="0" smtClean="0"/>
+              <a:t/>
+            </a:r>
+            <a:br>
+              <a:rPr lang="en-US" sz="1250" dirty="0" smtClean="0"/>
+            </a:br>
+            <a:r>
+              <a:rPr lang="en-US" sz="1250" dirty="0" smtClean="0"/>
+              <a:t>complicated </a:t>
+            </a:r>
+            <a:r>
+              <a:rPr lang="en-US" sz="1250" dirty="0"/>
+              <a:t>and one should have very well knowledge of low-level programming (including GNU assembly) for handling </a:t>
+            </a:r>
+            <a:r>
+              <a:rPr lang="en-US" sz="1250" dirty="0" err="1"/>
+              <a:t>Valgrind</a:t>
+            </a:r>
+            <a:r>
+              <a:rPr lang="en-US" sz="1250" dirty="0"/>
+              <a:t> code. To clone and play with </a:t>
+            </a:r>
+            <a:r>
+              <a:rPr lang="en-US" sz="1250" dirty="0" err="1"/>
+              <a:t>Valgrind</a:t>
+            </a:r>
+            <a:r>
+              <a:rPr lang="en-US" sz="1250" dirty="0"/>
+              <a:t> code one can use the command: ‘</a:t>
+            </a:r>
+            <a:r>
+              <a:rPr lang="en-US" sz="1250" dirty="0" err="1"/>
+              <a:t>git</a:t>
+            </a:r>
+            <a:r>
+              <a:rPr lang="en-US" sz="1250" dirty="0"/>
+              <a:t> clone </a:t>
+            </a:r>
+            <a:r>
+              <a:rPr lang="en-US" sz="1250" dirty="0" err="1"/>
+              <a:t>git</a:t>
+            </a:r>
+            <a:r>
+              <a:rPr lang="en-US" sz="1250" dirty="0"/>
+              <a:t>://sourceware.org/</a:t>
+            </a:r>
+            <a:r>
+              <a:rPr lang="en-US" sz="1250" dirty="0" err="1"/>
+              <a:t>git</a:t>
+            </a:r>
+            <a:r>
+              <a:rPr lang="en-US" sz="1250" dirty="0"/>
+              <a:t>/</a:t>
+            </a:r>
+            <a:r>
+              <a:rPr lang="en-US" sz="1250" dirty="0" err="1"/>
+              <a:t>valgrind.git</a:t>
+            </a:r>
+            <a:r>
+              <a:rPr lang="en-US" sz="1250" dirty="0" smtClean="0"/>
+              <a:t>’.</a:t>
             </a:r>
             <a:r>
               <a:rPr lang="en-US" dirty="0" smtClean="0"/>
@@ -4228,79 +4311,8 @@
           <a:p>
             <a:pPr lvl="1"/>
             <a:r>
-              <a:rPr lang="en-US" sz="1250" dirty="0"/>
-              <a:t>Easy extendibility. </a:t>
-            </a:r>
-            <a:r>
-              <a:rPr lang="en-US" sz="1250" dirty="0" err="1"/>
-              <a:t>Valgrind</a:t>
-            </a:r>
-            <a:r>
-              <a:rPr lang="en-US" sz="1250" dirty="0"/>
-              <a:t> also mentions the possibility to extend, but I think it is very complicated and one should have very well knowledge of low-level programming (including GNU assembly) for handling </a:t>
-            </a:r>
-            <a:r>
-              <a:rPr lang="en-US" sz="1250" dirty="0" err="1"/>
-              <a:t>Valgrind</a:t>
-            </a:r>
-            <a:r>
-              <a:rPr lang="en-US" sz="1250" dirty="0"/>
-              <a:t> code. To clone and play with </a:t>
-            </a:r>
-            <a:r>
-              <a:rPr lang="en-US" sz="1250" dirty="0" err="1"/>
-              <a:t>Valgrind</a:t>
-            </a:r>
-            <a:r>
-              <a:rPr lang="en-US" sz="1250" dirty="0"/>
-              <a:t> code one can use the command: ‘</a:t>
-            </a:r>
-            <a:r>
-              <a:rPr lang="en-US" sz="1250" dirty="0" err="1"/>
-              <a:t>git</a:t>
-            </a:r>
-            <a:r>
-              <a:rPr lang="en-US" sz="1250" dirty="0"/>
-              <a:t> clone </a:t>
-            </a:r>
-            <a:r>
-              <a:rPr lang="en-US" sz="1250" dirty="0" err="1"/>
-              <a:t>git</a:t>
-            </a:r>
-            <a:r>
-              <a:rPr lang="en-US" sz="1250" dirty="0"/>
-              <a:t>://sourceware.org/</a:t>
-            </a:r>
-            <a:r>
-              <a:rPr lang="en-US" sz="1250" dirty="0" err="1"/>
-              <a:t>git</a:t>
-            </a:r>
-            <a:r>
-              <a:rPr lang="en-US" sz="1250" dirty="0"/>
-              <a:t>/</a:t>
-            </a:r>
-            <a:r>
-              <a:rPr lang="en-US" sz="1250" dirty="0" err="1"/>
-              <a:t>valgrind.git</a:t>
-            </a:r>
-            <a:r>
               <a:rPr lang="en-US" sz="1250" dirty="0" smtClean="0"/>
-              <a:t>’.</a:t>
-            </a:r>
-            <a:r>
-              <a:rPr lang="en-US" dirty="0" smtClean="0"/>
-              <a:t> </a:t>
-            </a:r>
-          </a:p>
-          <a:p>
-            <a:pPr lvl="1"/>
-            <a:r>
-              <a:rPr lang="en-US" sz="1250" dirty="0" smtClean="0"/>
-              <a:t>Runtime extendibility </a:t>
-            </a:r>
-            <a:r>
-              <a:rPr lang="en-US" sz="1250" dirty="0" smtClean="0"/>
-              <a:t>!!!</a:t>
+              <a:t>Runtime extendibility !!!</a:t>
             </a:r>
           </a:p>
           <a:p>
@@ -4309,7 +4321,6 @@
               <a:rPr lang="en-US" sz="1250" dirty="0" smtClean="0"/>
               <a:t>Windows!!! (for Windows proof of concept app is done, but complete system is not prepared)</a:t>
             </a:r>
-            <a:endParaRPr lang="en-US" sz="1250" dirty="0" smtClean="0"/>
           </a:p>
           <a:p>
             <a:r>
@@ -4388,7 +4399,7 @@
         </p:nvGrpSpPr>
         <p:grpSpPr>
           <a:xfrm>
-            <a:off x="4189226" y="1466945"/>
+            <a:off x="4189226" y="1445681"/>
             <a:ext cx="4359350" cy="1341881"/>
             <a:chOff x="4593265" y="1698808"/>
             <a:chExt cx="4359350" cy="1341881"/>
@@ -4580,11 +4591,7 @@
           <a:p>
             <a:r>
               <a:rPr lang="en-US" sz="1600" dirty="0" smtClean="0"/>
-              <a:t>Overloading </a:t>
-            </a:r>
-            <a:r>
-              <a:rPr lang="en-US" sz="1600" dirty="0" smtClean="0"/>
-              <a:t>C++ operators new </a:t>
+              <a:t>Overloading C++ operators new </a:t>
             </a:r>
             <a:r>
               <a:rPr lang="en-US" sz="1600" dirty="0"/>
@@ -4693,11 +4700,7 @@
             </a:r>
             <a:r>
               <a:rPr lang="en-US" sz="1600" dirty="0"/>
-              <a:t> and friends function, then the application's functions will be called instead of Glibc functions. This will happen because these functions are defined as weak symbols and any new symbol with the same name(s) will be used instead. </a:t>
-            </a:r>
-            <a:r>
-              <a:rPr lang="en-US" sz="1600" dirty="0"/>
-              <a:t>This is true only for Linux, for Windows hacking </a:t>
+              <a:t> and friends function, then the application's functions will be called instead of Glibc functions. This will happen because these functions are defined as weak symbols and any new symbol with the same name(s) will be used instead. This is true only for Linux, for Windows hacking </a:t>
             </a:r>
             <a:r>
               <a:rPr lang="en-US" sz="1600" dirty="0" err="1"/>
@@ -4849,35 +4852,70 @@
           <a:p>
             <a:r>
               <a:rPr lang="en-US" dirty="0" smtClean="0"/>
-              <a:t>Missing details in the </a:t>
+              <a:t>Code will be </a:t>
             </a:r>
             <a:r>
               <a:rPr lang="en-US" dirty="0" err="1" smtClean="0"/>
-              <a:t>Valgrind</a:t>
+              <a:t>analized</a:t>
             </a:r>
             <a:endParaRPr lang="de-DE" dirty="0"/>
           </a:p>
         </p:txBody>
       </p:sp>
-      <p:sp>
-        <p:nvSpPr>
-          <p:cNvPr id="3" name="Content Placeholder 2"/>
-          <p:cNvSpPr>
-            <a:spLocks noGrp="1"/>
-          </p:cNvSpPr>
-          <p:nvPr>
-            <p:ph idx="1"/>
-          </p:nvPr>
-        </p:nvSpPr>
-        <p:spPr/>
-        <p:txBody>
-          <a:bodyPr/>
-          <a:lstStyle/>
-          <a:p>
-            <a:endParaRPr lang="de-DE"/>
-          </a:p>
-        </p:txBody>
-      </p:sp>
+      <p:pic>
+        <p:nvPicPr>
+          <p:cNvPr id="1026" name="Picture 2"/>
+          <p:cNvPicPr>
+            <a:picLocks noChangeAspect="1" noChangeArrowheads="1"/>
+          </p:cNvPicPr>
+          <p:nvPr/>
+        </p:nvPicPr>
+        <p:blipFill>
+          <a:blip r:embed="rId2">
+            <a:extLst>
+              <a:ext uri="{28A0092B-C50C-407E-A947-70E740481C1C}">
+                <a14:useLocalDpi xmlns:a14="http://schemas.microsoft.com/office/drawing/2010/main" val="0"/>
+              </a:ext>
+            </a:extLst>
+          </a:blip>
+          <a:srcRect/>
+          <a:stretch>
+            <a:fillRect/>
+          </a:stretch>
+        </p:blipFill>
+        <p:spPr bwMode="auto">
+          <a:xfrm>
+            <a:off x="339466" y="949842"/>
+            <a:ext cx="4757073" cy="5218814"/>
+          </a:xfrm>
+          <a:prstGeom prst="rect">
+            <a:avLst/>
+          </a:prstGeom>
+          <a:noFill/>
+          <a:ln>
+            <a:noFill/>
+          </a:ln>
+          <a:extLst>
+            <a:ext uri="{909E8E84-426E-40DD-AFC4-6F175D3DCCD1}">
+              <a14:hiddenFill xmlns:a14="http://schemas.microsoft.com/office/drawing/2010/main">
+                <a:solidFill>
+                  <a:schemeClr val="accent1"/>
+                </a:solidFill>
+              </a14:hiddenFill>
+            </a:ext>
+            <a:ext uri="{91240B29-F687-4F45-9708-019B960494DF}">
+              <a14:hiddenLine xmlns:a14="http://schemas.microsoft.com/office/drawing/2010/main" w="9525">
+                <a:solidFill>
+                  <a:schemeClr val="tx1"/>
+                </a:solidFill>
+                <a:miter lim="800000"/>
+                <a:headEnd/>
+                <a:tailEnd/>
+              </a14:hiddenLine>
+            </a:ext>
+          </a:extLst>
+        </p:spPr>
+      </p:pic>
     </p:spTree>
     <p:extLst>
       <p:ext uri="{BB962C8B-B14F-4D97-AF65-F5344CB8AC3E}">

</xml_diff>

<commit_message>
Feature/5 prepare presentation (#13)
* presentation preparation is ongoing
* presentation preparation is ongoing
* some tests on windows
* applied changes in the Linux
* applied windows corrections
* some tests on ubuntu
* fixed Makefile
* added new test case
* modified a bit corruption test
* changed prj/common/common_mkfl/sys_common.unix.Makefile to use other Makefile from cpputils
* applied the last commit of cpputils
* added the last version of the presentation
</commit_message>
<xml_diff>
--- a/docs/crash_investigations.pptx
+++ b/docs/crash_investigations.pptx
@@ -5,18 +5,15 @@
     <p:sldMasterId id="2147483660" r:id="rId1"/>
   </p:sldMasterIdLst>
   <p:notesMasterIdLst>
-    <p:notesMasterId r:id="rId11"/>
+    <p:notesMasterId r:id="rId8"/>
   </p:notesMasterIdLst>
   <p:sldIdLst>
     <p:sldId id="263" r:id="rId2"/>
     <p:sldId id="335" r:id="rId3"/>
-    <p:sldId id="343" r:id="rId4"/>
-    <p:sldId id="344" r:id="rId5"/>
-    <p:sldId id="345" r:id="rId6"/>
-    <p:sldId id="346" r:id="rId7"/>
-    <p:sldId id="347" r:id="rId8"/>
-    <p:sldId id="349" r:id="rId9"/>
-    <p:sldId id="348" r:id="rId10"/>
+    <p:sldId id="336" r:id="rId4"/>
+    <p:sldId id="338" r:id="rId5"/>
+    <p:sldId id="339" r:id="rId6"/>
+    <p:sldId id="340" r:id="rId7"/>
   </p:sldIdLst>
   <p:sldSz cx="9144000" cy="6858000" type="screen4x3"/>
   <p:notesSz cx="7104063" cy="10234613"/>
@@ -3453,7 +3450,30 @@
           <a:p>
             <a:r>
               <a:rPr lang="en-US" dirty="0" smtClean="0"/>
-              <a:t>Investigating memory corruption issues</a:t>
+              <a:t>Investigating memory corruption </a:t>
+            </a:r>
+            <a:r>
+              <a:rPr lang="en-US" dirty="0"/>
+              <a:t>issues</a:t>
+            </a:r>
+            <a:br>
+              <a:rPr lang="en-US" dirty="0"/>
+            </a:br>
+            <a:r>
+              <a:rPr lang="en-US" dirty="0">
+                <a:hlinkClick r:id="rId2"/>
+              </a:rPr>
+              <a:t>https://</a:t>
+            </a:r>
+            <a:r>
+              <a:rPr lang="en-US" dirty="0" smtClean="0">
+                <a:hlinkClick r:id="rId2"/>
+              </a:rPr>
+              <a:t>gitlab.zeuthen.desy.de/ers/crash_investigator</a:t>
+            </a:r>
+            <a:r>
+              <a:rPr lang="en-US" dirty="0" smtClean="0"/>
+              <a:t> </a:t>
             </a:r>
             <a:endParaRPr lang="de-DE" dirty="0"/>
           </a:p>
@@ -3610,7 +3630,12 @@
             <p:ph idx="1"/>
           </p:nvPr>
         </p:nvSpPr>
-        <p:spPr/>
+        <p:spPr>
+          <a:xfrm>
+            <a:off x="162072" y="843221"/>
+            <a:ext cx="8825984" cy="5309486"/>
+          </a:xfrm>
+        </p:spPr>
         <p:txBody>
           <a:bodyPr/>
           <a:lstStyle/>
@@ -3623,68 +3648,24 @@
           </a:p>
           <a:p>
             <a:r>
-              <a:rPr lang="de-DE" dirty="0" err="1" smtClean="0"/>
-              <a:t>Mehods</a:t>
-            </a:r>
-            <a:r>
-              <a:rPr lang="de-DE" dirty="0" smtClean="0"/>
+              <a:rPr lang="en-US" dirty="0"/>
+              <a:t>Tools for investigations of memory-related problems</a:t>
+            </a:r>
+            <a:endParaRPr lang="de-DE" dirty="0" smtClean="0"/>
+          </a:p>
+          <a:p>
+            <a:pPr lvl="1"/>
+            <a:r>
+              <a:rPr lang="en-US" dirty="0" err="1" smtClean="0"/>
+              <a:t>valgrind</a:t>
+            </a:r>
+            <a:r>
+              <a:rPr lang="en-US" dirty="0" smtClean="0"/>
               <a:t> </a:t>
             </a:r>
             <a:r>
-              <a:rPr lang="de-DE" dirty="0" err="1" smtClean="0"/>
-              <a:t>of</a:t>
-            </a:r>
-            <a:r>
-              <a:rPr lang="de-DE" dirty="0" smtClean="0"/>
-              <a:t> </a:t>
-            </a:r>
-            <a:r>
-              <a:rPr lang="de-DE" dirty="0" err="1" smtClean="0"/>
-              <a:t>investigations</a:t>
-            </a:r>
-            <a:r>
-              <a:rPr lang="de-DE" dirty="0" smtClean="0"/>
-              <a:t> </a:t>
-            </a:r>
-            <a:r>
-              <a:rPr lang="de-DE" dirty="0" err="1" smtClean="0"/>
-              <a:t>of</a:t>
-            </a:r>
-            <a:r>
-              <a:rPr lang="de-DE" dirty="0" smtClean="0"/>
-              <a:t> </a:t>
-            </a:r>
-            <a:r>
-              <a:rPr lang="de-DE" dirty="0" err="1" smtClean="0"/>
-              <a:t>memory</a:t>
-            </a:r>
-            <a:r>
-              <a:rPr lang="de-DE" dirty="0" smtClean="0"/>
-              <a:t> </a:t>
-            </a:r>
-            <a:r>
-              <a:rPr lang="de-DE" dirty="0" err="1" smtClean="0"/>
-              <a:t>related</a:t>
-            </a:r>
-            <a:r>
-              <a:rPr lang="de-DE" dirty="0" smtClean="0"/>
-              <a:t> </a:t>
-            </a:r>
-            <a:r>
-              <a:rPr lang="de-DE" dirty="0" err="1" smtClean="0"/>
-              <a:t>problems</a:t>
-            </a:r>
-            <a:endParaRPr lang="de-DE" dirty="0" smtClean="0"/>
-          </a:p>
-          <a:p>
-            <a:pPr lvl="1"/>
-            <a:r>
-              <a:rPr lang="en-US" dirty="0" err="1" smtClean="0"/>
-              <a:t>valngrid</a:t>
-            </a:r>
-            <a:r>
               <a:rPr lang="en-US" dirty="0"/>
-              <a:t> (https://valgrind.org/): </a:t>
+              <a:t>(https://valgrind.org/): </a:t>
             </a:r>
             <a:r>
               <a:rPr lang="en-US" dirty="0" smtClean="0"/>
@@ -3771,12 +3752,75 @@
               <a:rPr lang="de-DE" dirty="0" smtClean="0"/>
               <a:t>Windows</a:t>
             </a:r>
-            <a:endParaRPr lang="de-DE" dirty="0" smtClean="0"/>
           </a:p>
           <a:p>
             <a:r>
               <a:rPr lang="en-US" dirty="0" smtClean="0"/>
-              <a:t>Crash investigator</a:t>
+              <a:t>Crash </a:t>
+            </a:r>
+            <a:r>
+              <a:rPr lang="en-US" dirty="0"/>
+              <a:t>investigator (</a:t>
+            </a:r>
+            <a:r>
+              <a:rPr lang="en-US" dirty="0">
+                <a:hlinkClick r:id="rId2"/>
+              </a:rPr>
+              <a:t>https://</a:t>
+            </a:r>
+            <a:r>
+              <a:rPr lang="en-US" dirty="0" smtClean="0">
+                <a:hlinkClick r:id="rId2"/>
+              </a:rPr>
+              <a:t>gitlab.zeuthen.desy.de/ers/crash_investigator</a:t>
+            </a:r>
+            <a:r>
+              <a:rPr lang="en-US" dirty="0" smtClean="0"/>
+              <a:t>)</a:t>
+            </a:r>
+          </a:p>
+          <a:p>
+            <a:pPr lvl="1"/>
+            <a:r>
+              <a:rPr lang="en-US" dirty="0"/>
+              <a:t>Reasons to implement this (cases when </a:t>
+            </a:r>
+            <a:r>
+              <a:rPr lang="en-US" dirty="0" err="1"/>
+              <a:t>Valgrind</a:t>
+            </a:r>
+            <a:r>
+              <a:rPr lang="en-US" dirty="0"/>
+              <a:t> will not help or will behave poorly)</a:t>
+            </a:r>
+            <a:endParaRPr lang="en-US" dirty="0" smtClean="0"/>
+          </a:p>
+          <a:p>
+            <a:pPr lvl="1"/>
+            <a:r>
+              <a:rPr lang="en-US" dirty="0"/>
+              <a:t>How it is implemented (the idea behind)</a:t>
+            </a:r>
+            <a:endParaRPr lang="en-US" dirty="0" smtClean="0"/>
+          </a:p>
+          <a:p>
+            <a:pPr lvl="1"/>
+            <a:r>
+              <a:rPr lang="en-US" dirty="0" smtClean="0"/>
+              <a:t>How to use it</a:t>
+            </a:r>
+          </a:p>
+          <a:p>
+            <a:pPr lvl="1"/>
+            <a:r>
+              <a:rPr lang="en-US" dirty="0" smtClean="0"/>
+              <a:t>How to extend it</a:t>
+            </a:r>
+          </a:p>
+          <a:p>
+            <a:r>
+              <a:rPr lang="en-US" dirty="0" smtClean="0"/>
+              <a:t>Demo</a:t>
             </a:r>
             <a:endParaRPr lang="de-DE" dirty="0" smtClean="0"/>
           </a:p>
@@ -3836,15 +3880,7 @@
           <a:p>
             <a:r>
               <a:rPr lang="en-US" dirty="0" smtClean="0"/>
-              <a:t>PITZ DAQ (Data </a:t>
-            </a:r>
-            <a:r>
-              <a:rPr lang="en-US" dirty="0" err="1" smtClean="0"/>
-              <a:t>AcQuisition</a:t>
-            </a:r>
-            <a:r>
-              <a:rPr lang="en-US" dirty="0" smtClean="0"/>
-              <a:t>). Recent activities</a:t>
+              <a:t>Memory related issues and crashes </a:t>
             </a:r>
             <a:endParaRPr lang="de-DE" dirty="0"/>
           </a:p>
@@ -3862,82 +3898,194 @@
         </p:nvSpPr>
         <p:spPr>
           <a:xfrm>
-            <a:off x="127591" y="822250"/>
-            <a:ext cx="8874642" cy="5224131"/>
+            <a:off x="198474" y="850605"/>
+            <a:ext cx="8754140" cy="5273747"/>
           </a:xfrm>
         </p:spPr>
         <p:txBody>
           <a:bodyPr/>
           <a:lstStyle/>
           <a:p>
-            <a:endParaRPr lang="en-US" dirty="0" smtClean="0"/>
-          </a:p>
-          <a:p>
-            <a:r>
-              <a:rPr lang="en-US" dirty="0"/>
-              <a:t>Added a new type of data collector. These collectors get data using the new DOOCS ZMQ publishing/subscribing.</a:t>
-            </a:r>
-            <a:endParaRPr lang="en-US" dirty="0" smtClean="0"/>
-          </a:p>
-          <a:p>
-            <a:r>
-              <a:rPr lang="en-US" dirty="0"/>
-              <a:t>Added possibility to collect secondary data alongside with main data. For example, if a spectrum is collected, then one can collect poly para alongside this spectrum, which later on will allow making physical value from raw measurement data.</a:t>
-            </a:r>
-            <a:endParaRPr lang="en-US" dirty="0" smtClean="0"/>
-          </a:p>
-          <a:p>
-            <a:r>
-              <a:rPr lang="en-US" dirty="0" smtClean="0"/>
-              <a:t>Collectors were made more </a:t>
-            </a:r>
-            <a:r>
-              <a:rPr lang="en-US" dirty="0"/>
-              <a:t>flexible</a:t>
-            </a:r>
-            <a:endParaRPr lang="en-US" dirty="0" smtClean="0"/>
+            <a:r>
+              <a:rPr lang="en-US" sz="1750" dirty="0" smtClean="0"/>
+              <a:t>Meaning of colors in the below list</a:t>
+            </a:r>
           </a:p>
           <a:p>
             <a:pPr lvl="1"/>
             <a:r>
-              <a:rPr lang="en-US" dirty="0" smtClean="0"/>
-              <a:t>Add/remove entry on fly</a:t>
+              <a:rPr lang="en-US" sz="1450" dirty="0">
+                <a:solidFill>
+                  <a:srgbClr val="339933"/>
+                </a:solidFill>
+              </a:rPr>
+              <a:t>Green</a:t>
+            </a:r>
+            <a:r>
+              <a:rPr lang="en-US" sz="1450" dirty="0"/>
+              <a:t>: possible to investigate with the newly created crash </a:t>
+            </a:r>
+            <a:r>
+              <a:rPr lang="en-US" sz="1450" dirty="0" smtClean="0"/>
+              <a:t>investigator.</a:t>
             </a:r>
           </a:p>
           <a:p>
             <a:pPr lvl="1"/>
             <a:r>
-              <a:rPr lang="en-US" dirty="0" smtClean="0"/>
-              <a:t>Mask/unmask entry from the collection (with or without timeout) (can be done even runtime)</a:t>
+              <a:rPr lang="en-US" sz="1450" dirty="0" smtClean="0">
+                <a:solidFill>
+                  <a:srgbClr val="FFC000"/>
+                </a:solidFill>
+              </a:rPr>
+              <a:t>Yellow</a:t>
+            </a:r>
+            <a:r>
+              <a:rPr lang="en-US" sz="1450" dirty="0" smtClean="0"/>
+              <a:t>: theoretically possible to investigate but not implemented.</a:t>
             </a:r>
           </a:p>
           <a:p>
             <a:pPr lvl="1"/>
             <a:r>
-              <a:rPr lang="en-US" dirty="0" smtClean="0"/>
-              <a:t>Mask/unmask entry errors (for example when server publishing data is switched off by purpose)</a:t>
-            </a:r>
-            <a:endParaRPr lang="de-DE" dirty="0"/>
+              <a:rPr lang="en-US" sz="1450" dirty="0" smtClean="0">
+                <a:solidFill>
+                  <a:srgbClr val="FF0000"/>
+                </a:solidFill>
+              </a:rPr>
+              <a:t>Red</a:t>
+            </a:r>
+            <a:r>
+              <a:rPr lang="en-US" sz="1450" dirty="0" smtClean="0"/>
+              <a:t>: not possible to investigate.</a:t>
+            </a:r>
+          </a:p>
+          <a:p>
+            <a:pPr lvl="1"/>
+            <a:r>
+              <a:rPr lang="en-US" sz="1450" dirty="0" smtClean="0"/>
+              <a:t>All cases are possible to investigate by </a:t>
+            </a:r>
+            <a:r>
+              <a:rPr lang="en-US" sz="1450" dirty="0" err="1" smtClean="0"/>
+              <a:t>Valgrind</a:t>
+            </a:r>
+            <a:r>
+              <a:rPr lang="en-US" sz="1450" dirty="0" smtClean="0"/>
+              <a:t> (even red cases)!</a:t>
+            </a:r>
+            <a:endParaRPr lang="en-US" sz="1450" dirty="0">
+              <a:solidFill>
+                <a:srgbClr val="FFCC00"/>
+              </a:solidFill>
+            </a:endParaRPr>
+          </a:p>
+          <a:p>
+            <a:r>
+              <a:rPr lang="en-US" sz="1750" dirty="0" smtClean="0">
+                <a:solidFill>
+                  <a:srgbClr val="FFCC00"/>
+                </a:solidFill>
+              </a:rPr>
+              <a:t>Memory </a:t>
+            </a:r>
+            <a:r>
+              <a:rPr lang="en-US" sz="1750" dirty="0">
+                <a:solidFill>
+                  <a:srgbClr val="FFCC00"/>
+                </a:solidFill>
+              </a:rPr>
+              <a:t>leak: this will not lead to a crash but after a long run there will not be available memory for the proper functionality of an </a:t>
+            </a:r>
+            <a:r>
+              <a:rPr lang="en-US" sz="1750" dirty="0" smtClean="0">
+                <a:solidFill>
+                  <a:srgbClr val="FFCC00"/>
+                </a:solidFill>
+              </a:rPr>
+              <a:t>application.</a:t>
+            </a:r>
+          </a:p>
+          <a:p>
+            <a:r>
+              <a:rPr lang="en-US" sz="1750" dirty="0" smtClean="0">
+                <a:solidFill>
+                  <a:srgbClr val="339933"/>
+                </a:solidFill>
+              </a:rPr>
+              <a:t>Double free issue: Most probably this will immediately crash the application.</a:t>
+            </a:r>
+            <a:r>
+              <a:rPr lang="en-US" sz="1750" dirty="0" smtClean="0"/>
+              <a:t> </a:t>
+            </a:r>
+          </a:p>
+          <a:p>
+            <a:r>
+              <a:rPr lang="en-US" sz="1750" dirty="0" smtClean="0">
+                <a:solidFill>
+                  <a:srgbClr val="339933"/>
+                </a:solidFill>
+              </a:rPr>
+              <a:t>Allocation - deallocation mismatch</a:t>
+            </a:r>
+            <a:r>
+              <a:rPr lang="en-US" sz="1750" dirty="0">
+                <a:solidFill>
+                  <a:srgbClr val="339933"/>
+                </a:solidFill>
+              </a:rPr>
+              <a:t>: this is the case when memory is allocated using one method and memory is freed by the other method (for example new/free, new[]/delete, etc.). Similar errors will lead to crashes in some cases. Most crashes will happen immediately after corruption.</a:t>
+            </a:r>
+            <a:endParaRPr lang="en-US" sz="1750" dirty="0" smtClean="0">
+              <a:solidFill>
+                <a:srgbClr val="339933"/>
+              </a:solidFill>
+            </a:endParaRPr>
+          </a:p>
+          <a:p>
+            <a:r>
+              <a:rPr lang="en-US" sz="1750" dirty="0">
+                <a:solidFill>
+                  <a:srgbClr val="FF0000"/>
+                </a:solidFill>
+              </a:rPr>
+              <a:t>Memory overrun issue: </a:t>
+            </a:r>
+            <a:r>
+              <a:rPr lang="en-US" sz="1750" dirty="0" smtClean="0">
+                <a:solidFill>
+                  <a:srgbClr val="FF0000"/>
+                </a:solidFill>
+              </a:rPr>
+              <a:t>this </a:t>
+            </a:r>
+            <a:r>
+              <a:rPr lang="en-US" sz="1750" dirty="0">
+                <a:solidFill>
+                  <a:srgbClr val="FF0000"/>
+                </a:solidFill>
+              </a:rPr>
+              <a:t>is a very hard detectable issue because they crash applications not immediately and not always. They crash applications when the memory behind allocated memory is responsible for sensitive data. Usually, the crash happens not during the bad call with overrun, but later when the mentioned sensitive memory is accessed.</a:t>
+            </a:r>
+            <a:r>
+              <a:rPr lang="en-US" sz="1750" dirty="0"/>
+              <a:t> </a:t>
+            </a:r>
+            <a:endParaRPr lang="de-DE" sz="1750" dirty="0"/>
           </a:p>
         </p:txBody>
       </p:sp>
     </p:spTree>
     <p:extLst>
       <p:ext uri="{BB962C8B-B14F-4D97-AF65-F5344CB8AC3E}">
-        <p14:creationId xmlns:p14="http://schemas.microsoft.com/office/powerpoint/2010/main" val="2525633856"/>
+        <p14:creationId xmlns:p14="http://schemas.microsoft.com/office/powerpoint/2010/main" val="2876077689"/>
       </p:ext>
     </p:extLst>
   </p:cSld>
   <p:clrMapOvr>
     <a:masterClrMapping/>
   </p:clrMapOvr>
-  <p:timing>
-    <p:tnLst>
-      <p:par>
-        <p:cTn id="1" dur="indefinite" restart="never" nodeType="tmRoot"/>
-      </p:par>
-    </p:tnLst>
-  </p:timing>
 </p:sld>
 </file>
 
@@ -3975,19 +4123,19 @@
           <a:p>
             <a:r>
               <a:rPr lang="en-US" dirty="0"/>
-              <a:t>PITZ DAQ (Data </a:t>
+              <a:t>How </a:t>
             </a:r>
             <a:r>
               <a:rPr lang="en-US" dirty="0" err="1"/>
-              <a:t>AcQuisition</a:t>
+              <a:t>Valgrind</a:t>
             </a:r>
             <a:r>
               <a:rPr lang="en-US" dirty="0"/>
-              <a:t>). </a:t>
+              <a:t> </a:t>
             </a:r>
             <a:r>
               <a:rPr lang="en-US" dirty="0" smtClean="0"/>
-              <a:t>Plans</a:t>
+              <a:t>works. Reasons to have something else</a:t>
             </a:r>
             <a:endParaRPr lang="de-DE" dirty="0"/>
           </a:p>
@@ -4003,94 +4151,372 @@
             <p:ph idx="1"/>
           </p:nvPr>
         </p:nvSpPr>
-        <p:spPr/>
+        <p:spPr>
+          <a:xfrm>
+            <a:off x="98278" y="790934"/>
+            <a:ext cx="8854337" cy="5283801"/>
+          </a:xfrm>
+        </p:spPr>
         <p:txBody>
           <a:bodyPr/>
           <a:lstStyle/>
           <a:p>
             <a:r>
+              <a:rPr lang="en-US" sz="1700" dirty="0"/>
+              <a:t>In the previous slide, there was a note that </a:t>
+            </a:r>
+            <a:r>
+              <a:rPr lang="en-US" sz="1700" dirty="0" err="1"/>
+              <a:t>Valgrind</a:t>
+            </a:r>
+            <a:r>
+              <a:rPr lang="en-US" sz="1700" dirty="0"/>
+              <a:t> works for all mentioned cases. Then the question arises why do we need something else?</a:t>
+            </a:r>
+            <a:endParaRPr lang="en-US" sz="1700" dirty="0" smtClean="0"/>
+          </a:p>
+          <a:p>
+            <a:pPr lvl="1"/>
+            <a:r>
+              <a:rPr lang="en-US" sz="1250" dirty="0" smtClean="0"/>
+              <a:t>It slows down application 5-100 times.</a:t>
+            </a:r>
+          </a:p>
+          <a:p>
+            <a:pPr lvl="1"/>
+            <a:r>
+              <a:rPr lang="en-US" sz="1250" dirty="0" smtClean="0"/>
+              <a:t>Installation is needed and I’m not sure</a:t>
+            </a:r>
+            <a:br>
+              <a:rPr lang="en-US" sz="1250" dirty="0" smtClean="0"/>
+            </a:br>
+            <a:r>
+              <a:rPr lang="en-US" sz="1250" dirty="0" smtClean="0"/>
+              <a:t>if we will have permission to install</a:t>
+            </a:r>
+            <a:br>
+              <a:rPr lang="en-US" sz="1250" dirty="0" smtClean="0"/>
+            </a:br>
+            <a:r>
+              <a:rPr lang="en-US" sz="1250" dirty="0" err="1" smtClean="0"/>
+              <a:t>Valgrind</a:t>
+            </a:r>
+            <a:r>
+              <a:rPr lang="en-US" sz="1250" dirty="0" smtClean="0"/>
+              <a:t> on our server hosts.</a:t>
+            </a:r>
+          </a:p>
+          <a:p>
+            <a:pPr lvl="1"/>
+            <a:r>
+              <a:rPr lang="en-US" sz="1250" dirty="0" smtClean="0"/>
+              <a:t>Easy </a:t>
+            </a:r>
+            <a:r>
+              <a:rPr lang="en-US" sz="1250" dirty="0"/>
+              <a:t>extendibility. </a:t>
+            </a:r>
+            <a:r>
+              <a:rPr lang="en-US" sz="1250" dirty="0" err="1"/>
+              <a:t>Valgrind</a:t>
+            </a:r>
+            <a:r>
+              <a:rPr lang="en-US" sz="1250" dirty="0"/>
+              <a:t> also mentions the </a:t>
+            </a:r>
+            <a:r>
+              <a:rPr lang="en-US" sz="1250" dirty="0" smtClean="0"/>
+              <a:t/>
+            </a:r>
+            <a:br>
+              <a:rPr lang="en-US" sz="1250" dirty="0" smtClean="0"/>
+            </a:br>
+            <a:r>
+              <a:rPr lang="en-US" sz="1250" dirty="0" smtClean="0"/>
+              <a:t>possibility </a:t>
+            </a:r>
+            <a:r>
+              <a:rPr lang="en-US" sz="1250" dirty="0"/>
+              <a:t>to extend, but I think it is very </a:t>
+            </a:r>
+            <a:r>
+              <a:rPr lang="en-US" sz="1250" dirty="0" smtClean="0"/>
+              <a:t/>
+            </a:r>
+            <a:br>
+              <a:rPr lang="en-US" sz="1250" dirty="0" smtClean="0"/>
+            </a:br>
+            <a:r>
+              <a:rPr lang="en-US" sz="1250" dirty="0" smtClean="0"/>
+              <a:t>complicated </a:t>
+            </a:r>
+            <a:r>
+              <a:rPr lang="en-US" sz="1250" dirty="0"/>
+              <a:t>and one should have very well knowledge of low-level programming (including GNU assembly) for handling </a:t>
+            </a:r>
+            <a:r>
+              <a:rPr lang="en-US" sz="1250" dirty="0" err="1"/>
+              <a:t>Valgrind</a:t>
+            </a:r>
+            <a:r>
+              <a:rPr lang="en-US" sz="1250" dirty="0"/>
+              <a:t> code. To clone and play with </a:t>
+            </a:r>
+            <a:r>
+              <a:rPr lang="en-US" sz="1250" dirty="0" err="1"/>
+              <a:t>Valgrind</a:t>
+            </a:r>
+            <a:r>
+              <a:rPr lang="en-US" sz="1250" dirty="0"/>
+              <a:t> code one can use the command: ‘</a:t>
+            </a:r>
+            <a:r>
+              <a:rPr lang="en-US" sz="1250" dirty="0" err="1"/>
+              <a:t>git</a:t>
+            </a:r>
+            <a:r>
+              <a:rPr lang="en-US" sz="1250" dirty="0"/>
+              <a:t> clone </a:t>
+            </a:r>
+            <a:r>
+              <a:rPr lang="en-US" sz="1250" dirty="0" err="1"/>
+              <a:t>git</a:t>
+            </a:r>
+            <a:r>
+              <a:rPr lang="en-US" sz="1250" dirty="0"/>
+              <a:t>://sourceware.org/</a:t>
+            </a:r>
+            <a:r>
+              <a:rPr lang="en-US" sz="1250" dirty="0" err="1"/>
+              <a:t>git</a:t>
+            </a:r>
+            <a:r>
+              <a:rPr lang="en-US" sz="1250" dirty="0"/>
+              <a:t>/</a:t>
+            </a:r>
+            <a:r>
+              <a:rPr lang="en-US" sz="1250" dirty="0" err="1"/>
+              <a:t>valgrind.git</a:t>
+            </a:r>
+            <a:r>
+              <a:rPr lang="en-US" sz="1250" dirty="0" smtClean="0"/>
+              <a:t>’.</a:t>
+            </a:r>
+            <a:r>
               <a:rPr lang="en-US" dirty="0" smtClean="0"/>
-              <a:t>Integrate DAQ system developed by MCS for accelerators at HH DESY.</a:t>
+              <a:t> </a:t>
+            </a:r>
+          </a:p>
+          <a:p>
+            <a:pPr lvl="1"/>
+            <a:r>
+              <a:rPr lang="en-US" sz="1250" dirty="0" smtClean="0"/>
+              <a:t>Runtime extendibility !!!</a:t>
+            </a:r>
+          </a:p>
+          <a:p>
+            <a:pPr lvl="1"/>
+            <a:r>
+              <a:rPr lang="en-US" sz="1250" dirty="0" smtClean="0"/>
+              <a:t>Windows!!! (for Windows proof of concept app is done, but complete system is not prepared)</a:t>
+            </a:r>
+          </a:p>
+          <a:p>
+            <a:r>
+              <a:rPr lang="en-US" sz="1700" dirty="0" err="1"/>
+              <a:t>Valgrind</a:t>
+            </a:r>
+            <a:r>
+              <a:rPr lang="en-US" sz="1700" dirty="0"/>
+              <a:t> starts applications in the virtual environment where all instructions of applications are trapped by </a:t>
+            </a:r>
+            <a:r>
+              <a:rPr lang="en-US" sz="1700" dirty="0" err="1"/>
+              <a:t>Valgrind</a:t>
+            </a:r>
+            <a:r>
+              <a:rPr lang="en-US" sz="1700" dirty="0"/>
+              <a:t>, then analyzed and only after that the instructions </a:t>
+            </a:r>
+            <a:r>
+              <a:rPr lang="en-US" sz="1700" dirty="0" smtClean="0"/>
+              <a:t>executed.</a:t>
+            </a:r>
+          </a:p>
+          <a:p>
+            <a:pPr lvl="1"/>
+            <a:r>
+              <a:rPr lang="en-US" sz="1250" dirty="0" smtClean="0"/>
+              <a:t>This is the reason of slowing down the application dramatically.</a:t>
+            </a:r>
+          </a:p>
+          <a:p>
+            <a:pPr lvl="1"/>
+            <a:r>
+              <a:rPr lang="en-US" sz="1250" dirty="0" smtClean="0"/>
+              <a:t>This allows to investigate memory overflow issues by analyzing read/write instructions and by comparing memory size with read/write size in the instruction.</a:t>
             </a:r>
             <a:br>
-              <a:rPr lang="en-US" dirty="0" smtClean="0"/>
+              <a:rPr lang="en-US" sz="1250" dirty="0" smtClean="0"/>
             </a:br>
             <a:r>
-              <a:rPr lang="en-US" dirty="0" smtClean="0"/>
-              <a:t>This is necessary because</a:t>
-            </a:r>
-          </a:p>
-          <a:p>
-            <a:pPr lvl="1"/>
-            <a:r>
-              <a:rPr lang="en-US" dirty="0" smtClean="0"/>
-              <a:t>PITZ needs software from HH, that depends on their DAQ</a:t>
-            </a:r>
-          </a:p>
-          <a:p>
-            <a:pPr lvl="1"/>
-            <a:r>
-              <a:rPr lang="en-US" dirty="0" smtClean="0"/>
-              <a:t>We will reduce maintenance effort/time (hopefully)</a:t>
-            </a:r>
-          </a:p>
-          <a:p>
-            <a:r>
-              <a:rPr lang="en-US" dirty="0" smtClean="0"/>
-              <a:t>For PITZ specific requirements we will do one of following</a:t>
-            </a:r>
-          </a:p>
-          <a:p>
-            <a:pPr lvl="1"/>
-            <a:r>
-              <a:rPr lang="en-US" dirty="0"/>
-              <a:t>Keep minimum home-prepared systems and/or</a:t>
-            </a:r>
-            <a:endParaRPr lang="en-US" dirty="0" smtClean="0"/>
-          </a:p>
-          <a:p>
-            <a:pPr lvl="1"/>
-            <a:r>
-              <a:rPr lang="en-US" dirty="0"/>
-              <a:t>Make changes to the current DAQ system prepared by them to meet PITZ requirements. We can contribute during the development/implementation of these </a:t>
-            </a:r>
-            <a:r>
-              <a:rPr lang="en-US" dirty="0" smtClean="0"/>
-              <a:t>changes (discussion on this and integration at all will be continued with HH)</a:t>
-            </a:r>
-          </a:p>
-          <a:p>
-            <a:r>
-              <a:rPr lang="en-US" dirty="0" smtClean="0"/>
-              <a:t>Get rid of remnant AFS dependency of DAQ.</a:t>
-            </a:r>
-          </a:p>
-          <a:p>
-            <a:r>
-              <a:rPr lang="en-US" dirty="0" smtClean="0"/>
-              <a:t>Fix indexes and convert them to new indexes.</a:t>
-            </a:r>
-            <a:endParaRPr lang="de-DE" dirty="0"/>
+              <a:rPr lang="en-US" sz="500" dirty="0" smtClean="0"/>
+              <a:t/>
+            </a:r>
+            <a:br>
+              <a:rPr lang="en-US" sz="500" dirty="0" smtClean="0"/>
+            </a:br>
+            <a:r>
+              <a:rPr lang="en-US" sz="1250" dirty="0" smtClean="0"/>
+              <a:t>So if we have suspension that crash is there because of memory overflow </a:t>
+            </a:r>
+            <a:r>
+              <a:rPr lang="en-US" sz="1250" dirty="0" err="1" smtClean="0"/>
+              <a:t>Valgrid</a:t>
+            </a:r>
+            <a:r>
+              <a:rPr lang="en-US" sz="1250" dirty="0" smtClean="0"/>
+              <a:t> should be used (or </a:t>
+            </a:r>
+            <a:r>
+              <a:rPr lang="en-US" sz="1250" dirty="0" err="1" smtClean="0"/>
+              <a:t>Valgrind</a:t>
+            </a:r>
+            <a:r>
+              <a:rPr lang="en-US" sz="1250" dirty="0" smtClean="0"/>
+              <a:t> also should be used alongside with other tools).</a:t>
+            </a:r>
+            <a:endParaRPr lang="de-DE" sz="1250" dirty="0"/>
           </a:p>
         </p:txBody>
       </p:sp>
+      <p:grpSp>
+        <p:nvGrpSpPr>
+          <p:cNvPr id="5" name="Group 4"/>
+          <p:cNvGrpSpPr/>
+          <p:nvPr/>
+        </p:nvGrpSpPr>
+        <p:grpSpPr>
+          <a:xfrm>
+            <a:off x="4189226" y="1445681"/>
+            <a:ext cx="4359350" cy="1341881"/>
+            <a:chOff x="4593265" y="1698808"/>
+            <a:chExt cx="4359350" cy="1341881"/>
+          </a:xfrm>
+        </p:grpSpPr>
+        <p:pic>
+          <p:nvPicPr>
+            <p:cNvPr id="1026" name="Picture 2"/>
+            <p:cNvPicPr>
+              <a:picLocks noChangeAspect="1" noChangeArrowheads="1"/>
+            </p:cNvPicPr>
+            <p:nvPr/>
+          </p:nvPicPr>
+          <p:blipFill>
+            <a:blip r:embed="rId2">
+              <a:extLst>
+                <a:ext uri="{28A0092B-C50C-407E-A947-70E740481C1C}">
+                  <a14:useLocalDpi xmlns:a14="http://schemas.microsoft.com/office/drawing/2010/main" val="0"/>
+                </a:ext>
+              </a:extLst>
+            </a:blip>
+            <a:srcRect/>
+            <a:stretch>
+              <a:fillRect/>
+            </a:stretch>
+          </p:blipFill>
+          <p:spPr bwMode="auto">
+            <a:xfrm>
+              <a:off x="4593265" y="1698808"/>
+              <a:ext cx="4359350" cy="1341881"/>
+            </a:xfrm>
+            <a:prstGeom prst="rect">
+              <a:avLst/>
+            </a:prstGeom>
+            <a:noFill/>
+            <a:ln>
+              <a:noFill/>
+            </a:ln>
+            <a:extLst>
+              <a:ext uri="{909E8E84-426E-40DD-AFC4-6F175D3DCCD1}">
+                <a14:hiddenFill xmlns:a14="http://schemas.microsoft.com/office/drawing/2010/main">
+                  <a:solidFill>
+                    <a:schemeClr val="accent1"/>
+                  </a:solidFill>
+                </a14:hiddenFill>
+              </a:ext>
+              <a:ext uri="{91240B29-F687-4F45-9708-019B960494DF}">
+                <a14:hiddenLine xmlns:a14="http://schemas.microsoft.com/office/drawing/2010/main" w="9525">
+                  <a:solidFill>
+                    <a:schemeClr val="tx1"/>
+                  </a:solidFill>
+                  <a:miter lim="800000"/>
+                  <a:headEnd/>
+                  <a:tailEnd/>
+                </a14:hiddenLine>
+              </a:ext>
+            </a:extLst>
+          </p:spPr>
+        </p:pic>
+        <p:sp>
+          <p:nvSpPr>
+            <p:cNvPr id="4" name="TextBox 3"/>
+            <p:cNvSpPr txBox="1"/>
+            <p:nvPr/>
+          </p:nvSpPr>
+          <p:spPr>
+            <a:xfrm>
+              <a:off x="6315670" y="2572658"/>
+              <a:ext cx="2516451" cy="276999"/>
+            </a:xfrm>
+            <a:prstGeom prst="rect">
+              <a:avLst/>
+            </a:prstGeom>
+            <a:noFill/>
+            <a:ln>
+              <a:solidFill>
+                <a:schemeClr val="accent1"/>
+              </a:solidFill>
+            </a:ln>
+          </p:spPr>
+          <p:txBody>
+            <a:bodyPr wrap="square" rtlCol="0">
+              <a:spAutoFit/>
+            </a:bodyPr>
+            <a:lstStyle/>
+            <a:p>
+              <a:r>
+                <a:rPr lang="de-DE" sz="1200" dirty="0">
+                  <a:hlinkClick r:id="rId3"/>
+                </a:rPr>
+                <a:t>https://</a:t>
+              </a:r>
+              <a:r>
+                <a:rPr lang="de-DE" sz="1200" dirty="0" smtClean="0">
+                  <a:hlinkClick r:id="rId3"/>
+                </a:rPr>
+                <a:t>valgrind.org/info/about.html</a:t>
+              </a:r>
+              <a:r>
+                <a:rPr lang="de-DE" sz="1200" dirty="0" smtClean="0"/>
+                <a:t> </a:t>
+              </a:r>
+              <a:endParaRPr lang="de-DE" sz="1200" dirty="0"/>
+            </a:p>
+          </p:txBody>
+        </p:sp>
+      </p:grpSp>
     </p:spTree>
     <p:extLst>
       <p:ext uri="{BB962C8B-B14F-4D97-AF65-F5344CB8AC3E}">
-        <p14:creationId xmlns:p14="http://schemas.microsoft.com/office/powerpoint/2010/main" val="1931521969"/>
+        <p14:creationId xmlns:p14="http://schemas.microsoft.com/office/powerpoint/2010/main" val="3242676761"/>
       </p:ext>
     </p:extLst>
   </p:cSld>
   <p:clrMapOvr>
     <a:masterClrMapping/>
   </p:clrMapOvr>
-  <p:timing>
-    <p:tnLst>
-      <p:par>
-        <p:cTn id="1" dur="indefinite" restart="never" nodeType="tmRoot"/>
-      </p:par>
-    </p:tnLst>
-  </p:timing>
 </p:sld>
 </file>
 
@@ -4127,36 +4553,8 @@
           <a:lstStyle/>
           <a:p>
             <a:r>
-              <a:rPr lang="de-DE" dirty="0" smtClean="0"/>
-              <a:t>Universal </a:t>
-            </a:r>
-            <a:r>
-              <a:rPr lang="de-DE" dirty="0" err="1" smtClean="0"/>
-              <a:t>driver</a:t>
-            </a:r>
-            <a:r>
-              <a:rPr lang="de-DE" dirty="0" smtClean="0"/>
-              <a:t> </a:t>
-            </a:r>
-            <a:r>
-              <a:rPr lang="de-DE" dirty="0" err="1" smtClean="0"/>
-              <a:t>for</a:t>
-            </a:r>
-            <a:r>
-              <a:rPr lang="de-DE" dirty="0" smtClean="0"/>
-              <a:t> </a:t>
-            </a:r>
-            <a:r>
-              <a:rPr lang="de-DE" dirty="0" err="1" smtClean="0"/>
-              <a:t>mTCA</a:t>
-            </a:r>
-            <a:r>
-              <a:rPr lang="de-DE" dirty="0" smtClean="0"/>
-              <a:t> </a:t>
-            </a:r>
-            <a:r>
-              <a:rPr lang="de-DE" dirty="0" err="1" smtClean="0"/>
-              <a:t>devices</a:t>
+              <a:rPr lang="en-US" dirty="0" smtClean="0"/>
+              <a:t>What is the idea behind</a:t>
             </a:r>
             <a:endParaRPr lang="de-DE" dirty="0"/>
           </a:p>
@@ -4172,7 +4570,12 @@
             <p:ph idx="1"/>
           </p:nvPr>
         </p:nvSpPr>
-        <p:spPr/>
+        <p:spPr>
+          <a:xfrm>
+            <a:off x="99238" y="815163"/>
+            <a:ext cx="8966790" cy="5259572"/>
+          </a:xfrm>
+        </p:spPr>
         <p:txBody>
           <a:bodyPr/>
           <a:lstStyle/>
@@ -4181,939 +4584,237 @@
               <a:buNone/>
             </a:pPr>
             <a:r>
-              <a:rPr lang="en-US" dirty="0"/>
-              <a:t>This driver exports APIs, which are used by different </a:t>
-            </a:r>
-            <a:r>
-              <a:rPr lang="en-US" dirty="0" err="1"/>
-              <a:t>mTCA</a:t>
-            </a:r>
-            <a:r>
-              <a:rPr lang="en-US" dirty="0"/>
-              <a:t> device </a:t>
-            </a:r>
-            <a:r>
-              <a:rPr lang="en-US" dirty="0" smtClean="0"/>
-              <a:t>drivers. Development is ongoing together with MCS4 colleagues from HH</a:t>
-            </a:r>
-            <a:endParaRPr lang="de-DE" dirty="0"/>
-          </a:p>
-        </p:txBody>
-      </p:sp>
-      <p:grpSp>
-        <p:nvGrpSpPr>
-          <p:cNvPr id="22" name="Group 21"/>
-          <p:cNvGrpSpPr/>
-          <p:nvPr/>
-        </p:nvGrpSpPr>
-        <p:grpSpPr>
-          <a:xfrm>
-            <a:off x="949842" y="2721934"/>
-            <a:ext cx="4720856" cy="2629787"/>
-            <a:chOff x="949842" y="2721934"/>
-            <a:chExt cx="4720856" cy="2629787"/>
-          </a:xfrm>
-        </p:grpSpPr>
-        <p:sp>
-          <p:nvSpPr>
-            <p:cNvPr id="4" name="Rounded Rectangle 3"/>
-            <p:cNvSpPr/>
-            <p:nvPr/>
-          </p:nvSpPr>
-          <p:spPr bwMode="auto">
-            <a:xfrm>
-              <a:off x="949842" y="2721934"/>
-              <a:ext cx="4720856" cy="1672857"/>
-            </a:xfrm>
-            <a:prstGeom prst="roundRect">
-              <a:avLst/>
-            </a:prstGeom>
-            <a:solidFill>
-              <a:schemeClr val="accent1"/>
-            </a:solidFill>
-            <a:ln w="9525" cap="flat" cmpd="sng" algn="ctr">
-              <a:solidFill>
-                <a:schemeClr val="tx1"/>
-              </a:solidFill>
-              <a:prstDash val="solid"/>
-              <a:round/>
-              <a:headEnd type="none" w="med" len="med"/>
-              <a:tailEnd type="none" w="med" len="med"/>
-            </a:ln>
-            <a:effectLst/>
-            <a:extLst>
-              <a:ext uri="{AF507438-7753-43E0-B8FC-AC1667EBCBE1}">
-                <a14:hiddenEffects xmlns:a14="http://schemas.microsoft.com/office/drawing/2010/main">
-                  <a:effectLst>
-                    <a:outerShdw dist="35921" dir="2700000" algn="ctr" rotWithShape="0">
-                      <a:schemeClr val="bg2"/>
-                    </a:outerShdw>
-                  </a:effectLst>
-                </a14:hiddenEffects>
-              </a:ext>
-            </a:extLst>
-          </p:spPr>
-          <p:txBody>
-            <a:bodyPr vert="horz" wrap="square" lIns="91440" tIns="45720" rIns="91440" bIns="45720" numCol="1" rtlCol="0" anchor="t" anchorCtr="0" compatLnSpc="1">
-              <a:prstTxWarp prst="textNoShape">
-                <a:avLst/>
-              </a:prstTxWarp>
-            </a:bodyPr>
-            <a:lstStyle/>
-            <a:p>
-              <a:pPr marL="0" marR="0" indent="0" algn="l" defTabSz="914400" rtl="0" eaLnBrk="0" fontAlgn="base" latinLnBrk="0" hangingPunct="0">
-                <a:lnSpc>
-                  <a:spcPct val="100000"/>
-                </a:lnSpc>
-                <a:spcBef>
-                  <a:spcPct val="0"/>
-                </a:spcBef>
-                <a:spcAft>
-                  <a:spcPct val="0"/>
-                </a:spcAft>
-                <a:buClrTx/>
-                <a:buSzTx/>
-                <a:buFontTx/>
-                <a:buNone/>
-                <a:tabLst/>
-              </a:pPr>
-              <a:endParaRPr kumimoji="0" lang="de-DE" sz="1600" b="0" i="0" u="none" strike="noStrike" cap="none" normalizeH="0" baseline="0" dirty="0" smtClean="0">
-                <a:ln>
-                  <a:noFill/>
-                </a:ln>
-                <a:solidFill>
-                  <a:schemeClr val="tx1"/>
-                </a:solidFill>
-                <a:effectLst/>
-                <a:latin typeface="Arial" charset="0"/>
-              </a:endParaRPr>
-            </a:p>
-          </p:txBody>
-        </p:sp>
-        <p:sp>
-          <p:nvSpPr>
-            <p:cNvPr id="5" name="Rectangle 4"/>
-            <p:cNvSpPr/>
-            <p:nvPr/>
-          </p:nvSpPr>
-          <p:spPr bwMode="auto">
-            <a:xfrm>
-              <a:off x="1282995" y="3625702"/>
-              <a:ext cx="1864242" cy="591880"/>
-            </a:xfrm>
-            <a:prstGeom prst="rect">
-              <a:avLst/>
-            </a:prstGeom>
-            <a:solidFill>
-              <a:srgbClr val="FF0000"/>
-            </a:solidFill>
-            <a:ln w="9525" cap="flat" cmpd="sng" algn="ctr">
-              <a:solidFill>
-                <a:schemeClr val="tx1"/>
-              </a:solidFill>
-              <a:prstDash val="solid"/>
-              <a:round/>
-              <a:headEnd type="none" w="med" len="med"/>
-              <a:tailEnd type="none" w="med" len="med"/>
-            </a:ln>
-            <a:effectLst/>
-            <a:extLst/>
-          </p:spPr>
-          <p:txBody>
-            <a:bodyPr vert="horz" wrap="square" lIns="91440" tIns="45720" rIns="91440" bIns="45720" numCol="1" rtlCol="0" anchor="t" anchorCtr="0" compatLnSpc="1">
-              <a:prstTxWarp prst="textNoShape">
-                <a:avLst/>
-              </a:prstTxWarp>
-            </a:bodyPr>
-            <a:lstStyle/>
-            <a:p>
-              <a:pPr marL="0" marR="0" indent="0" algn="ctr" defTabSz="914400" rtl="0" eaLnBrk="0" fontAlgn="base" latinLnBrk="0" hangingPunct="0">
-                <a:lnSpc>
-                  <a:spcPct val="100000"/>
-                </a:lnSpc>
-                <a:spcBef>
-                  <a:spcPct val="0"/>
-                </a:spcBef>
-                <a:spcAft>
-                  <a:spcPct val="0"/>
-                </a:spcAft>
-                <a:buClrTx/>
-                <a:buSzTx/>
-                <a:buFontTx/>
-                <a:buNone/>
-                <a:tabLst/>
-              </a:pPr>
-              <a:r>
-                <a:rPr lang="en-US" dirty="0" smtClean="0">
-                  <a:solidFill>
-                    <a:schemeClr val="bg1"/>
-                  </a:solidFill>
-                </a:rPr>
-                <a:t>Universal driver</a:t>
-              </a:r>
-            </a:p>
-            <a:p>
-              <a:pPr marL="0" marR="0" indent="0" algn="ctr" defTabSz="914400" rtl="0" eaLnBrk="0" fontAlgn="base" latinLnBrk="0" hangingPunct="0">
-                <a:lnSpc>
-                  <a:spcPct val="100000"/>
-                </a:lnSpc>
-                <a:spcBef>
-                  <a:spcPct val="0"/>
-                </a:spcBef>
-                <a:spcAft>
-                  <a:spcPct val="0"/>
-                </a:spcAft>
-                <a:buClrTx/>
-                <a:buSzTx/>
-                <a:buFontTx/>
-                <a:buNone/>
-                <a:tabLst/>
-              </a:pPr>
-              <a:r>
-                <a:rPr kumimoji="0" lang="en-US" sz="1600" b="0" i="0" u="none" strike="noStrike" cap="none" normalizeH="0" baseline="0" dirty="0" smtClean="0">
-                  <a:ln>
-                    <a:noFill/>
-                  </a:ln>
-                  <a:solidFill>
-                    <a:schemeClr val="bg1"/>
-                  </a:solidFill>
-                  <a:effectLst/>
-                  <a:latin typeface="Arial" charset="0"/>
-                </a:rPr>
-                <a:t>Provides API</a:t>
-              </a:r>
-              <a:endParaRPr kumimoji="0" lang="de-DE" sz="1600" b="0" i="0" u="none" strike="noStrike" cap="none" normalizeH="0" baseline="0" dirty="0" smtClean="0">
-                <a:ln>
-                  <a:noFill/>
-                </a:ln>
-                <a:solidFill>
-                  <a:schemeClr val="bg1"/>
-                </a:solidFill>
-                <a:effectLst/>
-                <a:latin typeface="Arial" charset="0"/>
-              </a:endParaRPr>
-            </a:p>
-          </p:txBody>
-        </p:sp>
-        <p:sp>
-          <p:nvSpPr>
-            <p:cNvPr id="6" name="Rectangle 5"/>
-            <p:cNvSpPr/>
-            <p:nvPr/>
-          </p:nvSpPr>
-          <p:spPr bwMode="auto">
-            <a:xfrm>
-              <a:off x="3427227" y="3625702"/>
-              <a:ext cx="1864242" cy="591880"/>
-            </a:xfrm>
-            <a:prstGeom prst="rect">
-              <a:avLst/>
-            </a:prstGeom>
-            <a:solidFill>
-              <a:srgbClr val="FF0000"/>
-            </a:solidFill>
-            <a:ln w="9525" cap="flat" cmpd="sng" algn="ctr">
-              <a:solidFill>
-                <a:schemeClr val="tx1"/>
-              </a:solidFill>
-              <a:prstDash val="solid"/>
-              <a:round/>
-              <a:headEnd type="none" w="med" len="med"/>
-              <a:tailEnd type="none" w="med" len="med"/>
-            </a:ln>
-            <a:effectLst/>
-            <a:extLst/>
-          </p:spPr>
-          <p:txBody>
-            <a:bodyPr vert="horz" wrap="square" lIns="91440" tIns="45720" rIns="91440" bIns="45720" numCol="1" rtlCol="0" anchor="ctr" anchorCtr="0" compatLnSpc="1">
-              <a:prstTxWarp prst="textNoShape">
-                <a:avLst/>
-              </a:prstTxWarp>
-            </a:bodyPr>
-            <a:lstStyle/>
-            <a:p>
-              <a:pPr marL="0" marR="0" indent="0" algn="ctr" defTabSz="914400" rtl="0" eaLnBrk="0" fontAlgn="base" latinLnBrk="0" hangingPunct="0">
-                <a:lnSpc>
-                  <a:spcPct val="100000"/>
-                </a:lnSpc>
-                <a:spcBef>
-                  <a:spcPct val="0"/>
-                </a:spcBef>
-                <a:spcAft>
-                  <a:spcPct val="0"/>
-                </a:spcAft>
-                <a:buClrTx/>
-                <a:buSzTx/>
-                <a:buFontTx/>
-                <a:buNone/>
-                <a:tabLst/>
-              </a:pPr>
-              <a:r>
-                <a:rPr kumimoji="0" lang="en-US" sz="1600" b="0" i="0" u="none" strike="noStrike" cap="none" normalizeH="0" baseline="0" dirty="0" smtClean="0">
-                  <a:ln>
-                    <a:noFill/>
-                  </a:ln>
-                  <a:solidFill>
-                    <a:schemeClr val="bg1"/>
-                  </a:solidFill>
-                  <a:effectLst/>
-                  <a:latin typeface="Arial" charset="0"/>
-                </a:rPr>
-                <a:t>Specific driver</a:t>
-              </a:r>
-              <a:endParaRPr kumimoji="0" lang="de-DE" sz="1600" b="0" i="0" u="none" strike="noStrike" cap="none" normalizeH="0" baseline="0" dirty="0" smtClean="0">
-                <a:ln>
-                  <a:noFill/>
-                </a:ln>
-                <a:solidFill>
-                  <a:schemeClr val="bg1"/>
-                </a:solidFill>
-                <a:effectLst/>
-                <a:latin typeface="Arial" charset="0"/>
-              </a:endParaRPr>
-            </a:p>
-          </p:txBody>
-        </p:sp>
-        <p:sp>
-          <p:nvSpPr>
-            <p:cNvPr id="7" name="Rectangle 6"/>
-            <p:cNvSpPr/>
-            <p:nvPr/>
-          </p:nvSpPr>
-          <p:spPr bwMode="auto">
-            <a:xfrm>
-              <a:off x="2215116" y="4720856"/>
-              <a:ext cx="2388781" cy="630865"/>
-            </a:xfrm>
-            <a:prstGeom prst="rect">
-              <a:avLst/>
-            </a:prstGeom>
-            <a:solidFill>
-              <a:schemeClr val="bg1">
-                <a:lumMod val="50000"/>
-              </a:schemeClr>
-            </a:solidFill>
-            <a:ln w="9525" cap="flat" cmpd="sng" algn="ctr">
-              <a:solidFill>
-                <a:schemeClr val="tx1"/>
-              </a:solidFill>
-              <a:prstDash val="solid"/>
-              <a:round/>
-              <a:headEnd type="none" w="med" len="med"/>
-              <a:tailEnd type="none" w="med" len="med"/>
-            </a:ln>
-            <a:effectLst/>
-            <a:extLst/>
-          </p:spPr>
-          <p:txBody>
-            <a:bodyPr vert="horz" wrap="square" lIns="91440" tIns="45720" rIns="91440" bIns="45720" numCol="1" rtlCol="0" anchor="ctr" anchorCtr="1" compatLnSpc="1">
-              <a:prstTxWarp prst="textNoShape">
-                <a:avLst/>
-              </a:prstTxWarp>
-            </a:bodyPr>
-            <a:lstStyle/>
-            <a:p>
-              <a:pPr marL="0" marR="0" indent="0" algn="l" defTabSz="914400" rtl="0" eaLnBrk="0" fontAlgn="base" latinLnBrk="0" hangingPunct="0">
-                <a:lnSpc>
-                  <a:spcPct val="100000"/>
-                </a:lnSpc>
-                <a:spcBef>
-                  <a:spcPct val="0"/>
-                </a:spcBef>
-                <a:spcAft>
-                  <a:spcPct val="0"/>
-                </a:spcAft>
-                <a:buClrTx/>
-                <a:buSzTx/>
-                <a:buFontTx/>
-                <a:buNone/>
-                <a:tabLst/>
-              </a:pPr>
-              <a:r>
-                <a:rPr kumimoji="0" lang="en-US" sz="2800" b="0" i="0" u="none" strike="noStrike" cap="none" normalizeH="0" baseline="0" dirty="0" smtClean="0">
-                  <a:ln>
-                    <a:noFill/>
-                  </a:ln>
-                  <a:solidFill>
-                    <a:schemeClr val="bg1"/>
-                  </a:solidFill>
-                  <a:effectLst/>
-                  <a:latin typeface="Arial" charset="0"/>
-                </a:rPr>
-                <a:t>Device</a:t>
-              </a:r>
-            </a:p>
-          </p:txBody>
-        </p:sp>
-        <p:sp>
-          <p:nvSpPr>
-            <p:cNvPr id="8" name="Left-Right Arrow 7"/>
-            <p:cNvSpPr/>
-            <p:nvPr/>
-          </p:nvSpPr>
-          <p:spPr bwMode="auto">
-            <a:xfrm>
-              <a:off x="3147237" y="3899491"/>
-              <a:ext cx="279990" cy="150628"/>
-            </a:xfrm>
-            <a:prstGeom prst="leftRightArrow">
-              <a:avLst/>
-            </a:prstGeom>
-            <a:solidFill>
-              <a:srgbClr val="FF0000"/>
-            </a:solidFill>
-            <a:ln w="9525" cap="flat" cmpd="sng" algn="ctr">
-              <a:solidFill>
-                <a:schemeClr val="tx1"/>
-              </a:solidFill>
-              <a:prstDash val="solid"/>
-              <a:round/>
-              <a:headEnd type="none" w="med" len="med"/>
-              <a:tailEnd type="none" w="med" len="med"/>
-            </a:ln>
-            <a:effectLst/>
-            <a:extLst/>
-          </p:spPr>
-          <p:txBody>
-            <a:bodyPr vert="horz" wrap="square" lIns="91440" tIns="45720" rIns="91440" bIns="45720" numCol="1" rtlCol="0" anchor="t" anchorCtr="0" compatLnSpc="1">
-              <a:prstTxWarp prst="textNoShape">
-                <a:avLst/>
-              </a:prstTxWarp>
-            </a:bodyPr>
-            <a:lstStyle/>
-            <a:p>
-              <a:pPr marL="0" marR="0" indent="0" algn="l" defTabSz="914400" rtl="0" eaLnBrk="0" fontAlgn="base" latinLnBrk="0" hangingPunct="0">
-                <a:lnSpc>
-                  <a:spcPct val="100000"/>
-                </a:lnSpc>
-                <a:spcBef>
-                  <a:spcPct val="0"/>
-                </a:spcBef>
-                <a:spcAft>
-                  <a:spcPct val="0"/>
-                </a:spcAft>
-                <a:buClrTx/>
-                <a:buSzTx/>
-                <a:buFontTx/>
-                <a:buNone/>
-                <a:tabLst/>
-              </a:pPr>
-              <a:endParaRPr kumimoji="0" lang="de-DE" sz="1600" b="0" i="0" u="none" strike="noStrike" cap="none" normalizeH="0" baseline="0" smtClean="0">
-                <a:ln>
-                  <a:noFill/>
-                </a:ln>
-                <a:solidFill>
-                  <a:schemeClr val="tx1"/>
-                </a:solidFill>
-                <a:effectLst/>
-                <a:latin typeface="Arial" charset="0"/>
-              </a:endParaRPr>
-            </a:p>
-          </p:txBody>
-        </p:sp>
-        <p:sp>
-          <p:nvSpPr>
-            <p:cNvPr id="10" name="Up-Down Arrow 9"/>
-            <p:cNvSpPr/>
-            <p:nvPr/>
-          </p:nvSpPr>
-          <p:spPr bwMode="auto">
-            <a:xfrm>
-              <a:off x="4040372" y="4167963"/>
-              <a:ext cx="198475" cy="567070"/>
-            </a:xfrm>
-            <a:prstGeom prst="upDownArrow">
-              <a:avLst/>
-            </a:prstGeom>
-            <a:solidFill>
-              <a:schemeClr val="accent2">
-                <a:lumMod val="60000"/>
-                <a:lumOff val="40000"/>
-              </a:schemeClr>
-            </a:solidFill>
-            <a:ln w="9525" cap="flat" cmpd="sng" algn="ctr">
-              <a:solidFill>
-                <a:schemeClr val="tx1"/>
-              </a:solidFill>
-              <a:prstDash val="solid"/>
-              <a:round/>
-              <a:headEnd type="none" w="med" len="med"/>
-              <a:tailEnd type="none" w="med" len="med"/>
-            </a:ln>
-            <a:effectLst/>
-            <a:extLst/>
-          </p:spPr>
-          <p:txBody>
-            <a:bodyPr vert="horz" wrap="square" lIns="91440" tIns="45720" rIns="91440" bIns="45720" numCol="1" rtlCol="0" anchor="t" anchorCtr="0" compatLnSpc="1">
-              <a:prstTxWarp prst="textNoShape">
-                <a:avLst/>
-              </a:prstTxWarp>
-            </a:bodyPr>
-            <a:lstStyle/>
-            <a:p>
-              <a:pPr marL="0" marR="0" indent="0" algn="l" defTabSz="914400" rtl="0" eaLnBrk="0" fontAlgn="base" latinLnBrk="0" hangingPunct="0">
-                <a:lnSpc>
-                  <a:spcPct val="100000"/>
-                </a:lnSpc>
-                <a:spcBef>
-                  <a:spcPct val="0"/>
-                </a:spcBef>
-                <a:spcAft>
-                  <a:spcPct val="0"/>
-                </a:spcAft>
-                <a:buClrTx/>
-                <a:buSzTx/>
-                <a:buFontTx/>
-                <a:buNone/>
-                <a:tabLst/>
-              </a:pPr>
-              <a:endParaRPr kumimoji="0" lang="de-DE" sz="1600" b="0" i="0" u="none" strike="noStrike" cap="none" normalizeH="0" baseline="0" smtClean="0">
-                <a:ln>
-                  <a:noFill/>
-                </a:ln>
-                <a:solidFill>
-                  <a:schemeClr val="tx1"/>
-                </a:solidFill>
-                <a:effectLst/>
-                <a:latin typeface="Arial" charset="0"/>
-              </a:endParaRPr>
-            </a:p>
-          </p:txBody>
-        </p:sp>
-        <p:sp>
-          <p:nvSpPr>
-            <p:cNvPr id="13" name="TextBox 12"/>
-            <p:cNvSpPr txBox="1"/>
-            <p:nvPr/>
-          </p:nvSpPr>
-          <p:spPr>
-            <a:xfrm>
-              <a:off x="2456984" y="3301325"/>
-              <a:ext cx="1380506" cy="338554"/>
-            </a:xfrm>
-            <a:prstGeom prst="rect">
-              <a:avLst/>
-            </a:prstGeom>
-            <a:noFill/>
-          </p:spPr>
-          <p:txBody>
-            <a:bodyPr wrap="none" rtlCol="0">
-              <a:spAutoFit/>
-            </a:bodyPr>
-            <a:lstStyle/>
-            <a:p>
-              <a:pPr algn="ctr"/>
-              <a:r>
-                <a:rPr lang="en-US" dirty="0" smtClean="0">
-                  <a:solidFill>
-                    <a:schemeClr val="bg1"/>
-                  </a:solidFill>
-                </a:rPr>
-                <a:t>Kernel space</a:t>
-              </a:r>
-              <a:endParaRPr lang="de-DE" dirty="0">
-                <a:solidFill>
-                  <a:schemeClr val="bg1"/>
-                </a:solidFill>
-              </a:endParaRPr>
-            </a:p>
-          </p:txBody>
-        </p:sp>
-        <p:sp>
-          <p:nvSpPr>
-            <p:cNvPr id="15" name="TextBox 14"/>
-            <p:cNvSpPr txBox="1"/>
-            <p:nvPr/>
-          </p:nvSpPr>
-          <p:spPr>
-            <a:xfrm>
-              <a:off x="2422925" y="2779486"/>
-              <a:ext cx="1221809" cy="338554"/>
-            </a:xfrm>
-            <a:prstGeom prst="rect">
-              <a:avLst/>
-            </a:prstGeom>
-            <a:noFill/>
-          </p:spPr>
-          <p:txBody>
-            <a:bodyPr wrap="none" rtlCol="0">
-              <a:spAutoFit/>
-            </a:bodyPr>
-            <a:lstStyle/>
-            <a:p>
-              <a:pPr algn="ctr"/>
-              <a:r>
-                <a:rPr lang="en-US" dirty="0" smtClean="0">
-                  <a:solidFill>
-                    <a:schemeClr val="bg1"/>
-                  </a:solidFill>
-                </a:rPr>
-                <a:t>User space</a:t>
-              </a:r>
-              <a:endParaRPr lang="de-DE" dirty="0">
-                <a:solidFill>
-                  <a:schemeClr val="bg1"/>
-                </a:solidFill>
-              </a:endParaRPr>
-            </a:p>
-          </p:txBody>
-        </p:sp>
-        <p:cxnSp>
-          <p:nvCxnSpPr>
-            <p:cNvPr id="18" name="Straight Connector 17"/>
-            <p:cNvCxnSpPr/>
-            <p:nvPr/>
-          </p:nvCxnSpPr>
-          <p:spPr bwMode="auto">
-            <a:xfrm>
-              <a:off x="949842" y="3301325"/>
-              <a:ext cx="4720856" cy="0"/>
-            </a:xfrm>
-            <a:prstGeom prst="line">
-              <a:avLst/>
-            </a:prstGeom>
-            <a:solidFill>
-              <a:schemeClr val="accent1"/>
-            </a:solidFill>
-            <a:ln w="28575" cap="flat" cmpd="sng" algn="ctr">
-              <a:solidFill>
-                <a:schemeClr val="tx1"/>
-              </a:solidFill>
-              <a:prstDash val="solid"/>
-              <a:round/>
-              <a:headEnd type="none" w="med" len="med"/>
-              <a:tailEnd type="none" w="med" len="med"/>
-            </a:ln>
-            <a:effectLst/>
-            <a:extLst>
-              <a:ext uri="{AF507438-7753-43E0-B8FC-AC1667EBCBE1}">
-                <a14:hiddenEffects xmlns:a14="http://schemas.microsoft.com/office/drawing/2010/main">
-                  <a:effectLst>
-                    <a:outerShdw dist="35921" dir="2700000" algn="ctr" rotWithShape="0">
-                      <a:schemeClr val="bg2"/>
-                    </a:outerShdw>
-                  </a:effectLst>
-                </a14:hiddenEffects>
-              </a:ext>
-            </a:extLst>
-          </p:spPr>
-        </p:cxnSp>
-        <p:sp>
-          <p:nvSpPr>
-            <p:cNvPr id="19" name="Rectangle 18"/>
-            <p:cNvSpPr/>
-            <p:nvPr/>
-          </p:nvSpPr>
-          <p:spPr bwMode="auto">
-            <a:xfrm>
-              <a:off x="3837490" y="2779486"/>
-              <a:ext cx="1578026" cy="422603"/>
-            </a:xfrm>
-            <a:prstGeom prst="rect">
-              <a:avLst/>
-            </a:prstGeom>
-            <a:solidFill>
-              <a:srgbClr val="FF0000"/>
-            </a:solidFill>
-            <a:ln w="9525" cap="flat" cmpd="sng" algn="ctr">
-              <a:solidFill>
-                <a:schemeClr val="tx1"/>
-              </a:solidFill>
-              <a:prstDash val="solid"/>
-              <a:round/>
-              <a:headEnd type="none" w="med" len="med"/>
-              <a:tailEnd type="none" w="med" len="med"/>
-            </a:ln>
-            <a:effectLst/>
-            <a:extLst/>
-          </p:spPr>
-          <p:txBody>
-            <a:bodyPr vert="horz" wrap="square" lIns="91440" tIns="45720" rIns="91440" bIns="45720" numCol="1" rtlCol="0" anchor="ctr" anchorCtr="0" compatLnSpc="1">
-              <a:prstTxWarp prst="textNoShape">
-                <a:avLst/>
-              </a:prstTxWarp>
-            </a:bodyPr>
-            <a:lstStyle/>
-            <a:p>
-              <a:pPr marL="0" marR="0" indent="0" algn="ctr" defTabSz="914400" rtl="0" eaLnBrk="0" fontAlgn="base" latinLnBrk="0" hangingPunct="0">
-                <a:lnSpc>
-                  <a:spcPct val="100000"/>
-                </a:lnSpc>
-                <a:spcBef>
-                  <a:spcPct val="0"/>
-                </a:spcBef>
-                <a:spcAft>
-                  <a:spcPct val="0"/>
-                </a:spcAft>
-                <a:buClrTx/>
-                <a:buSzTx/>
-                <a:buFontTx/>
-                <a:buNone/>
-                <a:tabLst/>
-              </a:pPr>
-              <a:r>
-                <a:rPr kumimoji="0" lang="en-US" sz="1600" b="0" i="0" u="none" strike="noStrike" cap="none" normalizeH="0" baseline="0" dirty="0" smtClean="0">
-                  <a:ln>
-                    <a:noFill/>
-                  </a:ln>
-                  <a:solidFill>
-                    <a:schemeClr val="bg1"/>
-                  </a:solidFill>
-                  <a:effectLst/>
-                  <a:latin typeface="Arial" charset="0"/>
-                </a:rPr>
-                <a:t>DOOCS server</a:t>
-              </a:r>
-              <a:endParaRPr kumimoji="0" lang="de-DE" sz="1600" b="0" i="0" u="none" strike="noStrike" cap="none" normalizeH="0" baseline="0" dirty="0" smtClean="0">
-                <a:ln>
-                  <a:noFill/>
-                </a:ln>
-                <a:solidFill>
-                  <a:schemeClr val="bg1"/>
-                </a:solidFill>
-                <a:effectLst/>
-                <a:latin typeface="Arial" charset="0"/>
-              </a:endParaRPr>
-            </a:p>
-          </p:txBody>
-        </p:sp>
-        <p:sp>
-          <p:nvSpPr>
-            <p:cNvPr id="20" name="Up-Down Arrow 19"/>
-            <p:cNvSpPr/>
-            <p:nvPr/>
-          </p:nvSpPr>
-          <p:spPr bwMode="auto">
-            <a:xfrm>
-              <a:off x="4527265" y="3175000"/>
-              <a:ext cx="198475" cy="444035"/>
-            </a:xfrm>
-            <a:prstGeom prst="upDownArrow">
-              <a:avLst/>
-            </a:prstGeom>
-            <a:solidFill>
-              <a:schemeClr val="accent2">
-                <a:lumMod val="60000"/>
-                <a:lumOff val="40000"/>
-              </a:schemeClr>
-            </a:solidFill>
-            <a:ln w="9525" cap="flat" cmpd="sng" algn="ctr">
-              <a:solidFill>
-                <a:schemeClr val="tx1"/>
-              </a:solidFill>
-              <a:prstDash val="solid"/>
-              <a:round/>
-              <a:headEnd type="none" w="med" len="med"/>
-              <a:tailEnd type="none" w="med" len="med"/>
-            </a:ln>
-            <a:effectLst/>
-            <a:extLst/>
-          </p:spPr>
-          <p:txBody>
-            <a:bodyPr vert="horz" wrap="square" lIns="91440" tIns="45720" rIns="91440" bIns="45720" numCol="1" rtlCol="0" anchor="t" anchorCtr="0" compatLnSpc="1">
-              <a:prstTxWarp prst="textNoShape">
-                <a:avLst/>
-              </a:prstTxWarp>
-            </a:bodyPr>
-            <a:lstStyle/>
-            <a:p>
-              <a:pPr marL="0" marR="0" indent="0" algn="l" defTabSz="914400" rtl="0" eaLnBrk="0" fontAlgn="base" latinLnBrk="0" hangingPunct="0">
-                <a:lnSpc>
-                  <a:spcPct val="100000"/>
-                </a:lnSpc>
-                <a:spcBef>
-                  <a:spcPct val="0"/>
-                </a:spcBef>
-                <a:spcAft>
-                  <a:spcPct val="0"/>
-                </a:spcAft>
-                <a:buClrTx/>
-                <a:buSzTx/>
-                <a:buFontTx/>
-                <a:buNone/>
-                <a:tabLst/>
-              </a:pPr>
-              <a:endParaRPr kumimoji="0" lang="de-DE" sz="1600" b="0" i="0" u="none" strike="noStrike" cap="none" normalizeH="0" baseline="0" smtClean="0">
-                <a:ln>
-                  <a:noFill/>
-                </a:ln>
-                <a:solidFill>
-                  <a:schemeClr val="tx1"/>
-                </a:solidFill>
-                <a:effectLst/>
-                <a:latin typeface="Arial" charset="0"/>
-              </a:endParaRPr>
-            </a:p>
-          </p:txBody>
-        </p:sp>
-      </p:grpSp>
-      <p:sp>
-        <p:nvSpPr>
-          <p:cNvPr id="21" name="TextBox 20"/>
-          <p:cNvSpPr txBox="1"/>
-          <p:nvPr/>
-        </p:nvSpPr>
-        <p:spPr>
-          <a:xfrm>
-            <a:off x="5741580" y="1842823"/>
-            <a:ext cx="3289005" cy="1708160"/>
-          </a:xfrm>
-          <a:prstGeom prst="rect">
-            <a:avLst/>
-          </a:prstGeom>
-          <a:noFill/>
-        </p:spPr>
-        <p:txBody>
-          <a:bodyPr wrap="square" rtlCol="0">
-            <a:spAutoFit/>
-          </a:bodyPr>
-          <a:lstStyle/>
-          <a:p>
-            <a:pPr marL="285750" indent="-285750">
-              <a:buFont typeface="Arial" panose="020B0604020202020204" pitchFamily="34" charset="0"/>
-              <a:buChar char="•"/>
-            </a:pPr>
-            <a:r>
-              <a:rPr lang="en-US" sz="1500" dirty="0" smtClean="0"/>
-              <a:t>Migration to </a:t>
-            </a:r>
-            <a:r>
-              <a:rPr lang="en-US" sz="1500" dirty="0"/>
-              <a:t>U</a:t>
-            </a:r>
-            <a:r>
-              <a:rPr lang="en-US" sz="1500" dirty="0" smtClean="0"/>
-              <a:t>buntu 20</a:t>
-            </a:r>
-          </a:p>
-          <a:p>
-            <a:pPr marL="285750" indent="-285750">
-              <a:buFont typeface="Arial" panose="020B0604020202020204" pitchFamily="34" charset="0"/>
-              <a:buChar char="•"/>
-            </a:pPr>
-            <a:r>
-              <a:rPr lang="en-US" sz="1500" dirty="0"/>
-              <a:t>Making our device-specific drivers compatible with this scheme (for Ubuntu 16 and earlier we had one more layer in between) </a:t>
-            </a:r>
-            <a:endParaRPr lang="en-US" sz="1500" dirty="0" smtClean="0"/>
-          </a:p>
-          <a:p>
-            <a:pPr marL="285750" indent="-285750">
-              <a:buFont typeface="Arial" panose="020B0604020202020204" pitchFamily="34" charset="0"/>
-              <a:buChar char="•"/>
-            </a:pPr>
-            <a:endParaRPr lang="de-DE" sz="1500" dirty="0"/>
-          </a:p>
-        </p:txBody>
-      </p:sp>
-      <p:sp>
-        <p:nvSpPr>
-          <p:cNvPr id="23" name="TextBox 22"/>
-          <p:cNvSpPr txBox="1"/>
-          <p:nvPr/>
-        </p:nvSpPr>
-        <p:spPr>
-          <a:xfrm>
-            <a:off x="5741581" y="3397017"/>
-            <a:ext cx="3289003" cy="2893100"/>
-          </a:xfrm>
-          <a:prstGeom prst="rect">
-            <a:avLst/>
-          </a:prstGeom>
-          <a:noFill/>
-          <a:ln>
-            <a:solidFill>
-              <a:schemeClr val="tx1"/>
-            </a:solidFill>
-          </a:ln>
-        </p:spPr>
-        <p:txBody>
-          <a:bodyPr wrap="square" rtlCol="0">
-            <a:spAutoFit/>
-          </a:bodyPr>
-          <a:lstStyle/>
-          <a:p>
-            <a:r>
-              <a:rPr lang="en-US" sz="1700" b="1" dirty="0" smtClean="0"/>
-              <a:t>Plans</a:t>
-            </a:r>
-          </a:p>
-          <a:p>
-            <a:pPr marL="342900" indent="-342900">
-              <a:buFont typeface="+mj-lt"/>
-              <a:buAutoNum type="arabicPeriod"/>
-            </a:pPr>
-            <a:r>
-              <a:rPr lang="en-US" sz="1500" dirty="0" smtClean="0"/>
-              <a:t>Improving error handling by using </a:t>
-            </a:r>
-            <a:r>
-              <a:rPr lang="en-US" sz="1500" dirty="0" err="1" smtClean="0"/>
-              <a:t>PCIe</a:t>
-            </a:r>
-            <a:r>
-              <a:rPr lang="en-US" sz="1500" dirty="0"/>
-              <a:t> AER (</a:t>
-            </a:r>
-            <a:r>
-              <a:rPr lang="en-US" sz="1100" dirty="0">
+              <a:rPr lang="en-US" sz="1600" dirty="0" smtClean="0"/>
+              <a:t>In order to trap memory allocations functions and make some analyze the following should be done</a:t>
+            </a:r>
+          </a:p>
+          <a:p>
+            <a:r>
+              <a:rPr lang="en-US" sz="1600" dirty="0" smtClean="0"/>
+              <a:t>Overloading C++ operators new </a:t>
+            </a:r>
+            <a:r>
+              <a:rPr lang="en-US" sz="1600" dirty="0"/>
+              <a:t>(</a:t>
+            </a:r>
+            <a:r>
+              <a:rPr lang="en-US" sz="1600" dirty="0">
                 <a:hlinkClick r:id="rId2"/>
               </a:rPr>
-              <a:t>https://www.kernel.org/doc/Documentation/PCI/pcieaer-howto.txt</a:t>
-            </a:r>
-            <a:r>
-              <a:rPr lang="en-US" sz="1500" dirty="0" smtClean="0"/>
-              <a:t>) driver.</a:t>
-            </a:r>
-          </a:p>
-          <a:p>
-            <a:pPr marL="342900" indent="-342900">
-              <a:buFont typeface="+mj-lt"/>
-              <a:buAutoNum type="arabicPeriod"/>
-            </a:pPr>
-            <a:r>
-              <a:rPr lang="en-US" sz="1500" dirty="0"/>
-              <a:t>Make it possible to handle a simple device with this driver.</a:t>
-            </a:r>
-            <a:endParaRPr lang="en-US" sz="1500" dirty="0" smtClean="0"/>
-          </a:p>
-          <a:p>
-            <a:pPr marL="342900" indent="-342900">
-              <a:buFont typeface="+mj-lt"/>
-              <a:buAutoNum type="arabicPeriod"/>
-            </a:pPr>
-            <a:r>
-              <a:rPr lang="en-US" sz="1500" dirty="0"/>
-              <a:t>To have the possibility to handle interrupt of simple devices from the universal driver (when point 2 is done).</a:t>
-            </a:r>
-            <a:endParaRPr lang="en-US" sz="1500" dirty="0" smtClean="0"/>
-          </a:p>
-          <a:p>
-            <a:pPr marL="285750" indent="-285750">
-              <a:buFont typeface="Arial" panose="020B0604020202020204" pitchFamily="34" charset="0"/>
-              <a:buChar char="•"/>
-            </a:pPr>
-            <a:endParaRPr lang="de-DE" sz="1500" dirty="0"/>
+              <a:t>https://</a:t>
+            </a:r>
+            <a:r>
+              <a:rPr lang="en-US" sz="1600" dirty="0" smtClean="0">
+                <a:hlinkClick r:id="rId2"/>
+              </a:rPr>
+              <a:t>en.cppreference.com/w/cpp/memory/new/operator_new</a:t>
+            </a:r>
+            <a:r>
+              <a:rPr lang="en-US" sz="1600" dirty="0" smtClean="0"/>
+              <a:t>) and delete </a:t>
+            </a:r>
+            <a:r>
+              <a:rPr lang="en-US" sz="1600" dirty="0"/>
+              <a:t>(</a:t>
+            </a:r>
+            <a:r>
+              <a:rPr lang="en-US" sz="1600" dirty="0">
+                <a:hlinkClick r:id="rId3"/>
+              </a:rPr>
+              <a:t>https://</a:t>
+            </a:r>
+            <a:r>
+              <a:rPr lang="en-US" sz="1600" dirty="0" smtClean="0">
+                <a:hlinkClick r:id="rId3"/>
+              </a:rPr>
+              <a:t>en.cppreference.com/w/cpp/memory/new/operator_delete</a:t>
+            </a:r>
+            <a:r>
+              <a:rPr lang="en-US" sz="1600" dirty="0" smtClean="0"/>
+              <a:t>).</a:t>
+            </a:r>
+            <a:r>
+              <a:rPr lang="en-US" sz="1600" dirty="0"/>
+              <a:t/>
+            </a:r>
+            <a:br>
+              <a:rPr lang="en-US" sz="1600" dirty="0"/>
+            </a:br>
+            <a:r>
+              <a:rPr lang="en-US" sz="1600" dirty="0"/>
+              <a:t>Sometimes only overwriting of these functions can help to detect problems. If the problem is there because of C functions (</a:t>
+            </a:r>
+            <a:r>
+              <a:rPr lang="en-US" sz="1600" dirty="0" err="1"/>
+              <a:t>malloc</a:t>
+            </a:r>
+            <a:r>
+              <a:rPr lang="en-US" sz="1600" dirty="0"/>
+              <a:t> and friends), then these overloads will not be helpful.  </a:t>
+            </a:r>
+            <a:endParaRPr lang="en-US" sz="1600" dirty="0" smtClean="0"/>
+          </a:p>
+          <a:p>
+            <a:r>
+              <a:rPr lang="en-US" sz="1600" dirty="0" smtClean="0"/>
+              <a:t>Rewriting </a:t>
+            </a:r>
+            <a:r>
+              <a:rPr lang="en-US" sz="1600" dirty="0" err="1" smtClean="0"/>
+              <a:t>malloc</a:t>
+            </a:r>
+            <a:r>
+              <a:rPr lang="en-US" sz="1600" dirty="0" smtClean="0"/>
+              <a:t>, </a:t>
+            </a:r>
+            <a:r>
+              <a:rPr lang="en-US" sz="1600" dirty="0" err="1" smtClean="0"/>
+              <a:t>calloc</a:t>
+            </a:r>
+            <a:r>
+              <a:rPr lang="en-US" sz="1600" dirty="0" smtClean="0"/>
+              <a:t>, </a:t>
+            </a:r>
+            <a:r>
+              <a:rPr lang="en-US" sz="1600" dirty="0" err="1" smtClean="0"/>
+              <a:t>realloc</a:t>
+            </a:r>
+            <a:r>
+              <a:rPr lang="en-US" sz="1600" dirty="0" smtClean="0"/>
+              <a:t> and free.</a:t>
+            </a:r>
+            <a:r>
+              <a:rPr lang="en-US" sz="1600" dirty="0"/>
+              <a:t/>
+            </a:r>
+            <a:br>
+              <a:rPr lang="en-US" sz="1600" dirty="0"/>
+            </a:br>
+            <a:r>
+              <a:rPr lang="en-US" sz="1600" dirty="0"/>
+              <a:t>In case, if an application has its own </a:t>
+            </a:r>
+            <a:r>
+              <a:rPr lang="en-US" sz="1600" dirty="0" err="1"/>
+              <a:t>malloc</a:t>
+            </a:r>
+            <a:r>
+              <a:rPr lang="en-US" sz="1600" dirty="0"/>
+              <a:t> and friends function, then the application's functions will be called instead of Glibc functions. This will happen because these functions are defined as weak symbols and any new symbol with the same name(s) will be used instead. This is true only for Linux, for Windows hacking </a:t>
+            </a:r>
+            <a:r>
+              <a:rPr lang="en-US" sz="1600" dirty="0" err="1"/>
+              <a:t>malloc</a:t>
+            </a:r>
+            <a:r>
+              <a:rPr lang="en-US" sz="1600" dirty="0"/>
+              <a:t> is more complicated and a topic for a separate discussion</a:t>
+            </a:r>
+            <a:r>
+              <a:rPr lang="en-US" sz="1600" dirty="0" smtClean="0"/>
+              <a:t>.</a:t>
+            </a:r>
+          </a:p>
+          <a:p>
+            <a:r>
+              <a:rPr lang="en-US" sz="1600" dirty="0"/>
+              <a:t>In order to load the analyzer library to the already compiled process address space without recompilation - the following techniques are used</a:t>
+            </a:r>
+            <a:r>
+              <a:rPr lang="en-US" sz="1600" dirty="0" smtClean="0"/>
+              <a:t> </a:t>
+            </a:r>
+            <a:r>
+              <a:rPr lang="en-US" sz="1600" dirty="0"/>
+              <a:t>(</a:t>
+            </a:r>
+            <a:r>
+              <a:rPr lang="en-US" sz="1550" dirty="0">
+                <a:hlinkClick r:id="rId4"/>
+              </a:rPr>
+              <a:t>https://</a:t>
+            </a:r>
+            <a:r>
+              <a:rPr lang="en-US" sz="1550" dirty="0" smtClean="0">
+                <a:hlinkClick r:id="rId4"/>
+              </a:rPr>
+              <a:t>en.wikipedia.org/wiki/DLL_injection</a:t>
+            </a:r>
+            <a:r>
+              <a:rPr lang="en-US" sz="1600" dirty="0" smtClean="0"/>
+              <a:t>)</a:t>
+            </a:r>
+            <a:endParaRPr lang="de-DE" sz="1600" dirty="0"/>
+          </a:p>
+          <a:p>
+            <a:pPr lvl="1"/>
+            <a:r>
+              <a:rPr lang="en-US" sz="1200" dirty="0" smtClean="0"/>
+              <a:t>Linux: LD_PRELOAD environment variable</a:t>
+            </a:r>
+          </a:p>
+          <a:p>
+            <a:pPr lvl="1"/>
+            <a:r>
+              <a:rPr lang="en-US" sz="1200" dirty="0" smtClean="0"/>
+              <a:t>Windows: DLL injection</a:t>
+            </a:r>
+          </a:p>
+          <a:p>
+            <a:pPr lvl="2"/>
+            <a:r>
+              <a:rPr lang="en-US" sz="900" dirty="0" smtClean="0"/>
+              <a:t>1. Using  </a:t>
+            </a:r>
+            <a:r>
+              <a:rPr lang="en-US" sz="900" dirty="0" err="1" smtClean="0"/>
+              <a:t>WriteProcessMemory+CreateRemoteThread</a:t>
+            </a:r>
+            <a:r>
+              <a:rPr lang="en-US" sz="900" dirty="0" smtClean="0"/>
+              <a:t> or</a:t>
+            </a:r>
+          </a:p>
+          <a:p>
+            <a:pPr lvl="2"/>
+            <a:r>
+              <a:rPr lang="en-US" sz="900" dirty="0" smtClean="0"/>
+              <a:t>2. Using registry “</a:t>
+            </a:r>
+            <a:r>
+              <a:rPr lang="de-DE" sz="900" dirty="0"/>
+              <a:t>HKEY_LOCAL_MACHINE\SOFTWARE\Microsoft\Windows NT\</a:t>
+            </a:r>
+            <a:r>
+              <a:rPr lang="de-DE" sz="900" dirty="0" err="1"/>
+              <a:t>CurrentVersion</a:t>
+            </a:r>
+            <a:r>
+              <a:rPr lang="de-DE" sz="900" dirty="0"/>
+              <a:t>\Windows\</a:t>
+            </a:r>
+            <a:r>
+              <a:rPr lang="de-DE" sz="900" dirty="0" err="1"/>
+              <a:t>AppInit_DLLs</a:t>
+            </a:r>
+            <a:r>
+              <a:rPr lang="en-US" sz="900" dirty="0" smtClean="0"/>
+              <a:t>”</a:t>
+            </a:r>
+            <a:endParaRPr lang="en-US" sz="900" dirty="0"/>
           </a:p>
         </p:txBody>
       </p:sp>
     </p:spTree>
     <p:extLst>
       <p:ext uri="{BB962C8B-B14F-4D97-AF65-F5344CB8AC3E}">
-        <p14:creationId xmlns:p14="http://schemas.microsoft.com/office/powerpoint/2010/main" val="1347251138"/>
+        <p14:creationId xmlns:p14="http://schemas.microsoft.com/office/powerpoint/2010/main" val="3765827145"/>
       </p:ext>
     </p:extLst>
   </p:cSld>
   <p:clrMapOvr>
     <a:masterClrMapping/>
   </p:clrMapOvr>
-  <p:timing>
-    <p:tnLst>
-      <p:par>
-        <p:cTn id="1" dur="indefinite" restart="never" nodeType="tmRoot"/>
-      </p:par>
-    </p:tnLst>
-  </p:timing>
 </p:sld>
 </file>
 
@@ -5151,723 +4852,26 @@
           <a:p>
             <a:r>
               <a:rPr lang="en-US" dirty="0" smtClean="0"/>
-              <a:t>Device specific driver development</a:t>
-            </a:r>
-            <a:endParaRPr lang="de-DE" dirty="0"/>
-          </a:p>
-        </p:txBody>
-      </p:sp>
-      <p:sp>
-        <p:nvSpPr>
-          <p:cNvPr id="3" name="Content Placeholder 2"/>
-          <p:cNvSpPr>
-            <a:spLocks noGrp="1"/>
-          </p:cNvSpPr>
-          <p:nvPr>
-            <p:ph idx="1"/>
-          </p:nvPr>
-        </p:nvSpPr>
-        <p:spPr/>
-        <p:txBody>
-          <a:bodyPr/>
-          <a:lstStyle/>
-          <a:p>
-            <a:r>
-              <a:rPr lang="en-US" dirty="0" smtClean="0"/>
-              <a:t>Driver for TAMC200 (</a:t>
+              <a:t>Code will be </a:t>
             </a:r>
             <a:r>
               <a:rPr lang="en-US" dirty="0" err="1" smtClean="0"/>
-              <a:t>Tews</a:t>
-            </a:r>
-            <a:r>
-              <a:rPr lang="en-US" dirty="0" smtClean="0"/>
-              <a:t> </a:t>
-            </a:r>
-            <a:r>
-              <a:rPr lang="en-US" dirty="0"/>
-              <a:t>AMC) (</a:t>
-            </a:r>
-            <a:r>
-              <a:rPr lang="en-US" dirty="0">
-                <a:hlinkClick r:id="rId2"/>
-              </a:rPr>
-              <a:t>https://</a:t>
-            </a:r>
-            <a:r>
-              <a:rPr lang="en-US" dirty="0" smtClean="0">
-                <a:hlinkClick r:id="rId2"/>
-              </a:rPr>
-              <a:t>www.tews.com/Products/ArticleGroup/TAMC/TAMC200.html</a:t>
-            </a:r>
-            <a:r>
-              <a:rPr lang="en-US" dirty="0" smtClean="0"/>
-              <a:t>)</a:t>
-            </a:r>
-            <a:r>
-              <a:rPr lang="de-DE" dirty="0" smtClean="0"/>
-              <a:t/>
-            </a:r>
-            <a:br>
-              <a:rPr lang="de-DE" dirty="0" smtClean="0"/>
-            </a:br>
-            <a:r>
-              <a:rPr lang="en-US" dirty="0"/>
-              <a:t>Migrated to Ubuntu 20. DKMS </a:t>
-            </a:r>
-            <a:r>
-              <a:rPr lang="en-US" dirty="0" err="1"/>
-              <a:t>Debian</a:t>
-            </a:r>
-            <a:r>
-              <a:rPr lang="en-US" dirty="0"/>
-              <a:t> package is hosted by </a:t>
-            </a:r>
-            <a:r>
-              <a:rPr lang="en-US" dirty="0" err="1"/>
-              <a:t>Debian</a:t>
-            </a:r>
-            <a:r>
-              <a:rPr lang="en-US" dirty="0"/>
-              <a:t> repository supported by MCS4.</a:t>
-            </a:r>
-            <a:endParaRPr lang="de-DE" dirty="0" smtClean="0"/>
-          </a:p>
-          <a:p>
-            <a:endParaRPr lang="en-US" dirty="0" smtClean="0"/>
-          </a:p>
-          <a:p>
-            <a:endParaRPr lang="en-US" dirty="0"/>
-          </a:p>
-          <a:p>
-            <a:endParaRPr lang="en-US" dirty="0" smtClean="0"/>
-          </a:p>
-          <a:p>
-            <a:endParaRPr lang="en-US" dirty="0"/>
-          </a:p>
-          <a:p>
-            <a:endParaRPr lang="en-US" dirty="0" smtClean="0"/>
-          </a:p>
-          <a:p>
-            <a:r>
-              <a:rPr lang="en-US" dirty="0" smtClean="0"/>
-              <a:t>There </a:t>
-            </a:r>
-            <a:r>
-              <a:rPr lang="en-US" dirty="0"/>
-              <a:t>are plans to investigate and optimize drivers for ADC measurement devices. There is a test driver developed and tested at </a:t>
-            </a:r>
-            <a:r>
-              <a:rPr lang="en-US" dirty="0" err="1"/>
-              <a:t>Zeuthen</a:t>
-            </a:r>
-            <a:r>
-              <a:rPr lang="en-US" dirty="0"/>
-              <a:t> as well there is a driver developed by MCS colleagues. The goal is to use statistics on both drivers and make one with better performance and memory usage. </a:t>
-            </a:r>
-            <a:endParaRPr lang="en-US" dirty="0" smtClean="0"/>
-          </a:p>
-        </p:txBody>
-      </p:sp>
-      <p:grpSp>
-        <p:nvGrpSpPr>
-          <p:cNvPr id="6" name="Group 5"/>
-          <p:cNvGrpSpPr/>
-          <p:nvPr/>
-        </p:nvGrpSpPr>
-        <p:grpSpPr>
-          <a:xfrm>
-            <a:off x="4171710" y="1991833"/>
-            <a:ext cx="3427026" cy="2273494"/>
-            <a:chOff x="641701" y="4061638"/>
-            <a:chExt cx="3427026" cy="2273494"/>
-          </a:xfrm>
-        </p:grpSpPr>
-        <p:pic>
-          <p:nvPicPr>
-            <p:cNvPr id="4" name="Picture 3"/>
-            <p:cNvPicPr>
-              <a:picLocks noChangeAspect="1"/>
-            </p:cNvPicPr>
-            <p:nvPr/>
-          </p:nvPicPr>
-          <p:blipFill>
-            <a:blip r:embed="rId3">
-              <a:extLst>
-                <a:ext uri="{28A0092B-C50C-407E-A947-70E740481C1C}">
-                  <a14:useLocalDpi xmlns:a14="http://schemas.microsoft.com/office/drawing/2010/main" val="0"/>
-                </a:ext>
-              </a:extLst>
-            </a:blip>
-            <a:stretch>
-              <a:fillRect/>
-            </a:stretch>
-          </p:blipFill>
-          <p:spPr>
-            <a:xfrm>
-              <a:off x="641701" y="4061638"/>
-              <a:ext cx="3345730" cy="2055627"/>
-            </a:xfrm>
-            <a:prstGeom prst="rect">
-              <a:avLst/>
-            </a:prstGeom>
-          </p:spPr>
-        </p:pic>
-        <p:sp>
-          <p:nvSpPr>
-            <p:cNvPr id="5" name="TextBox 4"/>
-            <p:cNvSpPr txBox="1"/>
-            <p:nvPr/>
-          </p:nvSpPr>
-          <p:spPr>
-            <a:xfrm>
-              <a:off x="1020727" y="6088911"/>
-              <a:ext cx="3048000" cy="246221"/>
-            </a:xfrm>
-            <a:prstGeom prst="rect">
-              <a:avLst/>
-            </a:prstGeom>
-            <a:noFill/>
-          </p:spPr>
-          <p:txBody>
-            <a:bodyPr wrap="square" rtlCol="0">
-              <a:spAutoFit/>
-            </a:bodyPr>
-            <a:lstStyle/>
-            <a:p>
-              <a:r>
-                <a:rPr lang="de-DE" sz="1000" b="1" dirty="0"/>
-                <a:t>TAMC200 3 Slot </a:t>
-              </a:r>
-              <a:r>
-                <a:rPr lang="de-DE" sz="1000" b="1" dirty="0" err="1"/>
-                <a:t>IndustryPack</a:t>
-              </a:r>
-              <a:r>
-                <a:rPr lang="de-DE" sz="1000" b="1" dirty="0"/>
-                <a:t> Carrier </a:t>
-              </a:r>
-              <a:r>
-                <a:rPr lang="de-DE" sz="1000" b="1" dirty="0" err="1"/>
-                <a:t>for</a:t>
-              </a:r>
-              <a:r>
-                <a:rPr lang="de-DE" sz="1000" b="1" dirty="0"/>
-                <a:t> AMC</a:t>
-              </a:r>
-              <a:endParaRPr lang="de-DE" sz="1000" dirty="0"/>
-            </a:p>
-          </p:txBody>
-        </p:sp>
-      </p:grpSp>
-    </p:spTree>
-    <p:extLst>
-      <p:ext uri="{BB962C8B-B14F-4D97-AF65-F5344CB8AC3E}">
-        <p14:creationId xmlns:p14="http://schemas.microsoft.com/office/powerpoint/2010/main" val="3179875872"/>
-      </p:ext>
-    </p:extLst>
-  </p:cSld>
-  <p:clrMapOvr>
-    <a:masterClrMapping/>
-  </p:clrMapOvr>
-  <p:timing>
-    <p:tnLst>
-      <p:par>
-        <p:cTn id="1" dur="indefinite" restart="never" nodeType="tmRoot"/>
-      </p:par>
-    </p:tnLst>
-  </p:timing>
-</p:sld>
-</file>
-
-<file path=ppt/slides/slide7.xml><?xml version="1.0" encoding="utf-8"?>
-<p:sld xmlns:a="http://schemas.openxmlformats.org/drawingml/2006/main" xmlns:r="http://schemas.openxmlformats.org/officeDocument/2006/relationships" xmlns:p="http://schemas.openxmlformats.org/presentationml/2006/main">
-  <p:cSld>
-    <p:spTree>
-      <p:nvGrpSpPr>
-        <p:cNvPr id="1" name=""/>
-        <p:cNvGrpSpPr/>
-        <p:nvPr/>
-      </p:nvGrpSpPr>
-      <p:grpSpPr>
-        <a:xfrm>
-          <a:off x="0" y="0"/>
-          <a:ext cx="0" cy="0"/>
-          <a:chOff x="0" y="0"/>
-          <a:chExt cx="0" cy="0"/>
-        </a:xfrm>
-      </p:grpSpPr>
-      <p:sp>
-        <p:nvSpPr>
-          <p:cNvPr id="2" name="Title 1"/>
-          <p:cNvSpPr>
-            <a:spLocks noGrp="1"/>
-          </p:cNvSpPr>
-          <p:nvPr>
-            <p:ph type="title"/>
-          </p:nvPr>
-        </p:nvSpPr>
-        <p:spPr/>
-        <p:txBody>
-          <a:bodyPr/>
-          <a:lstStyle/>
-          <a:p>
-            <a:r>
-              <a:rPr lang="en-US" dirty="0" smtClean="0"/>
-              <a:t>Windows DOOCS</a:t>
-            </a:r>
-            <a:endParaRPr lang="de-DE" dirty="0"/>
-          </a:p>
-        </p:txBody>
-      </p:sp>
-      <p:sp>
-        <p:nvSpPr>
-          <p:cNvPr id="3" name="Content Placeholder 2"/>
-          <p:cNvSpPr>
-            <a:spLocks noGrp="1"/>
-          </p:cNvSpPr>
-          <p:nvPr>
-            <p:ph idx="1"/>
-          </p:nvPr>
-        </p:nvSpPr>
-        <p:spPr>
-          <a:xfrm>
-            <a:off x="183338" y="836133"/>
-            <a:ext cx="8818895" cy="5224425"/>
-          </a:xfrm>
-        </p:spPr>
-        <p:txBody>
-          <a:bodyPr/>
-          <a:lstStyle/>
-          <a:p>
-            <a:r>
-              <a:rPr lang="en-US" sz="1900" dirty="0" smtClean="0"/>
-              <a:t>Supporting XDR RPC windows version.</a:t>
-            </a:r>
-          </a:p>
-          <a:p>
-            <a:r>
-              <a:rPr lang="en-US" sz="1900" dirty="0" smtClean="0"/>
-              <a:t>Contribution to port DOOCS client library to Windows.</a:t>
-            </a:r>
-          </a:p>
-          <a:p>
-            <a:r>
-              <a:rPr lang="en-US" sz="1900" dirty="0" smtClean="0"/>
-              <a:t>DOOCS server library </a:t>
-            </a:r>
-            <a:r>
-              <a:rPr lang="en-US" sz="1900" dirty="0"/>
-              <a:t>preparation and support </a:t>
-            </a:r>
-            <a:r>
-              <a:rPr lang="en-US" sz="1900" dirty="0" smtClean="0"/>
-              <a:t>for Windows.</a:t>
-            </a:r>
-            <a:br>
-              <a:rPr lang="en-US" sz="1900" dirty="0" smtClean="0"/>
-            </a:br>
-            <a:r>
-              <a:rPr lang="en-US" sz="1900" dirty="0"/>
-              <a:t>For server library repository was forked and code modified to make it possible to compile it for Windows.</a:t>
-            </a:r>
-            <a:endParaRPr lang="en-US" sz="1900" dirty="0" smtClean="0"/>
-          </a:p>
-          <a:p>
-            <a:pPr marL="0" indent="0">
-              <a:buNone/>
-            </a:pPr>
-            <a:endParaRPr lang="en-US" sz="1900" dirty="0" smtClean="0"/>
-          </a:p>
-          <a:p>
-            <a:pPr marL="0" indent="0">
-              <a:buNone/>
-            </a:pPr>
-            <a:r>
-              <a:rPr lang="en-US" sz="2300" b="1" dirty="0" smtClean="0"/>
-              <a:t>Plans</a:t>
-            </a:r>
-            <a:endParaRPr lang="en-US" sz="2300" b="1" dirty="0"/>
-          </a:p>
-          <a:p>
-            <a:r>
-              <a:rPr lang="en-US" sz="1900" dirty="0" smtClean="0"/>
-              <a:t>Finalize DOOCS client part modification for making it available for Windows compilation using Microsoft compiler and finally bring it to official support by DOOCS </a:t>
-            </a:r>
-            <a:r>
-              <a:rPr lang="en-US" sz="1900" dirty="0" err="1" smtClean="0"/>
-              <a:t>devs</a:t>
-            </a:r>
-            <a:r>
-              <a:rPr lang="en-US" sz="1900" dirty="0" smtClean="0"/>
-              <a:t>.</a:t>
-            </a:r>
-          </a:p>
-          <a:p>
-            <a:r>
-              <a:rPr lang="en-US" sz="1900" dirty="0" smtClean="0"/>
-              <a:t>DOOCS client utilities (currently they are compiled from forked codes).</a:t>
-            </a:r>
-          </a:p>
-          <a:p>
-            <a:r>
-              <a:rPr lang="en-US" sz="1900" dirty="0"/>
-              <a:t>DOOCS server library (make original code compatible with Windows).</a:t>
-            </a:r>
-            <a:endParaRPr lang="en-US" sz="1900" dirty="0" smtClean="0"/>
-          </a:p>
-          <a:p>
-            <a:r>
-              <a:rPr lang="en-US" sz="1900" dirty="0" smtClean="0"/>
-              <a:t>DOOCS standard servers (watchdog for example (we are using a fork of Windows DOOCS watchdog)).</a:t>
-            </a:r>
-            <a:endParaRPr lang="de-DE" sz="1900" dirty="0"/>
-          </a:p>
-        </p:txBody>
-      </p:sp>
-    </p:spTree>
-    <p:extLst>
-      <p:ext uri="{BB962C8B-B14F-4D97-AF65-F5344CB8AC3E}">
-        <p14:creationId xmlns:p14="http://schemas.microsoft.com/office/powerpoint/2010/main" val="3003147533"/>
-      </p:ext>
-    </p:extLst>
-  </p:cSld>
-  <p:clrMapOvr>
-    <a:masterClrMapping/>
-  </p:clrMapOvr>
-  <p:timing>
-    <p:tnLst>
-      <p:par>
-        <p:cTn id="1" dur="indefinite" restart="never" nodeType="tmRoot"/>
-      </p:par>
-    </p:tnLst>
-  </p:timing>
-</p:sld>
-</file>
-
-<file path=ppt/slides/slide8.xml><?xml version="1.0" encoding="utf-8"?>
-<p:sld xmlns:a="http://schemas.openxmlformats.org/drawingml/2006/main" xmlns:r="http://schemas.openxmlformats.org/officeDocument/2006/relationships" xmlns:p="http://schemas.openxmlformats.org/presentationml/2006/main">
-  <p:cSld>
-    <p:spTree>
-      <p:nvGrpSpPr>
-        <p:cNvPr id="1" name=""/>
-        <p:cNvGrpSpPr/>
-        <p:nvPr/>
-      </p:nvGrpSpPr>
-      <p:grpSpPr>
-        <a:xfrm>
-          <a:off x="0" y="0"/>
-          <a:ext cx="0" cy="0"/>
-          <a:chOff x="0" y="0"/>
-          <a:chExt cx="0" cy="0"/>
-        </a:xfrm>
-      </p:grpSpPr>
-      <p:sp>
-        <p:nvSpPr>
-          <p:cNvPr id="2" name="Title 1"/>
-          <p:cNvSpPr>
-            <a:spLocks noGrp="1"/>
-          </p:cNvSpPr>
-          <p:nvPr>
-            <p:ph type="title"/>
-          </p:nvPr>
-        </p:nvSpPr>
-        <p:spPr/>
-        <p:txBody>
-          <a:bodyPr/>
-          <a:lstStyle/>
-          <a:p>
-            <a:r>
-              <a:rPr lang="en-US" dirty="0" err="1" smtClean="0"/>
-              <a:t>Emwiz</a:t>
-            </a:r>
-            <a:r>
-              <a:rPr lang="en-US" dirty="0" smtClean="0"/>
-              <a:t> migration from SL6 to SL7</a:t>
-            </a:r>
-            <a:endParaRPr lang="de-DE" dirty="0"/>
-          </a:p>
-        </p:txBody>
-      </p:sp>
-      <p:sp>
-        <p:nvSpPr>
-          <p:cNvPr id="3" name="Content Placeholder 2"/>
-          <p:cNvSpPr>
-            <a:spLocks noGrp="1"/>
-          </p:cNvSpPr>
-          <p:nvPr>
-            <p:ph idx="1"/>
-          </p:nvPr>
-        </p:nvSpPr>
-        <p:spPr/>
-        <p:txBody>
-          <a:bodyPr/>
-          <a:lstStyle/>
-          <a:p>
-            <a:r>
-              <a:rPr lang="en-US" dirty="0" smtClean="0"/>
-              <a:t>Prepared </a:t>
-            </a:r>
-            <a:r>
-              <a:rPr lang="en-US" dirty="0" err="1" smtClean="0"/>
-              <a:t>qtRoot</a:t>
-            </a:r>
-            <a:r>
-              <a:rPr lang="en-US" dirty="0" smtClean="0"/>
-              <a:t> for SL7 </a:t>
-            </a:r>
-            <a:r>
-              <a:rPr lang="en-US" smtClean="0"/>
-              <a:t>currently needed </a:t>
-            </a:r>
-            <a:r>
-              <a:rPr lang="en-US" dirty="0" smtClean="0"/>
-              <a:t>for plotting</a:t>
-            </a:r>
-          </a:p>
-          <a:p>
-            <a:r>
-              <a:rPr lang="en-US" dirty="0" smtClean="0"/>
-              <a:t>Fixed some bugs</a:t>
-            </a:r>
-            <a:endParaRPr lang="de-DE" dirty="0"/>
-          </a:p>
-        </p:txBody>
-      </p:sp>
-    </p:spTree>
-    <p:extLst>
-      <p:ext uri="{BB962C8B-B14F-4D97-AF65-F5344CB8AC3E}">
-        <p14:creationId xmlns:p14="http://schemas.microsoft.com/office/powerpoint/2010/main" val="2336198926"/>
-      </p:ext>
-    </p:extLst>
-  </p:cSld>
-  <p:clrMapOvr>
-    <a:masterClrMapping/>
-  </p:clrMapOvr>
-  <p:timing>
-    <p:tnLst>
-      <p:par>
-        <p:cTn id="1" dur="indefinite" restart="never" nodeType="tmRoot"/>
-      </p:par>
-    </p:tnLst>
-  </p:timing>
-</p:sld>
-</file>
-
-<file path=ppt/slides/slide9.xml><?xml version="1.0" encoding="utf-8"?>
-<p:sld xmlns:a="http://schemas.openxmlformats.org/drawingml/2006/main" xmlns:r="http://schemas.openxmlformats.org/officeDocument/2006/relationships" xmlns:p="http://schemas.openxmlformats.org/presentationml/2006/main">
-  <p:cSld>
-    <p:spTree>
-      <p:nvGrpSpPr>
-        <p:cNvPr id="1" name=""/>
-        <p:cNvGrpSpPr/>
-        <p:nvPr/>
-      </p:nvGrpSpPr>
-      <p:grpSpPr>
-        <a:xfrm>
-          <a:off x="0" y="0"/>
-          <a:ext cx="0" cy="0"/>
-          <a:chOff x="0" y="0"/>
-          <a:chExt cx="0" cy="0"/>
-        </a:xfrm>
-      </p:grpSpPr>
-      <p:sp>
-        <p:nvSpPr>
-          <p:cNvPr id="2" name="Title 1"/>
-          <p:cNvSpPr>
-            <a:spLocks noGrp="1"/>
-          </p:cNvSpPr>
-          <p:nvPr>
-            <p:ph type="title"/>
-          </p:nvPr>
-        </p:nvSpPr>
-        <p:spPr/>
-        <p:txBody>
-          <a:bodyPr/>
-          <a:lstStyle/>
-          <a:p>
-            <a:r>
-              <a:rPr lang="en-US" dirty="0" smtClean="0"/>
-              <a:t>Migration from VME crates to newer technologies</a:t>
-            </a:r>
-            <a:endParaRPr lang="de-DE" dirty="0"/>
-          </a:p>
-        </p:txBody>
-      </p:sp>
-      <p:sp>
-        <p:nvSpPr>
-          <p:cNvPr id="3" name="Content Placeholder 2"/>
-          <p:cNvSpPr>
-            <a:spLocks noGrp="1"/>
-          </p:cNvSpPr>
-          <p:nvPr>
-            <p:ph idx="1"/>
-          </p:nvPr>
-        </p:nvSpPr>
-        <p:spPr/>
-        <p:txBody>
-          <a:bodyPr/>
-          <a:lstStyle/>
-          <a:p>
-            <a:r>
-              <a:rPr lang="en-US" dirty="0"/>
-              <a:t>Took part in the migration of several devices from VME to </a:t>
-            </a:r>
-            <a:r>
-              <a:rPr lang="en-US" dirty="0" err="1" smtClean="0"/>
-              <a:t>mTCA</a:t>
-            </a:r>
-            <a:r>
-              <a:rPr lang="en-US" dirty="0" smtClean="0"/>
-              <a:t>.</a:t>
-            </a:r>
-          </a:p>
-          <a:p>
-            <a:r>
-              <a:rPr lang="en-US" dirty="0"/>
-              <a:t>Migration of control of </a:t>
-            </a:r>
-            <a:r>
-              <a:rPr lang="en-US" dirty="0" err="1"/>
-              <a:t>Micos</a:t>
-            </a:r>
-            <a:r>
-              <a:rPr lang="en-US" dirty="0"/>
-              <a:t> motor controllers </a:t>
-            </a:r>
-            <a:r>
-              <a:rPr lang="en-US" dirty="0" smtClean="0"/>
-              <a:t/>
-            </a:r>
-            <a:br>
-              <a:rPr lang="en-US" dirty="0" smtClean="0"/>
-            </a:br>
-            <a:r>
-              <a:rPr lang="en-US" dirty="0" smtClean="0"/>
-              <a:t>from </a:t>
-            </a:r>
-            <a:r>
-              <a:rPr lang="en-US" dirty="0"/>
-              <a:t>VME crates to raspberry pi based newer </a:t>
-            </a:r>
-            <a:r>
-              <a:rPr lang="en-US" dirty="0" smtClean="0"/>
-              <a:t/>
-            </a:r>
-            <a:br>
-              <a:rPr lang="en-US" dirty="0" smtClean="0"/>
-            </a:br>
-            <a:r>
-              <a:rPr lang="en-US" dirty="0" smtClean="0"/>
-              <a:t>controller </a:t>
-            </a:r>
-            <a:r>
-              <a:rPr lang="en-US" dirty="0"/>
-              <a:t>box is ongoing.</a:t>
-            </a:r>
-            <a:endParaRPr lang="en-US" dirty="0" smtClean="0"/>
-          </a:p>
-          <a:p>
-            <a:pPr marL="0" indent="0">
-              <a:buNone/>
-            </a:pPr>
-            <a:r>
-              <a:rPr lang="en-US" sz="2400" b="1" dirty="0" smtClean="0"/>
-              <a:t>Plans</a:t>
-            </a:r>
-          </a:p>
-          <a:p>
-            <a:r>
-              <a:rPr lang="en-US" dirty="0" smtClean="0"/>
-              <a:t>DRS4 Evaluation </a:t>
-            </a:r>
-            <a:r>
-              <a:rPr lang="en-US" dirty="0"/>
-              <a:t>board </a:t>
-            </a:r>
-            <a:r>
-              <a:rPr lang="en-US" dirty="0" smtClean="0"/>
-              <a:t/>
-            </a:r>
-            <a:br>
-              <a:rPr lang="en-US" dirty="0" smtClean="0"/>
-            </a:br>
-            <a:r>
-              <a:rPr lang="en-US" dirty="0" smtClean="0"/>
-              <a:t>(</a:t>
-            </a:r>
-            <a:r>
-              <a:rPr lang="en-US" dirty="0">
-                <a:hlinkClick r:id="rId2"/>
-              </a:rPr>
-              <a:t>https://www.psi.ch/en/drs/evaluation-board</a:t>
-            </a:r>
-            <a:r>
-              <a:rPr lang="en-US" dirty="0" smtClean="0"/>
-              <a:t>) </a:t>
-            </a:r>
-            <a:br>
-              <a:rPr lang="en-US" dirty="0" smtClean="0"/>
-            </a:br>
-            <a:r>
-              <a:rPr lang="en-US" dirty="0" smtClean="0"/>
-              <a:t>integration to PITZ control</a:t>
-            </a:r>
-            <a:r>
-              <a:rPr lang="en-US" dirty="0"/>
-              <a:t> </a:t>
-            </a:r>
-            <a:r>
-              <a:rPr lang="en-US" dirty="0" smtClean="0"/>
-              <a:t>system </a:t>
-            </a:r>
-            <a:endParaRPr lang="en-US" dirty="0"/>
-          </a:p>
-          <a:p>
+              <a:t>analized</a:t>
+            </a:r>
             <a:endParaRPr lang="de-DE" dirty="0"/>
           </a:p>
         </p:txBody>
       </p:sp>
       <p:pic>
         <p:nvPicPr>
-          <p:cNvPr id="5" name="Picture 4"/>
-          <p:cNvPicPr>
-            <a:picLocks noChangeAspect="1"/>
-          </p:cNvPicPr>
-          <p:nvPr/>
-        </p:nvPicPr>
-        <p:blipFill>
-          <a:blip r:embed="rId3" cstate="print">
-            <a:extLst>
-              <a:ext uri="{28A0092B-C50C-407E-A947-70E740481C1C}">
-                <a14:useLocalDpi xmlns:a14="http://schemas.microsoft.com/office/drawing/2010/main" val="0"/>
-              </a:ext>
-            </a:extLst>
-          </a:blip>
-          <a:stretch>
-            <a:fillRect/>
-          </a:stretch>
-        </p:blipFill>
-        <p:spPr>
-          <a:xfrm rot="5400000">
-            <a:off x="5600091" y="2388616"/>
-            <a:ext cx="4244163" cy="2387342"/>
-          </a:xfrm>
-          <a:prstGeom prst="rect">
-            <a:avLst/>
-          </a:prstGeom>
-        </p:spPr>
-      </p:pic>
-      <p:pic>
-        <p:nvPicPr>
-          <p:cNvPr id="1028" name="Picture 4"/>
+          <p:cNvPr id="1026" name="Picture 2"/>
           <p:cNvPicPr>
             <a:picLocks noChangeAspect="1" noChangeArrowheads="1"/>
           </p:cNvPicPr>
           <p:nvPr/>
         </p:nvPicPr>
         <p:blipFill>
-          <a:blip r:embed="rId4">
+          <a:blip r:embed="rId2">
             <a:extLst>
               <a:ext uri="{28A0092B-C50C-407E-A947-70E740481C1C}">
                 <a14:useLocalDpi xmlns:a14="http://schemas.microsoft.com/office/drawing/2010/main" val="0"/>
@@ -5881,8 +4885,8 @@
         </p:blipFill>
         <p:spPr bwMode="auto">
           <a:xfrm>
-            <a:off x="388164" y="4097078"/>
-            <a:ext cx="1830496" cy="2480283"/>
+            <a:off x="339466" y="949842"/>
+            <a:ext cx="4757073" cy="5218814"/>
           </a:xfrm>
           <a:prstGeom prst="rect">
             <a:avLst/>
@@ -5915,20 +4919,13 @@
     </p:spTree>
     <p:extLst>
       <p:ext uri="{BB962C8B-B14F-4D97-AF65-F5344CB8AC3E}">
-        <p14:creationId xmlns:p14="http://schemas.microsoft.com/office/powerpoint/2010/main" val="1627304125"/>
+        <p14:creationId xmlns:p14="http://schemas.microsoft.com/office/powerpoint/2010/main" val="3213707003"/>
       </p:ext>
     </p:extLst>
   </p:cSld>
   <p:clrMapOvr>
     <a:masterClrMapping/>
   </p:clrMapOvr>
-  <p:timing>
-    <p:tnLst>
-      <p:par>
-        <p:cTn id="1" dur="indefinite" restart="never" nodeType="tmRoot"/>
-      </p:par>
-    </p:tnLst>
-  </p:timing>
 </p:sld>
 </file>
 

</xml_diff>

<commit_message>
added some more documentation
</commit_message>
<xml_diff>
--- a/docs/crash_investigations.pptx
+++ b/docs/crash_investigations.pptx
@@ -2880,15 +2880,15 @@
                   <a:schemeClr val="bg2"/>
                 </a:solidFill>
               </a:rPr>
-              <a:t>DV </a:t>
-            </a:r>
-            <a:r>
-              <a:rPr lang="en-GB" sz="900" dirty="0" err="1" smtClean="0">
+              <a:t>Presentation on crash</a:t>
+            </a:r>
+            <a:r>
+              <a:rPr lang="en-GB" sz="900" baseline="0" dirty="0" smtClean="0">
                 <a:solidFill>
                   <a:schemeClr val="bg2"/>
                 </a:solidFill>
               </a:rPr>
-              <a:t>Klausur</a:t>
+              <a:t> investigations</a:t>
             </a:r>
             <a:r>
               <a:rPr lang="en-GB" sz="900" dirty="0" smtClean="0">
@@ -2896,7 +2896,7 @@
                   <a:schemeClr val="bg2"/>
                 </a:solidFill>
               </a:rPr>
-              <a:t> day  </a:t>
+              <a:t>  </a:t>
             </a:r>
             <a:r>
               <a:rPr lang="en-GB" sz="900" dirty="0">
@@ -2912,7 +2912,15 @@
                   <a:schemeClr val="bg2"/>
                 </a:solidFill>
               </a:rPr>
-              <a:t>1-2 Dec 2021  </a:t>
+              <a:t>Dec </a:t>
+            </a:r>
+            <a:r>
+              <a:rPr lang="en-GB" sz="900" dirty="0" smtClean="0">
+                <a:solidFill>
+                  <a:schemeClr val="bg2"/>
+                </a:solidFill>
+              </a:rPr>
+              <a:t>2021  </a:t>
             </a:r>
             <a:r>
               <a:rPr lang="en-GB" sz="900" dirty="0">
@@ -3898,8 +3906,8 @@
         </p:nvSpPr>
         <p:spPr>
           <a:xfrm>
-            <a:off x="198474" y="850605"/>
-            <a:ext cx="8754140" cy="5273747"/>
+            <a:off x="113414" y="808074"/>
+            <a:ext cx="8945526" cy="5358809"/>
           </a:xfrm>
         </p:spPr>
         <p:txBody>
@@ -3907,14 +3915,14 @@
           <a:lstStyle/>
           <a:p>
             <a:r>
-              <a:rPr lang="en-US" sz="1750" dirty="0" smtClean="0"/>
+              <a:rPr lang="en-US" sz="1500" dirty="0" smtClean="0"/>
               <a:t>Meaning of colors in the below list</a:t>
             </a:r>
           </a:p>
           <a:p>
             <a:pPr lvl="1"/>
             <a:r>
-              <a:rPr lang="en-US" sz="1450" dirty="0">
+              <a:rPr lang="en-US" sz="1200" dirty="0">
                 <a:solidFill>
                   <a:srgbClr val="339933"/>
                 </a:solidFill>
@@ -3922,18 +3930,18 @@
               <a:t>Green</a:t>
             </a:r>
             <a:r>
-              <a:rPr lang="en-US" sz="1450" dirty="0"/>
+              <a:rPr lang="en-US" sz="1200" dirty="0"/>
               <a:t>: possible to investigate with the newly created crash </a:t>
             </a:r>
             <a:r>
-              <a:rPr lang="en-US" sz="1450" dirty="0" smtClean="0"/>
+              <a:rPr lang="en-US" sz="1200" dirty="0" smtClean="0"/>
               <a:t>investigator.</a:t>
             </a:r>
           </a:p>
           <a:p>
             <a:pPr lvl="1"/>
             <a:r>
-              <a:rPr lang="en-US" sz="1450" dirty="0" smtClean="0">
+              <a:rPr lang="en-US" sz="1200" dirty="0" smtClean="0">
                 <a:solidFill>
                   <a:srgbClr val="FFC000"/>
                 </a:solidFill>
@@ -3941,14 +3949,14 @@
               <a:t>Yellow</a:t>
             </a:r>
             <a:r>
-              <a:rPr lang="en-US" sz="1450" dirty="0" smtClean="0"/>
+              <a:rPr lang="en-US" sz="1200" dirty="0" smtClean="0"/>
               <a:t>: theoretically possible to investigate but not implemented.</a:t>
             </a:r>
           </a:p>
           <a:p>
             <a:pPr lvl="1"/>
             <a:r>
-              <a:rPr lang="en-US" sz="1450" dirty="0" smtClean="0">
+              <a:rPr lang="en-US" sz="1200" dirty="0" smtClean="0">
                 <a:solidFill>
                   <a:srgbClr val="FF0000"/>
                 </a:solidFill>
@@ -3956,25 +3964,25 @@
               <a:t>Red</a:t>
             </a:r>
             <a:r>
-              <a:rPr lang="en-US" sz="1450" dirty="0" smtClean="0"/>
+              <a:rPr lang="en-US" sz="1200" dirty="0" smtClean="0"/>
               <a:t>: not possible to investigate.</a:t>
             </a:r>
           </a:p>
           <a:p>
             <a:pPr lvl="1"/>
             <a:r>
-              <a:rPr lang="en-US" sz="1450" dirty="0" smtClean="0"/>
+              <a:rPr lang="en-US" sz="1200" dirty="0" smtClean="0"/>
               <a:t>All cases are possible to investigate by </a:t>
             </a:r>
             <a:r>
-              <a:rPr lang="en-US" sz="1450" dirty="0" err="1" smtClean="0"/>
+              <a:rPr lang="en-US" sz="1200" dirty="0" err="1" smtClean="0"/>
               <a:t>Valgrind</a:t>
             </a:r>
             <a:r>
-              <a:rPr lang="en-US" sz="1450" dirty="0" smtClean="0"/>
+              <a:rPr lang="en-US" sz="1200" dirty="0" smtClean="0"/>
               <a:t> (even red cases)!</a:t>
             </a:r>
-            <a:endParaRPr lang="en-US" sz="1450" dirty="0">
+            <a:endParaRPr lang="en-US" sz="1200" dirty="0">
               <a:solidFill>
                 <a:srgbClr val="FFCC00"/>
               </a:solidFill>
@@ -3982,7 +3990,7 @@
           </a:p>
           <a:p>
             <a:r>
-              <a:rPr lang="en-US" sz="1750" dirty="0" smtClean="0">
+              <a:rPr lang="en-US" sz="1500" dirty="0" smtClean="0">
                 <a:solidFill>
                   <a:srgbClr val="FFCC00"/>
                 </a:solidFill>
@@ -3990,7 +3998,7 @@
               <a:t>Memory </a:t>
             </a:r>
             <a:r>
-              <a:rPr lang="en-US" sz="1750" dirty="0">
+              <a:rPr lang="en-US" sz="1500" dirty="0">
                 <a:solidFill>
                   <a:srgbClr val="FFCC00"/>
                 </a:solidFill>
@@ -3998,7 +4006,7 @@
               <a:t>leak: this will not lead to a crash but after a long run there will not be available memory for the proper functionality of an </a:t>
             </a:r>
             <a:r>
-              <a:rPr lang="en-US" sz="1750" dirty="0" smtClean="0">
+              <a:rPr lang="en-US" sz="1500" dirty="0" smtClean="0">
                 <a:solidFill>
                   <a:srgbClr val="FFCC00"/>
                 </a:solidFill>
@@ -4008,36 +4016,127 @@
           </a:p>
           <a:p>
             <a:r>
-              <a:rPr lang="en-US" sz="1750" dirty="0" smtClean="0">
+              <a:rPr lang="en-US" sz="1500" dirty="0" smtClean="0">
                 <a:solidFill>
                   <a:srgbClr val="339933"/>
                 </a:solidFill>
               </a:rPr>
-              <a:t>Double free issue: Most probably this will immediately crash the application.</a:t>
-            </a:r>
-            <a:r>
-              <a:rPr lang="en-US" sz="1750" dirty="0" smtClean="0"/>
+              <a:t>Deallocation </a:t>
+            </a:r>
+            <a:r>
+              <a:rPr lang="en-US" sz="1500" smtClean="0">
+                <a:solidFill>
+                  <a:srgbClr val="339933"/>
+                </a:solidFill>
+              </a:rPr>
+              <a:t>of non-existing </a:t>
+            </a:r>
+            <a:r>
+              <a:rPr lang="en-US" sz="1500" dirty="0" smtClean="0">
+                <a:solidFill>
+                  <a:srgbClr val="339933"/>
+                </a:solidFill>
+              </a:rPr>
+              <a:t>memory: </a:t>
+            </a:r>
+          </a:p>
+          <a:p>
+            <a:r>
+              <a:rPr lang="en-US" sz="1500" dirty="0" smtClean="0">
+                <a:solidFill>
+                  <a:srgbClr val="339933"/>
+                </a:solidFill>
+              </a:rPr>
+              <a:t>Double </a:t>
+            </a:r>
+            <a:r>
+              <a:rPr lang="en-US" sz="1500" dirty="0" smtClean="0">
+                <a:solidFill>
+                  <a:srgbClr val="339933"/>
+                </a:solidFill>
+              </a:rPr>
+              <a:t>free issue: </a:t>
+            </a:r>
+            <a:r>
+              <a:rPr lang="en-US" sz="1500" dirty="0" smtClean="0">
+                <a:solidFill>
+                  <a:srgbClr val="339933"/>
+                </a:solidFill>
+              </a:rPr>
+              <a:t>most </a:t>
+            </a:r>
+            <a:r>
+              <a:rPr lang="en-US" sz="1500" dirty="0" smtClean="0">
+                <a:solidFill>
+                  <a:srgbClr val="339933"/>
+                </a:solidFill>
+              </a:rPr>
+              <a:t>probably this will immediately crash the application.</a:t>
+            </a:r>
+            <a:r>
+              <a:rPr lang="en-US" sz="1500" dirty="0" smtClean="0"/>
               <a:t> </a:t>
             </a:r>
-          </a:p>
-          <a:p>
-            <a:r>
-              <a:rPr lang="en-US" sz="1750" dirty="0" smtClean="0">
+            <a:endParaRPr lang="en-US" sz="1500" dirty="0" smtClean="0"/>
+          </a:p>
+          <a:p>
+            <a:r>
+              <a:rPr lang="en-US" sz="1500" dirty="0">
                 <a:solidFill>
                   <a:srgbClr val="339933"/>
                 </a:solidFill>
               </a:rPr>
-              <a:t>Allocation - deallocation mismatch</a:t>
-            </a:r>
-            <a:r>
-              <a:rPr lang="en-US" sz="1750" dirty="0">
+              <a:t>Bad </a:t>
+            </a:r>
+            <a:r>
+              <a:rPr lang="en-US" sz="1500" dirty="0" err="1">
                 <a:solidFill>
                   <a:srgbClr val="339933"/>
                 </a:solidFill>
               </a:rPr>
-              <a:t>: this is the case when memory is allocated using one method and memory is freed by the other method (for example new/free, new[]/delete, etc.). Similar errors will lead to crashes in some cases. Most crashes will happen immediately after corruption.</a:t>
-            </a:r>
-            <a:endParaRPr lang="en-US" sz="1750" dirty="0" smtClean="0">
+              <a:t>realloc</a:t>
+            </a:r>
+            <a:r>
+              <a:rPr lang="en-US" sz="1500" dirty="0">
+                <a:solidFill>
+                  <a:srgbClr val="339933"/>
+                </a:solidFill>
+              </a:rPr>
+              <a:t> issues: this kind of issue will happen when bad memory (not allocated memory/ already freed memory/ memory created with incompatible to </a:t>
+            </a:r>
+            <a:r>
+              <a:rPr lang="en-US" sz="1500" dirty="0" err="1">
+                <a:solidFill>
+                  <a:srgbClr val="339933"/>
+                </a:solidFill>
+              </a:rPr>
+              <a:t>realloc</a:t>
+            </a:r>
+            <a:r>
+              <a:rPr lang="en-US" sz="1500" dirty="0">
+                <a:solidFill>
+                  <a:srgbClr val="339933"/>
+                </a:solidFill>
+              </a:rPr>
+              <a:t> method) is provided as the first argument to the </a:t>
+            </a:r>
+            <a:r>
+              <a:rPr lang="en-US" sz="1500" dirty="0" err="1">
+                <a:solidFill>
+                  <a:srgbClr val="339933"/>
+                </a:solidFill>
+              </a:rPr>
+              <a:t>realloc</a:t>
+            </a:r>
+            <a:r>
+              <a:rPr lang="en-US" sz="1500" dirty="0">
+                <a:solidFill>
+                  <a:srgbClr val="339933"/>
+                </a:solidFill>
+              </a:rPr>
+              <a:t> call.</a:t>
+            </a:r>
+            <a:endParaRPr lang="en-US" sz="1500" dirty="0" smtClean="0">
               <a:solidFill>
                 <a:srgbClr val="339933"/>
               </a:solidFill>
@@ -4045,7 +4144,30 @@
           </a:p>
           <a:p>
             <a:r>
-              <a:rPr lang="en-US" sz="1750" dirty="0">
+              <a:rPr lang="en-US" sz="1500" dirty="0" smtClean="0">
+                <a:solidFill>
+                  <a:srgbClr val="339933"/>
+                </a:solidFill>
+              </a:rPr>
+              <a:t>Allocation - deallocation mismatch</a:t>
+            </a:r>
+            <a:r>
+              <a:rPr lang="en-US" sz="1500" dirty="0">
+                <a:solidFill>
+                  <a:srgbClr val="339933"/>
+                </a:solidFill>
+              </a:rPr>
+              <a:t>: this is the case when memory is allocated using one method and memory is freed by the other method (for example new/free, new[]/delete, etc.). Similar errors will lead to crashes in some cases. Most crashes will happen immediately after corruption.</a:t>
+            </a:r>
+            <a:endParaRPr lang="en-US" sz="1500" dirty="0" smtClean="0">
+              <a:solidFill>
+                <a:srgbClr val="339933"/>
+              </a:solidFill>
+            </a:endParaRPr>
+          </a:p>
+          <a:p>
+            <a:r>
+              <a:rPr lang="en-US" sz="1500" dirty="0">
                 <a:solidFill>
                   <a:srgbClr val="FF0000"/>
                 </a:solidFill>
@@ -4053,7 +4175,7 @@
               <a:t>Memory overrun issue: </a:t>
             </a:r>
             <a:r>
-              <a:rPr lang="en-US" sz="1750" dirty="0" smtClean="0">
+              <a:rPr lang="en-US" sz="1500" dirty="0" smtClean="0">
                 <a:solidFill>
                   <a:srgbClr val="FF0000"/>
                 </a:solidFill>
@@ -4061,7 +4183,7 @@
               <a:t>this </a:t>
             </a:r>
             <a:r>
-              <a:rPr lang="en-US" sz="1750" dirty="0">
+              <a:rPr lang="en-US" sz="1500" dirty="0">
                 <a:solidFill>
                   <a:srgbClr val="FF0000"/>
                 </a:solidFill>
@@ -4069,10 +4191,10 @@
               <a:t>is a very hard detectable issue because they crash applications not immediately and not always. They crash applications when the memory behind allocated memory is responsible for sensitive data. Usually, the crash happens not during the bad call with overrun, but later when the mentioned sensitive memory is accessed.</a:t>
             </a:r>
             <a:r>
-              <a:rPr lang="en-US" sz="1750" dirty="0"/>
+              <a:rPr lang="en-US" sz="1500" dirty="0"/>
               <a:t> </a:t>
             </a:r>
-            <a:endParaRPr lang="de-DE" sz="1750" dirty="0"/>
+            <a:endParaRPr lang="de-DE" sz="1500" dirty="0"/>
           </a:p>
         </p:txBody>
       </p:sp>
@@ -4858,55 +4980,6 @@
           </a:p>
         </p:txBody>
       </p:sp>
-      <p:pic>
-        <p:nvPicPr>
-          <p:cNvPr id="3" name="Picture 2"/>
-          <p:cNvPicPr>
-            <a:picLocks noChangeAspect="1" noChangeArrowheads="1"/>
-          </p:cNvPicPr>
-          <p:nvPr/>
-        </p:nvPicPr>
-        <p:blipFill>
-          <a:blip r:embed="rId2">
-            <a:extLst>
-              <a:ext uri="{28A0092B-C50C-407E-A947-70E740481C1C}">
-                <a14:useLocalDpi xmlns:a14="http://schemas.microsoft.com/office/drawing/2010/main" val="0"/>
-              </a:ext>
-            </a:extLst>
-          </a:blip>
-          <a:srcRect/>
-          <a:stretch>
-            <a:fillRect/>
-          </a:stretch>
-        </p:blipFill>
-        <p:spPr bwMode="auto">
-          <a:xfrm>
-            <a:off x="205562" y="1247918"/>
-            <a:ext cx="4250920" cy="5337187"/>
-          </a:xfrm>
-          <a:prstGeom prst="rect">
-            <a:avLst/>
-          </a:prstGeom>
-          <a:noFill/>
-          <a:ln w="9525">
-            <a:solidFill>
-              <a:schemeClr val="tx1"/>
-            </a:solidFill>
-            <a:miter lim="800000"/>
-            <a:headEnd/>
-            <a:tailEnd/>
-          </a:ln>
-          <a:extLst>
-            <a:ext uri="{909E8E84-426E-40DD-AFC4-6F175D3DCCD1}">
-              <a14:hiddenFill xmlns:a14="http://schemas.microsoft.com/office/drawing/2010/main">
-                <a:solidFill>
-                  <a:schemeClr val="accent1"/>
-                </a:solidFill>
-              </a14:hiddenFill>
-            </a:ext>
-          </a:extLst>
-        </p:spPr>
-      </p:pic>
       <p:sp>
         <p:nvSpPr>
           <p:cNvPr id="4" name="TextBox 3"/>
@@ -4931,13 +5004,13 @@
           <a:p>
             <a:r>
               <a:rPr lang="de-DE" sz="1400" dirty="0">
-                <a:hlinkClick r:id="rId3"/>
+                <a:hlinkClick r:id="rId2"/>
               </a:rPr>
               <a:t>https://gitlab.zeuthen.desy.de/ers/crash_investigator/-/</a:t>
             </a:r>
             <a:r>
               <a:rPr lang="de-DE" sz="1400" dirty="0" smtClean="0">
-                <a:hlinkClick r:id="rId3"/>
+                <a:hlinkClick r:id="rId2"/>
               </a:rPr>
               <a:t>blob/master/src/tests/main_double_free01_test.cpp</a:t>
             </a:r>
@@ -4949,6 +5022,312 @@
           </a:p>
         </p:txBody>
       </p:sp>
+      <p:grpSp>
+        <p:nvGrpSpPr>
+          <p:cNvPr id="11" name="Group 10"/>
+          <p:cNvGrpSpPr/>
+          <p:nvPr/>
+        </p:nvGrpSpPr>
+        <p:grpSpPr>
+          <a:xfrm>
+            <a:off x="283535" y="1247918"/>
+            <a:ext cx="8661987" cy="5564593"/>
+            <a:chOff x="283535" y="1247918"/>
+            <a:chExt cx="8661987" cy="5564593"/>
+          </a:xfrm>
+        </p:grpSpPr>
+        <p:grpSp>
+          <p:nvGrpSpPr>
+            <p:cNvPr id="9" name="Group 8"/>
+            <p:cNvGrpSpPr/>
+            <p:nvPr/>
+          </p:nvGrpSpPr>
+          <p:grpSpPr>
+            <a:xfrm>
+              <a:off x="5203610" y="1247918"/>
+              <a:ext cx="3741912" cy="3752729"/>
+              <a:chOff x="5203610" y="1247918"/>
+              <a:chExt cx="3741912" cy="3752729"/>
+            </a:xfrm>
+          </p:grpSpPr>
+          <p:grpSp>
+            <p:nvGrpSpPr>
+              <p:cNvPr id="6" name="Group 5"/>
+              <p:cNvGrpSpPr/>
+              <p:nvPr/>
+            </p:nvGrpSpPr>
+            <p:grpSpPr>
+              <a:xfrm>
+                <a:off x="5203610" y="1247918"/>
+                <a:ext cx="3457575" cy="3143250"/>
+                <a:chOff x="5203610" y="1247918"/>
+                <a:chExt cx="3457575" cy="3143250"/>
+              </a:xfrm>
+            </p:grpSpPr>
+            <p:pic>
+              <p:nvPicPr>
+                <p:cNvPr id="1027" name="Picture 3"/>
+                <p:cNvPicPr>
+                  <a:picLocks noChangeAspect="1" noChangeArrowheads="1"/>
+                </p:cNvPicPr>
+                <p:nvPr/>
+              </p:nvPicPr>
+              <p:blipFill>
+                <a:blip r:embed="rId3">
+                  <a:extLst>
+                    <a:ext uri="{28A0092B-C50C-407E-A947-70E740481C1C}">
+                      <a14:useLocalDpi xmlns:a14="http://schemas.microsoft.com/office/drawing/2010/main" val="0"/>
+                    </a:ext>
+                  </a:extLst>
+                </a:blip>
+                <a:srcRect/>
+                <a:stretch>
+                  <a:fillRect/>
+                </a:stretch>
+              </p:blipFill>
+              <p:spPr bwMode="auto">
+                <a:xfrm>
+                  <a:off x="5203610" y="1247918"/>
+                  <a:ext cx="3457575" cy="3143250"/>
+                </a:xfrm>
+                <a:prstGeom prst="rect">
+                  <a:avLst/>
+                </a:prstGeom>
+                <a:noFill/>
+                <a:ln w="9525">
+                  <a:solidFill>
+                    <a:schemeClr val="tx1"/>
+                  </a:solidFill>
+                  <a:miter lim="800000"/>
+                  <a:headEnd/>
+                  <a:tailEnd/>
+                </a:ln>
+                <a:extLst>
+                  <a:ext uri="{909E8E84-426E-40DD-AFC4-6F175D3DCCD1}">
+                    <a14:hiddenFill xmlns:a14="http://schemas.microsoft.com/office/drawing/2010/main">
+                      <a:solidFill>
+                        <a:schemeClr val="accent1"/>
+                      </a:solidFill>
+                    </a14:hiddenFill>
+                  </a:ext>
+                </a:extLst>
+              </p:spPr>
+            </p:pic>
+            <p:sp>
+              <p:nvSpPr>
+                <p:cNvPr id="5" name="TextBox 4"/>
+                <p:cNvSpPr txBox="1"/>
+                <p:nvPr/>
+              </p:nvSpPr>
+              <p:spPr>
+                <a:xfrm>
+                  <a:off x="6634686" y="2623734"/>
+                  <a:ext cx="1728358" cy="246221"/>
+                </a:xfrm>
+                <a:prstGeom prst="rect">
+                  <a:avLst/>
+                </a:prstGeom>
+                <a:solidFill>
+                  <a:schemeClr val="accent1"/>
+                </a:solidFill>
+                <a:ln>
+                  <a:solidFill>
+                    <a:schemeClr val="tx1"/>
+                  </a:solidFill>
+                </a:ln>
+              </p:spPr>
+              <p:txBody>
+                <a:bodyPr wrap="none" rtlCol="0">
+                  <a:spAutoFit/>
+                </a:bodyPr>
+                <a:lstStyle/>
+                <a:p>
+                  <a:r>
+                    <a:rPr lang="en-US" sz="1000" dirty="0" smtClean="0"/>
+                    <a:t>Exit App is default behavior</a:t>
+                  </a:r>
+                  <a:endParaRPr lang="de-DE" sz="1000" dirty="0"/>
+                </a:p>
+              </p:txBody>
+            </p:sp>
+          </p:grpSp>
+          <p:sp>
+            <p:nvSpPr>
+              <p:cNvPr id="7" name="TextBox 6"/>
+              <p:cNvSpPr txBox="1"/>
+              <p:nvPr/>
+            </p:nvSpPr>
+            <p:spPr>
+              <a:xfrm>
+                <a:off x="5203610" y="4508204"/>
+                <a:ext cx="3741912" cy="492443"/>
+              </a:xfrm>
+              <a:prstGeom prst="rect">
+                <a:avLst/>
+              </a:prstGeom>
+              <a:noFill/>
+            </p:spPr>
+            <p:txBody>
+              <a:bodyPr wrap="square" rtlCol="0">
+                <a:spAutoFit/>
+              </a:bodyPr>
+              <a:lstStyle/>
+              <a:p>
+                <a:r>
+                  <a:rPr lang="en-US" sz="1300" dirty="0"/>
+                  <a:t>Alongside these cases, the tool helps to </a:t>
+                </a:r>
+                <a:r>
+                  <a:rPr lang="en-US" sz="1300" dirty="0" smtClean="0"/>
+                  <a:t/>
+                </a:r>
+                <a:br>
+                  <a:rPr lang="en-US" sz="1300" dirty="0" smtClean="0"/>
+                </a:br>
+                <a:r>
+                  <a:rPr lang="en-US" sz="1300" dirty="0" smtClean="0"/>
+                  <a:t>detect </a:t>
+                </a:r>
+                <a:r>
+                  <a:rPr lang="en-US" sz="1300" dirty="0"/>
+                  <a:t>bugs like in the function </a:t>
+                </a:r>
+                <a:r>
+                  <a:rPr lang="en-US" sz="1300" dirty="0" smtClean="0"/>
+                  <a:t>Corruption08.</a:t>
+                </a:r>
+                <a:endParaRPr lang="de-DE" sz="1300" dirty="0"/>
+              </a:p>
+            </p:txBody>
+          </p:sp>
+        </p:grpSp>
+        <p:pic>
+          <p:nvPicPr>
+            <p:cNvPr id="1029" name="Picture 5"/>
+            <p:cNvPicPr>
+              <a:picLocks noChangeAspect="1" noChangeArrowheads="1"/>
+            </p:cNvPicPr>
+            <p:nvPr/>
+          </p:nvPicPr>
+          <p:blipFill>
+            <a:blip r:embed="rId4">
+              <a:extLst>
+                <a:ext uri="{28A0092B-C50C-407E-A947-70E740481C1C}">
+                  <a14:useLocalDpi xmlns:a14="http://schemas.microsoft.com/office/drawing/2010/main" val="0"/>
+                </a:ext>
+              </a:extLst>
+            </a:blip>
+            <a:srcRect/>
+            <a:stretch>
+              <a:fillRect/>
+            </a:stretch>
+          </p:blipFill>
+          <p:spPr bwMode="auto">
+            <a:xfrm>
+              <a:off x="283535" y="1247918"/>
+              <a:ext cx="4713019" cy="5564593"/>
+            </a:xfrm>
+            <a:prstGeom prst="rect">
+              <a:avLst/>
+            </a:prstGeom>
+            <a:noFill/>
+            <a:ln>
+              <a:noFill/>
+            </a:ln>
+            <a:extLst>
+              <a:ext uri="{909E8E84-426E-40DD-AFC4-6F175D3DCCD1}">
+                <a14:hiddenFill xmlns:a14="http://schemas.microsoft.com/office/drawing/2010/main">
+                  <a:solidFill>
+                    <a:schemeClr val="accent1"/>
+                  </a:solidFill>
+                </a14:hiddenFill>
+              </a:ext>
+              <a:ext uri="{91240B29-F687-4F45-9708-019B960494DF}">
+                <a14:hiddenLine xmlns:a14="http://schemas.microsoft.com/office/drawing/2010/main" w="9525">
+                  <a:solidFill>
+                    <a:schemeClr val="tx1"/>
+                  </a:solidFill>
+                  <a:miter lim="800000"/>
+                  <a:headEnd/>
+                  <a:tailEnd/>
+                </a14:hiddenLine>
+              </a:ext>
+            </a:extLst>
+          </p:spPr>
+        </p:pic>
+        <p:sp>
+          <p:nvSpPr>
+            <p:cNvPr id="16" name="Left Arrow 15"/>
+            <p:cNvSpPr/>
+            <p:nvPr/>
+          </p:nvSpPr>
+          <p:spPr bwMode="auto">
+            <a:xfrm rot="20979360">
+              <a:off x="3294417" y="5441719"/>
+              <a:ext cx="4639764" cy="184298"/>
+            </a:xfrm>
+            <a:prstGeom prst="leftArrow">
+              <a:avLst/>
+            </a:prstGeom>
+            <a:solidFill>
+              <a:schemeClr val="accent1">
+                <a:alpha val="48000"/>
+              </a:schemeClr>
+            </a:solidFill>
+            <a:ln w="9525" cap="flat" cmpd="sng" algn="ctr">
+              <a:noFill/>
+              <a:prstDash val="solid"/>
+              <a:round/>
+              <a:headEnd type="none" w="med" len="med"/>
+              <a:tailEnd type="none" w="med" len="med"/>
+            </a:ln>
+            <a:effectLst/>
+            <a:scene3d>
+              <a:camera prst="orthographicFront">
+                <a:rot lat="0" lon="0" rev="120000"/>
+              </a:camera>
+              <a:lightRig rig="threePt" dir="t"/>
+            </a:scene3d>
+            <a:extLst/>
+          </p:spPr>
+          <p:txBody>
+            <a:bodyPr vert="horz" wrap="square" lIns="91440" tIns="45720" rIns="91440" bIns="45720" numCol="1" rtlCol="0" anchor="t" anchorCtr="0" compatLnSpc="1">
+              <a:prstTxWarp prst="textNoShape">
+                <a:avLst/>
+              </a:prstTxWarp>
+            </a:bodyPr>
+            <a:lstStyle/>
+            <a:p>
+              <a:pPr marL="0" marR="0" indent="0" algn="l" defTabSz="914400" rtl="0" eaLnBrk="0" fontAlgn="base" latinLnBrk="0" hangingPunct="0">
+                <a:lnSpc>
+                  <a:spcPct val="100000"/>
+                </a:lnSpc>
+                <a:spcBef>
+                  <a:spcPct val="0"/>
+                </a:spcBef>
+                <a:spcAft>
+                  <a:spcPct val="0"/>
+                </a:spcAft>
+                <a:buClrTx/>
+                <a:buSzTx/>
+                <a:buFontTx/>
+                <a:buNone/>
+                <a:tabLst/>
+              </a:pPr>
+              <a:endParaRPr kumimoji="0" lang="de-DE" sz="1600" b="0" i="0" u="none" strike="noStrike" cap="none" normalizeH="0" baseline="0" smtClean="0">
+                <a:ln>
+                  <a:noFill/>
+                </a:ln>
+                <a:solidFill>
+                  <a:schemeClr val="tx1"/>
+                </a:solidFill>
+                <a:effectLst/>
+                <a:latin typeface="Arial" charset="0"/>
+              </a:endParaRPr>
+            </a:p>
+          </p:txBody>
+        </p:sp>
+      </p:grpSp>
     </p:spTree>
     <p:extLst>
       <p:ext uri="{BB962C8B-B14F-4D97-AF65-F5344CB8AC3E}">

</xml_diff>

<commit_message>
adedd some more information on presentation
</commit_message>
<xml_diff>
--- a/docs/crash_investigations.pptx
+++ b/docs/crash_investigations.pptx
@@ -5,7 +5,7 @@
     <p:sldMasterId id="2147483660" r:id="rId1"/>
   </p:sldMasterIdLst>
   <p:notesMasterIdLst>
-    <p:notesMasterId r:id="rId8"/>
+    <p:notesMasterId r:id="rId9"/>
   </p:notesMasterIdLst>
   <p:sldIdLst>
     <p:sldId id="263" r:id="rId2"/>
@@ -13,7 +13,8 @@
     <p:sldId id="336" r:id="rId4"/>
     <p:sldId id="338" r:id="rId5"/>
     <p:sldId id="339" r:id="rId6"/>
-    <p:sldId id="340" r:id="rId7"/>
+    <p:sldId id="341" r:id="rId7"/>
+    <p:sldId id="340" r:id="rId8"/>
   </p:sldIdLst>
   <p:sldSz cx="9144000" cy="6858000" type="screen4x3"/>
   <p:notesSz cx="7104063" cy="10234613"/>
@@ -2912,15 +2913,7 @@
                   <a:schemeClr val="bg2"/>
                 </a:solidFill>
               </a:rPr>
-              <a:t>Dec </a:t>
-            </a:r>
-            <a:r>
-              <a:rPr lang="en-GB" sz="900" dirty="0" smtClean="0">
-                <a:solidFill>
-                  <a:schemeClr val="bg2"/>
-                </a:solidFill>
-              </a:rPr>
-              <a:t>2021  </a:t>
+              <a:t>Dec 2021  </a:t>
             </a:r>
             <a:r>
               <a:rPr lang="en-GB" sz="900" dirty="0">
@@ -4047,37 +4040,12 @@
                   <a:srgbClr val="339933"/>
                 </a:solidFill>
               </a:rPr>
-              <a:t>Double </a:t>
-            </a:r>
-            <a:r>
-              <a:rPr lang="en-US" sz="1500" dirty="0" smtClean="0">
-                <a:solidFill>
-                  <a:srgbClr val="339933"/>
-                </a:solidFill>
-              </a:rPr>
-              <a:t>free issue: </a:t>
-            </a:r>
-            <a:r>
-              <a:rPr lang="en-US" sz="1500" dirty="0" smtClean="0">
-                <a:solidFill>
-                  <a:srgbClr val="339933"/>
-                </a:solidFill>
-              </a:rPr>
-              <a:t>most </a:t>
-            </a:r>
-            <a:r>
-              <a:rPr lang="en-US" sz="1500" dirty="0" smtClean="0">
-                <a:solidFill>
-                  <a:srgbClr val="339933"/>
-                </a:solidFill>
-              </a:rPr>
-              <a:t>probably this will immediately crash the application.</a:t>
+              <a:t>Double free issue: most probably this will immediately crash the application.</a:t>
             </a:r>
             <a:r>
               <a:rPr lang="en-US" sz="1500" dirty="0" smtClean="0"/>
               <a:t> </a:t>
             </a:r>
-            <a:endParaRPr lang="en-US" sz="1500" dirty="0" smtClean="0"/>
           </a:p>
           <a:p>
             <a:r>
@@ -4284,232 +4252,262 @@
           <a:lstStyle/>
           <a:p>
             <a:r>
-              <a:rPr lang="en-US" sz="1700" dirty="0"/>
+              <a:rPr lang="en-US" sz="1600" dirty="0"/>
               <a:t>In the previous slide, there was a note that </a:t>
             </a:r>
             <a:r>
-              <a:rPr lang="en-US" sz="1700" dirty="0" err="1"/>
+              <a:rPr lang="en-US" sz="1600" dirty="0" err="1"/>
               <a:t>Valgrind</a:t>
             </a:r>
             <a:r>
-              <a:rPr lang="en-US" sz="1700" dirty="0"/>
+              <a:rPr lang="en-US" sz="1600" dirty="0"/>
               <a:t> works for all mentioned cases. Then the question arises why do we need something else?</a:t>
             </a:r>
-            <a:endParaRPr lang="en-US" sz="1700" dirty="0" smtClean="0"/>
+            <a:endParaRPr lang="en-US" sz="1600" dirty="0" smtClean="0"/>
           </a:p>
           <a:p>
             <a:pPr lvl="1"/>
             <a:r>
-              <a:rPr lang="en-US" sz="1250" dirty="0" smtClean="0"/>
-              <a:t>It slows down application 5-100 times.</a:t>
+              <a:rPr lang="en-US" sz="1200" dirty="0" smtClean="0"/>
+              <a:t>It slows down application 5-100 times</a:t>
+            </a:r>
+            <a:r>
+              <a:rPr lang="en-US" sz="1200" dirty="0" smtClean="0"/>
+              <a:t>.</a:t>
             </a:r>
           </a:p>
           <a:p>
             <a:pPr lvl="1"/>
             <a:r>
-              <a:rPr lang="en-US" sz="1250" dirty="0" smtClean="0"/>
+              <a:rPr lang="en-US" sz="1200" dirty="0" smtClean="0"/>
+              <a:t>It starts application on virtual environment</a:t>
+            </a:r>
+            <a:br>
+              <a:rPr lang="en-US" sz="1200" dirty="0" smtClean="0"/>
+            </a:br>
+            <a:r>
+              <a:rPr lang="en-US" sz="1200" dirty="0" smtClean="0"/>
+              <a:t>and this can hide some issues that is there</a:t>
+            </a:r>
+            <a:br>
+              <a:rPr lang="en-US" sz="1200" dirty="0" smtClean="0"/>
+            </a:br>
+            <a:r>
+              <a:rPr lang="en-US" sz="1200" dirty="0" smtClean="0"/>
+              <a:t>because of </a:t>
+            </a:r>
+            <a:r>
+              <a:rPr lang="en-US" sz="1200" dirty="0" err="1" smtClean="0"/>
+              <a:t>concurency</a:t>
+            </a:r>
+            <a:r>
+              <a:rPr lang="en-US" sz="1200" dirty="0" smtClean="0"/>
+              <a:t>.</a:t>
+            </a:r>
+            <a:endParaRPr lang="en-US" sz="1200" dirty="0" smtClean="0"/>
+          </a:p>
+          <a:p>
+            <a:pPr lvl="1"/>
+            <a:r>
+              <a:rPr lang="en-US" sz="1200" dirty="0" smtClean="0"/>
               <a:t>Installation is needed and I’m not sure</a:t>
             </a:r>
             <a:br>
-              <a:rPr lang="en-US" sz="1250" dirty="0" smtClean="0"/>
+              <a:rPr lang="en-US" sz="1200" dirty="0" smtClean="0"/>
             </a:br>
             <a:r>
-              <a:rPr lang="en-US" sz="1250" dirty="0" smtClean="0"/>
+              <a:rPr lang="en-US" sz="1200" dirty="0" smtClean="0"/>
               <a:t>if we will have permission to install</a:t>
             </a:r>
             <a:br>
-              <a:rPr lang="en-US" sz="1250" dirty="0" smtClean="0"/>
+              <a:rPr lang="en-US" sz="1200" dirty="0" smtClean="0"/>
             </a:br>
             <a:r>
-              <a:rPr lang="en-US" sz="1250" dirty="0" err="1" smtClean="0"/>
+              <a:rPr lang="en-US" sz="1200" dirty="0" err="1" smtClean="0"/>
               <a:t>Valgrind</a:t>
             </a:r>
             <a:r>
-              <a:rPr lang="en-US" sz="1250" dirty="0" smtClean="0"/>
+              <a:rPr lang="en-US" sz="1200" dirty="0" smtClean="0"/>
               <a:t> on our server hosts.</a:t>
             </a:r>
           </a:p>
           <a:p>
             <a:pPr lvl="1"/>
             <a:r>
-              <a:rPr lang="en-US" sz="1250" dirty="0" smtClean="0"/>
+              <a:rPr lang="en-US" sz="1200" dirty="0" smtClean="0"/>
               <a:t>Easy </a:t>
             </a:r>
             <a:r>
-              <a:rPr lang="en-US" sz="1250" dirty="0"/>
+              <a:rPr lang="en-US" sz="1200" dirty="0"/>
               <a:t>extendibility. </a:t>
             </a:r>
             <a:r>
-              <a:rPr lang="en-US" sz="1250" dirty="0" err="1"/>
+              <a:rPr lang="en-US" sz="1200" dirty="0" err="1"/>
               <a:t>Valgrind</a:t>
             </a:r>
             <a:r>
-              <a:rPr lang="en-US" sz="1250" dirty="0"/>
+              <a:rPr lang="en-US" sz="1200" dirty="0"/>
               <a:t> also mentions the </a:t>
             </a:r>
             <a:r>
-              <a:rPr lang="en-US" sz="1250" dirty="0" smtClean="0"/>
+              <a:rPr lang="en-US" sz="1200" dirty="0" smtClean="0"/>
               <a:t/>
             </a:r>
             <a:br>
-              <a:rPr lang="en-US" sz="1250" dirty="0" smtClean="0"/>
+              <a:rPr lang="en-US" sz="1200" dirty="0" smtClean="0"/>
             </a:br>
             <a:r>
-              <a:rPr lang="en-US" sz="1250" dirty="0" smtClean="0"/>
+              <a:rPr lang="en-US" sz="1200" dirty="0" smtClean="0"/>
               <a:t>possibility </a:t>
             </a:r>
             <a:r>
-              <a:rPr lang="en-US" sz="1250" dirty="0"/>
+              <a:rPr lang="en-US" sz="1200" dirty="0"/>
               <a:t>to extend, but I think it is very </a:t>
             </a:r>
             <a:r>
-              <a:rPr lang="en-US" sz="1250" dirty="0" smtClean="0"/>
+              <a:rPr lang="en-US" sz="1200" dirty="0" smtClean="0"/>
               <a:t/>
             </a:r>
             <a:br>
-              <a:rPr lang="en-US" sz="1250" dirty="0" smtClean="0"/>
+              <a:rPr lang="en-US" sz="1200" dirty="0" smtClean="0"/>
             </a:br>
             <a:r>
-              <a:rPr lang="en-US" sz="1250" dirty="0" smtClean="0"/>
+              <a:rPr lang="en-US" sz="1200" dirty="0" smtClean="0"/>
               <a:t>complicated </a:t>
             </a:r>
             <a:r>
-              <a:rPr lang="en-US" sz="1250" dirty="0"/>
+              <a:rPr lang="en-US" sz="1200" dirty="0"/>
               <a:t>and one should have very well knowledge of low-level programming (including GNU assembly) for handling </a:t>
             </a:r>
             <a:r>
-              <a:rPr lang="en-US" sz="1250" dirty="0" err="1"/>
+              <a:rPr lang="en-US" sz="1200" dirty="0" err="1"/>
               <a:t>Valgrind</a:t>
             </a:r>
             <a:r>
-              <a:rPr lang="en-US" sz="1250" dirty="0"/>
+              <a:rPr lang="en-US" sz="1200" dirty="0"/>
               <a:t> code. To clone and play with </a:t>
             </a:r>
             <a:r>
-              <a:rPr lang="en-US" sz="1250" dirty="0" err="1"/>
+              <a:rPr lang="en-US" sz="1200" dirty="0" err="1"/>
               <a:t>Valgrind</a:t>
             </a:r>
             <a:r>
-              <a:rPr lang="en-US" sz="1250" dirty="0"/>
+              <a:rPr lang="en-US" sz="1200" dirty="0"/>
               <a:t> code one can use the command: ‘</a:t>
             </a:r>
             <a:r>
-              <a:rPr lang="en-US" sz="1250" dirty="0" err="1"/>
+              <a:rPr lang="en-US" sz="1200" dirty="0" err="1"/>
               <a:t>git</a:t>
             </a:r>
             <a:r>
-              <a:rPr lang="en-US" sz="1250" dirty="0"/>
+              <a:rPr lang="en-US" sz="1200" dirty="0"/>
               <a:t> clone </a:t>
             </a:r>
             <a:r>
-              <a:rPr lang="en-US" sz="1250" dirty="0" err="1"/>
+              <a:rPr lang="en-US" sz="1200" dirty="0" err="1"/>
               <a:t>git</a:t>
             </a:r>
             <a:r>
-              <a:rPr lang="en-US" sz="1250" dirty="0"/>
+              <a:rPr lang="en-US" sz="1200" dirty="0"/>
               <a:t>://sourceware.org/</a:t>
             </a:r>
             <a:r>
-              <a:rPr lang="en-US" sz="1250" dirty="0" err="1"/>
+              <a:rPr lang="en-US" sz="1200" dirty="0" err="1"/>
               <a:t>git</a:t>
             </a:r>
             <a:r>
-              <a:rPr lang="en-US" sz="1250" dirty="0"/>
+              <a:rPr lang="en-US" sz="1200" dirty="0"/>
               <a:t>/</a:t>
             </a:r>
             <a:r>
-              <a:rPr lang="en-US" sz="1250" dirty="0" err="1"/>
+              <a:rPr lang="en-US" sz="1200" dirty="0" err="1"/>
               <a:t>valgrind.git</a:t>
             </a:r>
             <a:r>
-              <a:rPr lang="en-US" sz="1250" dirty="0" smtClean="0"/>
-              <a:t>’.</a:t>
-            </a:r>
-            <a:r>
-              <a:rPr lang="en-US" dirty="0" smtClean="0"/>
-              <a:t> </a:t>
+              <a:rPr lang="en-US" sz="1200" dirty="0" smtClean="0"/>
+              <a:t>’. </a:t>
             </a:r>
           </a:p>
           <a:p>
             <a:pPr lvl="1"/>
             <a:r>
-              <a:rPr lang="en-US" sz="1250" dirty="0" smtClean="0"/>
+              <a:rPr lang="en-US" sz="1200" dirty="0" smtClean="0"/>
               <a:t>Runtime extendibility !!!</a:t>
             </a:r>
           </a:p>
           <a:p>
             <a:pPr lvl="1"/>
             <a:r>
-              <a:rPr lang="en-US" sz="1250" dirty="0" smtClean="0"/>
+              <a:rPr lang="en-US" sz="1200" dirty="0" smtClean="0"/>
               <a:t>Windows!!! (for Windows proof of concept app is done, but complete system is not prepared)</a:t>
             </a:r>
           </a:p>
           <a:p>
             <a:r>
-              <a:rPr lang="en-US" sz="1700" dirty="0" err="1"/>
+              <a:rPr lang="en-US" sz="1600" dirty="0" err="1"/>
               <a:t>Valgrind</a:t>
             </a:r>
             <a:r>
-              <a:rPr lang="en-US" sz="1700" dirty="0"/>
+              <a:rPr lang="en-US" sz="1600" dirty="0"/>
               <a:t> starts applications in the virtual environment where all instructions of applications are trapped by </a:t>
             </a:r>
             <a:r>
-              <a:rPr lang="en-US" sz="1700" dirty="0" err="1"/>
+              <a:rPr lang="en-US" sz="1600" dirty="0" err="1"/>
               <a:t>Valgrind</a:t>
             </a:r>
             <a:r>
-              <a:rPr lang="en-US" sz="1700" dirty="0"/>
+              <a:rPr lang="en-US" sz="1600" dirty="0"/>
               <a:t>, then analyzed and only after that the instructions </a:t>
             </a:r>
             <a:r>
-              <a:rPr lang="en-US" sz="1700" dirty="0" smtClean="0"/>
+              <a:rPr lang="en-US" sz="1600" dirty="0" smtClean="0"/>
               <a:t>executed.</a:t>
             </a:r>
           </a:p>
           <a:p>
             <a:pPr lvl="1"/>
             <a:r>
-              <a:rPr lang="en-US" sz="1250" dirty="0" smtClean="0"/>
+              <a:rPr lang="en-US" sz="1200" dirty="0" smtClean="0"/>
               <a:t>This is the reason of slowing down the application dramatically.</a:t>
             </a:r>
           </a:p>
           <a:p>
             <a:pPr lvl="1"/>
             <a:r>
-              <a:rPr lang="en-US" sz="1250" dirty="0" smtClean="0"/>
+              <a:rPr lang="en-US" sz="1200" dirty="0" smtClean="0"/>
               <a:t>This allows to investigate memory overflow issues by analyzing read/write instructions and by comparing memory size with read/write size in the instruction.</a:t>
             </a:r>
             <a:br>
-              <a:rPr lang="en-US" sz="1250" dirty="0" smtClean="0"/>
+              <a:rPr lang="en-US" sz="1200" dirty="0" smtClean="0"/>
             </a:br>
             <a:r>
-              <a:rPr lang="en-US" sz="500" dirty="0" smtClean="0"/>
+              <a:rPr lang="en-US" sz="400" dirty="0" smtClean="0"/>
               <a:t/>
             </a:r>
             <a:br>
-              <a:rPr lang="en-US" sz="500" dirty="0" smtClean="0"/>
+              <a:rPr lang="en-US" sz="400" dirty="0" smtClean="0"/>
             </a:br>
             <a:r>
-              <a:rPr lang="en-US" sz="1250" dirty="0" smtClean="0"/>
+              <a:rPr lang="en-US" sz="1200" dirty="0" smtClean="0"/>
               <a:t>So if we have suspension that crash is there because of memory overflow </a:t>
             </a:r>
             <a:r>
-              <a:rPr lang="en-US" sz="1250" dirty="0" err="1" smtClean="0"/>
+              <a:rPr lang="en-US" sz="1200" dirty="0" err="1" smtClean="0"/>
               <a:t>Valgrid</a:t>
             </a:r>
             <a:r>
-              <a:rPr lang="en-US" sz="1250" dirty="0" smtClean="0"/>
+              <a:rPr lang="en-US" sz="1200" dirty="0" smtClean="0"/>
               <a:t> should be used (or </a:t>
             </a:r>
             <a:r>
-              <a:rPr lang="en-US" sz="1250" dirty="0" err="1" smtClean="0"/>
+              <a:rPr lang="en-US" sz="1200" dirty="0" err="1" smtClean="0"/>
               <a:t>Valgrind</a:t>
             </a:r>
             <a:r>
-              <a:rPr lang="en-US" sz="1250" dirty="0" smtClean="0"/>
+              <a:rPr lang="en-US" sz="1200" dirty="0" smtClean="0"/>
               <a:t> also should be used alongside with other tools).</a:t>
             </a:r>
-            <a:endParaRPr lang="de-DE" sz="1250" dirty="0"/>
+            <a:endParaRPr lang="de-DE" sz="1200" dirty="0"/>
           </a:p>
         </p:txBody>
       </p:sp>
@@ -4941,6 +4939,108 @@
 </file>
 
 <file path=ppt/slides/slide6.xml><?xml version="1.0" encoding="utf-8"?>
+<p:sld xmlns:a="http://schemas.openxmlformats.org/drawingml/2006/main" xmlns:r="http://schemas.openxmlformats.org/officeDocument/2006/relationships" xmlns:p="http://schemas.openxmlformats.org/presentationml/2006/main">
+  <p:cSld>
+    <p:spTree>
+      <p:nvGrpSpPr>
+        <p:cNvPr id="1" name=""/>
+        <p:cNvGrpSpPr/>
+        <p:nvPr/>
+      </p:nvGrpSpPr>
+      <p:grpSpPr>
+        <a:xfrm>
+          <a:off x="0" y="0"/>
+          <a:ext cx="0" cy="0"/>
+          <a:chOff x="0" y="0"/>
+          <a:chExt cx="0" cy="0"/>
+        </a:xfrm>
+      </p:grpSpPr>
+      <p:sp>
+        <p:nvSpPr>
+          <p:cNvPr id="2" name="Title 1"/>
+          <p:cNvSpPr>
+            <a:spLocks noGrp="1"/>
+          </p:cNvSpPr>
+          <p:nvPr>
+            <p:ph type="title"/>
+          </p:nvPr>
+        </p:nvSpPr>
+        <p:spPr/>
+        <p:txBody>
+          <a:bodyPr/>
+          <a:lstStyle/>
+          <a:p>
+            <a:r>
+              <a:rPr lang="en-US" dirty="0" smtClean="0"/>
+              <a:t>Some cases of indirect double/free</a:t>
+            </a:r>
+            <a:endParaRPr lang="de-DE" dirty="0"/>
+          </a:p>
+        </p:txBody>
+      </p:sp>
+      <p:sp>
+        <p:nvSpPr>
+          <p:cNvPr id="3" name="Content Placeholder 2"/>
+          <p:cNvSpPr>
+            <a:spLocks noGrp="1"/>
+          </p:cNvSpPr>
+          <p:nvPr>
+            <p:ph idx="1"/>
+          </p:nvPr>
+        </p:nvSpPr>
+        <p:spPr/>
+        <p:txBody>
+          <a:bodyPr/>
+          <a:lstStyle/>
+          <a:p>
+            <a:r>
+              <a:rPr lang="en-US" dirty="0" smtClean="0"/>
+              <a:t>Wrong sequence of calling library functions those are internally allocating and deallocating buffers (for example </a:t>
+            </a:r>
+            <a:r>
+              <a:rPr lang="en-US" dirty="0" err="1" smtClean="0"/>
+              <a:t>fopen</a:t>
+            </a:r>
+            <a:r>
+              <a:rPr lang="en-US" dirty="0" smtClean="0"/>
+              <a:t>/</a:t>
+            </a:r>
+            <a:r>
+              <a:rPr lang="en-US" dirty="0" err="1" smtClean="0"/>
+              <a:t>fclose</a:t>
+            </a:r>
+            <a:r>
+              <a:rPr lang="en-US" dirty="0" smtClean="0"/>
+              <a:t>).</a:t>
+            </a:r>
+          </a:p>
+          <a:p>
+            <a:r>
+              <a:rPr lang="en-US" dirty="0" smtClean="0"/>
+              <a:t>Global buffers allocation/deallocation without </a:t>
+            </a:r>
+            <a:r>
+              <a:rPr lang="en-US" smtClean="0"/>
+              <a:t>proper synchronization</a:t>
+            </a:r>
+            <a:endParaRPr lang="de-DE" dirty="0"/>
+          </a:p>
+        </p:txBody>
+      </p:sp>
+    </p:spTree>
+    <p:extLst>
+      <p:ext uri="{BB962C8B-B14F-4D97-AF65-F5344CB8AC3E}">
+        <p14:creationId xmlns:p14="http://schemas.microsoft.com/office/powerpoint/2010/main" val="274034552"/>
+      </p:ext>
+    </p:extLst>
+  </p:cSld>
+  <p:clrMapOvr>
+    <a:masterClrMapping/>
+  </p:clrMapOvr>
+</p:sld>
+</file>
+
+<file path=ppt/slides/slide7.xml><?xml version="1.0" encoding="utf-8"?>
 <p:sld xmlns:a="http://schemas.openxmlformats.org/drawingml/2006/main" xmlns:r="http://schemas.openxmlformats.org/officeDocument/2006/relationships" xmlns:p="http://schemas.openxmlformats.org/presentationml/2006/main">
   <p:cSld>
     <p:spTree>

</xml_diff>

<commit_message>
Feature/14 presentation 3 (#20)
* adedd some more information on presentation
* fixed realloc/free issues
* docs/crash_investigations.pptx
   docs/lib_and_sources_of_investigator_is_not_allowed.png
* Windows is working
* fixed after windows modifications
* improved stack trace printing
* fixed dbghelper on windows
* added new way of handling version
* added cpp.hint to repository
* fixed script scripts/doocs_under_invest
* added default LD_LIBRARY_PATH to scripts/run_under_invest
* added possibility to briefly investigate memory leaks
* fixed the part of makefiles
* added build environment handling for windows
* added one more documentation
</commit_message>
<xml_diff>
--- a/docs/crash_investigations.pptx
+++ b/docs/crash_investigations.pptx
@@ -5,7 +5,7 @@
     <p:sldMasterId id="2147483660" r:id="rId1"/>
   </p:sldMasterIdLst>
   <p:notesMasterIdLst>
-    <p:notesMasterId r:id="rId8"/>
+    <p:notesMasterId r:id="rId9"/>
   </p:notesMasterIdLst>
   <p:sldIdLst>
     <p:sldId id="263" r:id="rId2"/>
@@ -13,7 +13,8 @@
     <p:sldId id="336" r:id="rId4"/>
     <p:sldId id="338" r:id="rId5"/>
     <p:sldId id="339" r:id="rId6"/>
-    <p:sldId id="340" r:id="rId7"/>
+    <p:sldId id="341" r:id="rId7"/>
+    <p:sldId id="340" r:id="rId8"/>
   </p:sldIdLst>
   <p:sldSz cx="9144000" cy="6858000" type="screen4x3"/>
   <p:notesSz cx="7104063" cy="10234613"/>
@@ -2912,15 +2913,7 @@
                   <a:schemeClr val="bg2"/>
                 </a:solidFill>
               </a:rPr>
-              <a:t>Dec </a:t>
-            </a:r>
-            <a:r>
-              <a:rPr lang="en-GB" sz="900" dirty="0" smtClean="0">
-                <a:solidFill>
-                  <a:schemeClr val="bg2"/>
-                </a:solidFill>
-              </a:rPr>
-              <a:t>2021  </a:t>
+              <a:t>Dec 2021  </a:t>
             </a:r>
             <a:r>
               <a:rPr lang="en-GB" sz="900" dirty="0">
@@ -3650,7 +3643,15 @@
           <a:p>
             <a:r>
               <a:rPr lang="en-US" dirty="0" smtClean="0"/>
-              <a:t>Memory related crashes</a:t>
+              <a:t>Memory </a:t>
+            </a:r>
+            <a:r>
+              <a:rPr lang="en-US" dirty="0" smtClean="0"/>
+              <a:t>handling related </a:t>
+            </a:r>
+            <a:r>
+              <a:rPr lang="en-US" dirty="0" smtClean="0"/>
+              <a:t>crashes</a:t>
             </a:r>
             <a:endParaRPr lang="de-DE" dirty="0" smtClean="0"/>
           </a:p>
@@ -4047,37 +4048,12 @@
                   <a:srgbClr val="339933"/>
                 </a:solidFill>
               </a:rPr>
-              <a:t>Double </a:t>
-            </a:r>
-            <a:r>
-              <a:rPr lang="en-US" sz="1500" dirty="0" smtClean="0">
-                <a:solidFill>
-                  <a:srgbClr val="339933"/>
-                </a:solidFill>
-              </a:rPr>
-              <a:t>free issue: </a:t>
-            </a:r>
-            <a:r>
-              <a:rPr lang="en-US" sz="1500" dirty="0" smtClean="0">
-                <a:solidFill>
-                  <a:srgbClr val="339933"/>
-                </a:solidFill>
-              </a:rPr>
-              <a:t>most </a:t>
-            </a:r>
-            <a:r>
-              <a:rPr lang="en-US" sz="1500" dirty="0" smtClean="0">
-                <a:solidFill>
-                  <a:srgbClr val="339933"/>
-                </a:solidFill>
-              </a:rPr>
-              <a:t>probably this will immediately crash the application.</a:t>
+              <a:t>Double free issue: most probably this will immediately crash the application.</a:t>
             </a:r>
             <a:r>
               <a:rPr lang="en-US" sz="1500" dirty="0" smtClean="0"/>
               <a:t> </a:t>
             </a:r>
-            <a:endParaRPr lang="en-US" sz="1500" dirty="0" smtClean="0"/>
           </a:p>
           <a:p>
             <a:r>
@@ -4208,6 +4184,13 @@
   <p:clrMapOvr>
     <a:masterClrMapping/>
   </p:clrMapOvr>
+  <p:timing>
+    <p:tnLst>
+      <p:par>
+        <p:cTn id="1" dur="indefinite" restart="never" nodeType="tmRoot"/>
+      </p:par>
+    </p:tnLst>
+  </p:timing>
 </p:sld>
 </file>
 
@@ -4284,232 +4267,270 @@
           <a:lstStyle/>
           <a:p>
             <a:r>
-              <a:rPr lang="en-US" sz="1700" dirty="0"/>
+              <a:rPr lang="en-US" sz="1600" dirty="0"/>
               <a:t>In the previous slide, there was a note that </a:t>
             </a:r>
             <a:r>
-              <a:rPr lang="en-US" sz="1700" dirty="0" err="1"/>
+              <a:rPr lang="en-US" sz="1600" dirty="0" err="1"/>
               <a:t>Valgrind</a:t>
             </a:r>
             <a:r>
-              <a:rPr lang="en-US" sz="1700" dirty="0"/>
+              <a:rPr lang="en-US" sz="1600" dirty="0"/>
               <a:t> works for all mentioned cases. Then the question arises why do we need something else?</a:t>
             </a:r>
-            <a:endParaRPr lang="en-US" sz="1700" dirty="0" smtClean="0"/>
+            <a:endParaRPr lang="en-US" sz="1600" dirty="0" smtClean="0"/>
           </a:p>
           <a:p>
             <a:pPr lvl="1"/>
             <a:r>
-              <a:rPr lang="en-US" sz="1250" dirty="0" smtClean="0"/>
+              <a:rPr lang="en-US" sz="1200" dirty="0" smtClean="0"/>
               <a:t>It slows down application 5-100 times.</a:t>
             </a:r>
           </a:p>
           <a:p>
             <a:pPr lvl="1"/>
             <a:r>
-              <a:rPr lang="en-US" sz="1250" dirty="0" smtClean="0"/>
+              <a:rPr lang="en-US" sz="1200" dirty="0" smtClean="0"/>
+              <a:t>It starts application on virtual environment</a:t>
+            </a:r>
+            <a:br>
+              <a:rPr lang="en-US" sz="1200" dirty="0" smtClean="0"/>
+            </a:br>
+            <a:r>
+              <a:rPr lang="en-US" sz="1200" dirty="0" smtClean="0"/>
+              <a:t>and this can hide some issues that is there</a:t>
+            </a:r>
+            <a:br>
+              <a:rPr lang="en-US" sz="1200" dirty="0" smtClean="0"/>
+            </a:br>
+            <a:r>
+              <a:rPr lang="en-US" sz="1200" dirty="0" smtClean="0"/>
+              <a:t>because </a:t>
+            </a:r>
+            <a:r>
+              <a:rPr lang="en-US" sz="1200" smtClean="0"/>
+              <a:t>of </a:t>
+            </a:r>
+            <a:r>
+              <a:rPr lang="en-US" sz="1200" smtClean="0"/>
+              <a:t>concurrency.</a:t>
+            </a:r>
+            <a:endParaRPr lang="en-US" sz="1200" dirty="0" smtClean="0"/>
+          </a:p>
+          <a:p>
+            <a:pPr lvl="1"/>
+            <a:r>
+              <a:rPr lang="en-US" sz="1200" dirty="0" smtClean="0"/>
               <a:t>Installation is needed and I’m not sure</a:t>
             </a:r>
             <a:br>
-              <a:rPr lang="en-US" sz="1250" dirty="0" smtClean="0"/>
+              <a:rPr lang="en-US" sz="1200" dirty="0" smtClean="0"/>
             </a:br>
             <a:r>
-              <a:rPr lang="en-US" sz="1250" dirty="0" smtClean="0"/>
+              <a:rPr lang="en-US" sz="1200" dirty="0" smtClean="0"/>
               <a:t>if we will have permission to install</a:t>
             </a:r>
             <a:br>
-              <a:rPr lang="en-US" sz="1250" dirty="0" smtClean="0"/>
+              <a:rPr lang="en-US" sz="1200" dirty="0" smtClean="0"/>
             </a:br>
             <a:r>
-              <a:rPr lang="en-US" sz="1250" dirty="0" err="1" smtClean="0"/>
+              <a:rPr lang="en-US" sz="1200" dirty="0" err="1" smtClean="0"/>
               <a:t>Valgrind</a:t>
             </a:r>
             <a:r>
-              <a:rPr lang="en-US" sz="1250" dirty="0" smtClean="0"/>
+              <a:rPr lang="en-US" sz="1200" dirty="0" smtClean="0"/>
               <a:t> on our server hosts.</a:t>
             </a:r>
           </a:p>
           <a:p>
             <a:pPr lvl="1"/>
             <a:r>
-              <a:rPr lang="en-US" sz="1250" dirty="0" smtClean="0"/>
-              <a:t>Easy </a:t>
-            </a:r>
-            <a:r>
-              <a:rPr lang="en-US" sz="1250" dirty="0"/>
-              <a:t>extendibility. </a:t>
-            </a:r>
-            <a:r>
-              <a:rPr lang="en-US" sz="1250" dirty="0" err="1"/>
+              <a:rPr lang="en-US" sz="1200" dirty="0" smtClean="0"/>
+              <a:t>Extendibility</a:t>
+            </a:r>
+            <a:r>
+              <a:rPr lang="en-US" sz="1200" dirty="0"/>
+              <a:t>:</a:t>
+            </a:r>
+            <a:r>
+              <a:rPr lang="en-US" sz="1200" dirty="0" smtClean="0"/>
+              <a:t> </a:t>
+            </a:r>
+            <a:r>
+              <a:rPr lang="en-US" sz="1200" dirty="0" err="1"/>
               <a:t>Valgrind</a:t>
             </a:r>
             <a:r>
-              <a:rPr lang="en-US" sz="1250" dirty="0"/>
-              <a:t> also mentions the </a:t>
-            </a:r>
-            <a:r>
-              <a:rPr lang="en-US" sz="1250" dirty="0" smtClean="0"/>
+              <a:rPr lang="en-US" sz="1200" dirty="0"/>
+              <a:t> </a:t>
+            </a:r>
+            <a:r>
+              <a:rPr lang="en-US" sz="1200" dirty="0" smtClean="0"/>
+              <a:t>mentions </a:t>
+            </a:r>
+            <a:r>
+              <a:rPr lang="en-US" sz="1200" dirty="0"/>
+              <a:t>the </a:t>
+            </a:r>
+            <a:r>
+              <a:rPr lang="en-US" sz="1200" dirty="0" smtClean="0"/>
               <a:t/>
             </a:r>
             <a:br>
-              <a:rPr lang="en-US" sz="1250" dirty="0" smtClean="0"/>
+              <a:rPr lang="en-US" sz="1200" dirty="0" smtClean="0"/>
             </a:br>
             <a:r>
-              <a:rPr lang="en-US" sz="1250" dirty="0" smtClean="0"/>
+              <a:rPr lang="en-US" sz="1200" dirty="0" smtClean="0"/>
               <a:t>possibility </a:t>
             </a:r>
             <a:r>
-              <a:rPr lang="en-US" sz="1250" dirty="0"/>
+              <a:rPr lang="en-US" sz="1200" dirty="0"/>
               <a:t>to extend, but I think it is very </a:t>
             </a:r>
             <a:r>
-              <a:rPr lang="en-US" sz="1250" dirty="0" smtClean="0"/>
+              <a:rPr lang="en-US" sz="1200" dirty="0" smtClean="0"/>
               <a:t/>
             </a:r>
             <a:br>
-              <a:rPr lang="en-US" sz="1250" dirty="0" smtClean="0"/>
+              <a:rPr lang="en-US" sz="1200" dirty="0" smtClean="0"/>
             </a:br>
             <a:r>
-              <a:rPr lang="en-US" sz="1250" dirty="0" smtClean="0"/>
+              <a:rPr lang="en-US" sz="1200" dirty="0" smtClean="0"/>
               <a:t>complicated </a:t>
             </a:r>
             <a:r>
-              <a:rPr lang="en-US" sz="1250" dirty="0"/>
+              <a:rPr lang="en-US" sz="1200" dirty="0"/>
               <a:t>and one should have very well knowledge of low-level programming (including GNU assembly) for handling </a:t>
             </a:r>
             <a:r>
-              <a:rPr lang="en-US" sz="1250" dirty="0" err="1"/>
+              <a:rPr lang="en-US" sz="1200" dirty="0" err="1"/>
               <a:t>Valgrind</a:t>
             </a:r>
             <a:r>
-              <a:rPr lang="en-US" sz="1250" dirty="0"/>
+              <a:rPr lang="en-US" sz="1200" dirty="0"/>
               <a:t> code. To clone and play with </a:t>
             </a:r>
             <a:r>
-              <a:rPr lang="en-US" sz="1250" dirty="0" err="1"/>
+              <a:rPr lang="en-US" sz="1200" dirty="0" err="1"/>
               <a:t>Valgrind</a:t>
             </a:r>
             <a:r>
-              <a:rPr lang="en-US" sz="1250" dirty="0"/>
+              <a:rPr lang="en-US" sz="1200" dirty="0"/>
               <a:t> code one can use the command: ‘</a:t>
             </a:r>
             <a:r>
-              <a:rPr lang="en-US" sz="1250" dirty="0" err="1"/>
+              <a:rPr lang="en-US" sz="1200" dirty="0" err="1"/>
               <a:t>git</a:t>
             </a:r>
             <a:r>
-              <a:rPr lang="en-US" sz="1250" dirty="0"/>
+              <a:rPr lang="en-US" sz="1200" dirty="0"/>
               <a:t> clone </a:t>
             </a:r>
             <a:r>
-              <a:rPr lang="en-US" sz="1250" dirty="0" err="1"/>
+              <a:rPr lang="en-US" sz="1200" dirty="0" err="1"/>
               <a:t>git</a:t>
             </a:r>
             <a:r>
-              <a:rPr lang="en-US" sz="1250" dirty="0"/>
+              <a:rPr lang="en-US" sz="1200" dirty="0"/>
               <a:t>://sourceware.org/</a:t>
             </a:r>
             <a:r>
-              <a:rPr lang="en-US" sz="1250" dirty="0" err="1"/>
+              <a:rPr lang="en-US" sz="1200" dirty="0" err="1"/>
               <a:t>git</a:t>
             </a:r>
             <a:r>
-              <a:rPr lang="en-US" sz="1250" dirty="0"/>
+              <a:rPr lang="en-US" sz="1200" dirty="0"/>
               <a:t>/</a:t>
             </a:r>
             <a:r>
-              <a:rPr lang="en-US" sz="1250" dirty="0" err="1"/>
+              <a:rPr lang="en-US" sz="1200" dirty="0" err="1"/>
               <a:t>valgrind.git</a:t>
             </a:r>
             <a:r>
-              <a:rPr lang="en-US" sz="1250" dirty="0" smtClean="0"/>
-              <a:t>’.</a:t>
-            </a:r>
-            <a:r>
-              <a:rPr lang="en-US" dirty="0" smtClean="0"/>
-              <a:t> </a:t>
+              <a:rPr lang="en-US" sz="1200" dirty="0" smtClean="0"/>
+              <a:t>’. </a:t>
             </a:r>
           </a:p>
           <a:p>
             <a:pPr lvl="1"/>
             <a:r>
-              <a:rPr lang="en-US" sz="1250" dirty="0" smtClean="0"/>
+              <a:rPr lang="en-US" sz="1200" dirty="0" smtClean="0"/>
               <a:t>Runtime extendibility !!!</a:t>
             </a:r>
           </a:p>
           <a:p>
             <a:pPr lvl="1"/>
             <a:r>
-              <a:rPr lang="en-US" sz="1250" dirty="0" smtClean="0"/>
+              <a:rPr lang="en-US" sz="1200" dirty="0" smtClean="0"/>
               <a:t>Windows!!! (for Windows proof of concept app is done, but complete system is not prepared)</a:t>
             </a:r>
           </a:p>
           <a:p>
             <a:r>
-              <a:rPr lang="en-US" sz="1700" dirty="0" err="1"/>
+              <a:rPr lang="en-US" sz="1600" dirty="0" err="1"/>
               <a:t>Valgrind</a:t>
             </a:r>
             <a:r>
-              <a:rPr lang="en-US" sz="1700" dirty="0"/>
+              <a:rPr lang="en-US" sz="1600" dirty="0"/>
               <a:t> starts applications in the virtual environment where all instructions of applications are trapped by </a:t>
             </a:r>
             <a:r>
-              <a:rPr lang="en-US" sz="1700" dirty="0" err="1"/>
+              <a:rPr lang="en-US" sz="1600" dirty="0" err="1"/>
               <a:t>Valgrind</a:t>
             </a:r>
             <a:r>
-              <a:rPr lang="en-US" sz="1700" dirty="0"/>
+              <a:rPr lang="en-US" sz="1600" dirty="0"/>
               <a:t>, then analyzed and only after that the instructions </a:t>
             </a:r>
             <a:r>
-              <a:rPr lang="en-US" sz="1700" dirty="0" smtClean="0"/>
+              <a:rPr lang="en-US" sz="1600" dirty="0" smtClean="0"/>
               <a:t>executed.</a:t>
             </a:r>
           </a:p>
           <a:p>
             <a:pPr lvl="1"/>
             <a:r>
-              <a:rPr lang="en-US" sz="1250" dirty="0" smtClean="0"/>
+              <a:rPr lang="en-US" sz="1200" dirty="0" smtClean="0"/>
               <a:t>This is the reason of slowing down the application dramatically.</a:t>
             </a:r>
           </a:p>
           <a:p>
             <a:pPr lvl="1"/>
             <a:r>
-              <a:rPr lang="en-US" sz="1250" dirty="0" smtClean="0"/>
+              <a:rPr lang="en-US" sz="1200" dirty="0" smtClean="0"/>
               <a:t>This allows to investigate memory overflow issues by analyzing read/write instructions and by comparing memory size with read/write size in the instruction.</a:t>
             </a:r>
             <a:br>
-              <a:rPr lang="en-US" sz="1250" dirty="0" smtClean="0"/>
+              <a:rPr lang="en-US" sz="1200" dirty="0" smtClean="0"/>
             </a:br>
             <a:r>
-              <a:rPr lang="en-US" sz="500" dirty="0" smtClean="0"/>
+              <a:rPr lang="en-US" sz="400" dirty="0" smtClean="0"/>
               <a:t/>
             </a:r>
             <a:br>
-              <a:rPr lang="en-US" sz="500" dirty="0" smtClean="0"/>
+              <a:rPr lang="en-US" sz="400" dirty="0" smtClean="0"/>
             </a:br>
             <a:r>
-              <a:rPr lang="en-US" sz="1250" dirty="0" smtClean="0"/>
+              <a:rPr lang="en-US" sz="1200" dirty="0" smtClean="0"/>
               <a:t>So if we have suspension that crash is there because of memory overflow </a:t>
             </a:r>
             <a:r>
-              <a:rPr lang="en-US" sz="1250" dirty="0" err="1" smtClean="0"/>
+              <a:rPr lang="en-US" sz="1200" dirty="0" err="1" smtClean="0"/>
               <a:t>Valgrid</a:t>
             </a:r>
             <a:r>
-              <a:rPr lang="en-US" sz="1250" dirty="0" smtClean="0"/>
+              <a:rPr lang="en-US" sz="1200" dirty="0" smtClean="0"/>
               <a:t> should be used (or </a:t>
             </a:r>
             <a:r>
-              <a:rPr lang="en-US" sz="1250" dirty="0" err="1" smtClean="0"/>
+              <a:rPr lang="en-US" sz="1200" dirty="0" err="1" smtClean="0"/>
               <a:t>Valgrind</a:t>
             </a:r>
             <a:r>
-              <a:rPr lang="en-US" sz="1250" dirty="0" smtClean="0"/>
+              <a:rPr lang="en-US" sz="1200" dirty="0" smtClean="0"/>
               <a:t> also should be used alongside with other tools).</a:t>
             </a:r>
-            <a:endParaRPr lang="de-DE" sz="1250" dirty="0"/>
+            <a:endParaRPr lang="de-DE" sz="1200" dirty="0"/>
           </a:p>
         </p:txBody>
       </p:sp>
@@ -4639,6 +4660,13 @@
   <p:clrMapOvr>
     <a:masterClrMapping/>
   </p:clrMapOvr>
+  <p:timing>
+    <p:tnLst>
+      <p:par>
+        <p:cTn id="1" dur="indefinite" restart="never" nodeType="tmRoot"/>
+      </p:par>
+    </p:tnLst>
+  </p:timing>
 </p:sld>
 </file>
 
@@ -4676,7 +4704,11 @@
           <a:p>
             <a:r>
               <a:rPr lang="en-US" dirty="0" smtClean="0"/>
-              <a:t>What is the idea behind</a:t>
+              <a:t>Crash investigator - </a:t>
+            </a:r>
+            <a:r>
+              <a:rPr lang="en-US" dirty="0" smtClean="0"/>
+              <a:t>idea behind</a:t>
             </a:r>
             <a:endParaRPr lang="de-DE" dirty="0"/>
           </a:p>
@@ -4707,7 +4739,15 @@
             </a:pPr>
             <a:r>
               <a:rPr lang="en-US" sz="1600" dirty="0" smtClean="0"/>
-              <a:t>In order to trap memory allocations functions and make some analyze the following should be done</a:t>
+              <a:t>In order to trap memory allocations functions and make some analyze the following </a:t>
+            </a:r>
+            <a:r>
+              <a:rPr lang="en-US" sz="1600" dirty="0" smtClean="0"/>
+              <a:t>can be </a:t>
+            </a:r>
+            <a:r>
+              <a:rPr lang="en-US" sz="1600" dirty="0" smtClean="0"/>
+              <a:t>done</a:t>
             </a:r>
           </a:p>
           <a:p>
@@ -4822,7 +4862,15 @@
             </a:r>
             <a:r>
               <a:rPr lang="en-US" sz="1600" dirty="0"/>
-              <a:t> and friends function, then the application's functions will be called instead of Glibc functions. This will happen because these functions are defined as weak symbols and any new symbol with the same name(s) will be used instead. This is true only for Linux, for Windows hacking </a:t>
+              <a:t> and friends function, then the application's functions will be called instead of Glibc functions. This will happen because these functions are defined as weak symbols and any new symbol with the same name(s) will be used instead. This is true only for </a:t>
+            </a:r>
+            <a:r>
+              <a:rPr lang="en-US" sz="1600" dirty="0" smtClean="0"/>
+              <a:t>Linux. For </a:t>
+            </a:r>
+            <a:r>
+              <a:rPr lang="en-US" sz="1600" dirty="0"/>
+              <a:t>Windows hacking </a:t>
             </a:r>
             <a:r>
               <a:rPr lang="en-US" sz="1600" dirty="0" err="1"/>
@@ -4937,10 +4985,250 @@
   <p:clrMapOvr>
     <a:masterClrMapping/>
   </p:clrMapOvr>
+  <p:timing>
+    <p:tnLst>
+      <p:par>
+        <p:cTn id="1" dur="indefinite" restart="never" nodeType="tmRoot"/>
+      </p:par>
+    </p:tnLst>
+  </p:timing>
 </p:sld>
 </file>
 
 <file path=ppt/slides/slide6.xml><?xml version="1.0" encoding="utf-8"?>
+<p:sld xmlns:a="http://schemas.openxmlformats.org/drawingml/2006/main" xmlns:r="http://schemas.openxmlformats.org/officeDocument/2006/relationships" xmlns:p="http://schemas.openxmlformats.org/presentationml/2006/main">
+  <p:cSld>
+    <p:spTree>
+      <p:nvGrpSpPr>
+        <p:cNvPr id="1" name=""/>
+        <p:cNvGrpSpPr/>
+        <p:nvPr/>
+      </p:nvGrpSpPr>
+      <p:grpSpPr>
+        <a:xfrm>
+          <a:off x="0" y="0"/>
+          <a:ext cx="0" cy="0"/>
+          <a:chOff x="0" y="0"/>
+          <a:chExt cx="0" cy="0"/>
+        </a:xfrm>
+      </p:grpSpPr>
+      <p:sp>
+        <p:nvSpPr>
+          <p:cNvPr id="2" name="Title 1"/>
+          <p:cNvSpPr>
+            <a:spLocks noGrp="1"/>
+          </p:cNvSpPr>
+          <p:nvPr>
+            <p:ph type="title"/>
+          </p:nvPr>
+        </p:nvSpPr>
+        <p:spPr/>
+        <p:txBody>
+          <a:bodyPr/>
+          <a:lstStyle/>
+          <a:p>
+            <a:r>
+              <a:rPr lang="en-US" dirty="0" smtClean="0"/>
+              <a:t>Some cases of indirect double/free</a:t>
+            </a:r>
+            <a:endParaRPr lang="de-DE" dirty="0"/>
+          </a:p>
+        </p:txBody>
+      </p:sp>
+      <p:sp>
+        <p:nvSpPr>
+          <p:cNvPr id="3" name="Content Placeholder 2"/>
+          <p:cNvSpPr>
+            <a:spLocks noGrp="1"/>
+          </p:cNvSpPr>
+          <p:nvPr>
+            <p:ph idx="1"/>
+          </p:nvPr>
+        </p:nvSpPr>
+        <p:spPr/>
+        <p:txBody>
+          <a:bodyPr/>
+          <a:lstStyle/>
+          <a:p>
+            <a:pPr marL="0" indent="0">
+              <a:buNone/>
+            </a:pPr>
+            <a:r>
+              <a:rPr lang="en-US" sz="1900" b="1" dirty="0"/>
+              <a:t>Be aware double-free will not happen only in the case when one explicitly calls 2 times to function delete or free. Double free can happen also by calling other APIs that, in turn, will allocate/deallocate buffers!!!</a:t>
+            </a:r>
+            <a:br>
+              <a:rPr lang="en-US" sz="1900" b="1" dirty="0"/>
+            </a:br>
+            <a:r>
+              <a:rPr lang="en-US" sz="1900" b="1" dirty="0"/>
+              <a:t>Sometimes the problem can be there because of concurrency!!!</a:t>
+            </a:r>
+            <a:endParaRPr lang="en-US" sz="1900" b="1" dirty="0" smtClean="0"/>
+          </a:p>
+          <a:p>
+            <a:r>
+              <a:rPr lang="en-US" sz="1800" dirty="0" smtClean="0"/>
+              <a:t>A </a:t>
+            </a:r>
+            <a:r>
+              <a:rPr lang="en-US" sz="1800" dirty="0"/>
+              <a:t>wrong sequence of calling library functions internally allocating and deallocating buffers (for example </a:t>
+            </a:r>
+            <a:r>
+              <a:rPr lang="en-US" sz="1800" dirty="0" err="1"/>
+              <a:t>fopen</a:t>
+            </a:r>
+            <a:r>
+              <a:rPr lang="en-US" sz="1800" dirty="0"/>
+              <a:t>/</a:t>
+            </a:r>
+            <a:r>
+              <a:rPr lang="en-US" sz="1800" dirty="0" err="1"/>
+              <a:t>fclose</a:t>
+            </a:r>
+            <a:r>
+              <a:rPr lang="en-US" sz="1800" dirty="0"/>
+              <a:t>).</a:t>
+            </a:r>
+            <a:endParaRPr lang="en-US" sz="1800" dirty="0" smtClean="0"/>
+          </a:p>
+          <a:p>
+            <a:r>
+              <a:rPr lang="en-US" sz="1800" dirty="0" smtClean="0"/>
+              <a:t>Global buffers allocation/deallocation without proper </a:t>
+            </a:r>
+            <a:r>
+              <a:rPr lang="en-US" sz="1800" dirty="0" smtClean="0"/>
+              <a:t>synchronization.</a:t>
+            </a:r>
+          </a:p>
+          <a:p>
+            <a:r>
+              <a:rPr lang="en-US" sz="1800" dirty="0" err="1" smtClean="0"/>
+              <a:t>Realloc</a:t>
+            </a:r>
+            <a:r>
+              <a:rPr lang="en-US" sz="1800" dirty="0" smtClean="0"/>
+              <a:t> of the same address with the assumption that the old address is not deleted and valid after the </a:t>
+            </a:r>
+            <a:r>
+              <a:rPr lang="en-US" sz="1800" dirty="0" err="1" smtClean="0"/>
+              <a:t>realloc</a:t>
+            </a:r>
+            <a:r>
+              <a:rPr lang="en-US" sz="1800" dirty="0" smtClean="0"/>
+              <a:t> </a:t>
+            </a:r>
+            <a:br>
+              <a:rPr lang="en-US" sz="1800" dirty="0" smtClean="0"/>
+            </a:br>
+            <a:r>
+              <a:rPr lang="en-US" sz="1800" dirty="0" smtClean="0"/>
+              <a:t>call. As you see - here crash </a:t>
+            </a:r>
+            <a:br>
+              <a:rPr lang="en-US" sz="1800" dirty="0" smtClean="0"/>
+            </a:br>
+            <a:r>
+              <a:rPr lang="en-US" sz="1800" dirty="0" smtClean="0"/>
+              <a:t>can happen even without global </a:t>
+            </a:r>
+            <a:br>
+              <a:rPr lang="en-US" sz="1800" dirty="0" smtClean="0"/>
+            </a:br>
+            <a:r>
+              <a:rPr lang="en-US" sz="1800" dirty="0" smtClean="0"/>
+              <a:t>visible pointer. </a:t>
+            </a:r>
+          </a:p>
+          <a:p>
+            <a:r>
+              <a:rPr lang="en-US" sz="1800" dirty="0"/>
+              <a:t>Working with STL containers should be properly synchronized. I think it is obvious that containers should not be protected by some synchronization mechanism (for example </a:t>
+            </a:r>
+            <a:r>
+              <a:rPr lang="en-US" sz="1800" dirty="0" err="1"/>
+              <a:t>mutex</a:t>
+            </a:r>
+            <a:r>
+              <a:rPr lang="en-US" sz="1800" dirty="0"/>
+              <a:t>) in the implementation. So the containers should be protected by a developer.     </a:t>
+            </a:r>
+            <a:endParaRPr lang="de-DE" sz="1800" dirty="0"/>
+          </a:p>
+        </p:txBody>
+      </p:sp>
+      <p:pic>
+        <p:nvPicPr>
+          <p:cNvPr id="1029" name="Picture 5"/>
+          <p:cNvPicPr>
+            <a:picLocks noChangeAspect="1" noChangeArrowheads="1"/>
+          </p:cNvPicPr>
+          <p:nvPr/>
+        </p:nvPicPr>
+        <p:blipFill>
+          <a:blip r:embed="rId2">
+            <a:extLst>
+              <a:ext uri="{28A0092B-C50C-407E-A947-70E740481C1C}">
+                <a14:useLocalDpi xmlns:a14="http://schemas.microsoft.com/office/drawing/2010/main" val="0"/>
+              </a:ext>
+            </a:extLst>
+          </a:blip>
+          <a:srcRect/>
+          <a:stretch>
+            <a:fillRect/>
+          </a:stretch>
+        </p:blipFill>
+        <p:spPr bwMode="auto">
+          <a:xfrm>
+            <a:off x="4125433" y="3778101"/>
+            <a:ext cx="4219795" cy="1056169"/>
+          </a:xfrm>
+          <a:prstGeom prst="rect">
+            <a:avLst/>
+          </a:prstGeom>
+          <a:noFill/>
+          <a:ln w="9525">
+            <a:solidFill>
+              <a:schemeClr val="tx1"/>
+            </a:solidFill>
+            <a:miter lim="800000"/>
+            <a:headEnd/>
+            <a:tailEnd/>
+          </a:ln>
+          <a:extLst>
+            <a:ext uri="{909E8E84-426E-40DD-AFC4-6F175D3DCCD1}">
+              <a14:hiddenFill xmlns:a14="http://schemas.microsoft.com/office/drawing/2010/main">
+                <a:solidFill>
+                  <a:schemeClr val="accent1"/>
+                </a:solidFill>
+              </a14:hiddenFill>
+            </a:ext>
+          </a:extLst>
+        </p:spPr>
+      </p:pic>
+    </p:spTree>
+    <p:extLst>
+      <p:ext uri="{BB962C8B-B14F-4D97-AF65-F5344CB8AC3E}">
+        <p14:creationId xmlns:p14="http://schemas.microsoft.com/office/powerpoint/2010/main" val="274034552"/>
+      </p:ext>
+    </p:extLst>
+  </p:cSld>
+  <p:clrMapOvr>
+    <a:masterClrMapping/>
+  </p:clrMapOvr>
+  <p:timing>
+    <p:tnLst>
+      <p:par>
+        <p:cTn id="1" dur="indefinite" restart="never" nodeType="tmRoot"/>
+      </p:par>
+    </p:tnLst>
+  </p:timing>
+</p:sld>
+</file>
+
+<file path=ppt/slides/slide7.xml><?xml version="1.0" encoding="utf-8"?>
 <p:sld xmlns:a="http://schemas.openxmlformats.org/drawingml/2006/main" xmlns:r="http://schemas.openxmlformats.org/officeDocument/2006/relationships" xmlns:p="http://schemas.openxmlformats.org/presentationml/2006/main">
   <p:cSld>
     <p:spTree>
@@ -5338,6 +5626,13 @@
   <p:clrMapOvr>
     <a:masterClrMapping/>
   </p:clrMapOvr>
+  <p:timing>
+    <p:tnLst>
+      <p:par>
+        <p:cTn id="1" dur="indefinite" restart="never" nodeType="tmRoot"/>
+      </p:par>
+    </p:tnLst>
+  </p:timing>
 </p:sld>
 </file>
 

</xml_diff>

<commit_message>
added hint on addr2line and nm usage
</commit_message>
<xml_diff>
--- a/docs/crash_investigations.pptx
+++ b/docs/crash_investigations.pptx
@@ -5,7 +5,7 @@
     <p:sldMasterId id="2147483660" r:id="rId1"/>
   </p:sldMasterIdLst>
   <p:notesMasterIdLst>
-    <p:notesMasterId r:id="rId9"/>
+    <p:notesMasterId r:id="rId10"/>
   </p:notesMasterIdLst>
   <p:sldIdLst>
     <p:sldId id="263" r:id="rId2"/>
@@ -15,6 +15,7 @@
     <p:sldId id="339" r:id="rId6"/>
     <p:sldId id="341" r:id="rId7"/>
     <p:sldId id="340" r:id="rId8"/>
+    <p:sldId id="342" r:id="rId9"/>
   </p:sldIdLst>
   <p:sldSz cx="9144000" cy="6858000" type="screen4x3"/>
   <p:notesSz cx="7104063" cy="10234613"/>
@@ -3643,15 +3644,7 @@
           <a:p>
             <a:r>
               <a:rPr lang="en-US" dirty="0" smtClean="0"/>
-              <a:t>Memory </a:t>
-            </a:r>
-            <a:r>
-              <a:rPr lang="en-US" dirty="0" smtClean="0"/>
-              <a:t>handling related </a:t>
-            </a:r>
-            <a:r>
-              <a:rPr lang="en-US" dirty="0" smtClean="0"/>
-              <a:t>crashes</a:t>
+              <a:t>Memory handling related crashes</a:t>
             </a:r>
             <a:endParaRPr lang="de-DE" dirty="0" smtClean="0"/>
           </a:p>
@@ -4309,11 +4302,7 @@
             </a:r>
             <a:r>
               <a:rPr lang="en-US" sz="1200" smtClean="0"/>
-              <a:t>of </a:t>
-            </a:r>
-            <a:r>
-              <a:rPr lang="en-US" sz="1200" smtClean="0"/>
-              <a:t>concurrency.</a:t>
+              <a:t>of concurrency.</a:t>
             </a:r>
             <a:endParaRPr lang="en-US" sz="1200" dirty="0" smtClean="0"/>
           </a:p>
@@ -4704,11 +4693,7 @@
           <a:p>
             <a:r>
               <a:rPr lang="en-US" dirty="0" smtClean="0"/>
-              <a:t>Crash investigator - </a:t>
-            </a:r>
-            <a:r>
-              <a:rPr lang="en-US" dirty="0" smtClean="0"/>
-              <a:t>idea behind</a:t>
+              <a:t>Crash investigator - idea behind</a:t>
             </a:r>
             <a:endParaRPr lang="de-DE" dirty="0"/>
           </a:p>
@@ -4739,15 +4724,7 @@
             </a:pPr>
             <a:r>
               <a:rPr lang="en-US" sz="1600" dirty="0" smtClean="0"/>
-              <a:t>In order to trap memory allocations functions and make some analyze the following </a:t>
-            </a:r>
-            <a:r>
-              <a:rPr lang="en-US" sz="1600" dirty="0" smtClean="0"/>
-              <a:t>can be </a:t>
-            </a:r>
-            <a:r>
-              <a:rPr lang="en-US" sz="1600" dirty="0" smtClean="0"/>
-              <a:t>done</a:t>
+              <a:t>In order to trap memory allocations functions and make some analyze the following can be done</a:t>
             </a:r>
           </a:p>
           <a:p>
@@ -5096,11 +5073,7 @@
           <a:p>
             <a:r>
               <a:rPr lang="en-US" sz="1800" dirty="0" smtClean="0"/>
-              <a:t>Global buffers allocation/deallocation without proper </a:t>
-            </a:r>
-            <a:r>
-              <a:rPr lang="en-US" sz="1800" dirty="0" smtClean="0"/>
-              <a:t>synchronization.</a:t>
+              <a:t>Global buffers allocation/deallocation without proper synchronization.</a:t>
             </a:r>
           </a:p>
           <a:p>
@@ -5633,6 +5606,99 @@
       </p:par>
     </p:tnLst>
   </p:timing>
+</p:sld>
+</file>
+
+<file path=ppt/slides/slide8.xml><?xml version="1.0" encoding="utf-8"?>
+<p:sld xmlns:a="http://schemas.openxmlformats.org/drawingml/2006/main" xmlns:r="http://schemas.openxmlformats.org/officeDocument/2006/relationships" xmlns:p="http://schemas.openxmlformats.org/presentationml/2006/main">
+  <p:cSld>
+    <p:spTree>
+      <p:nvGrpSpPr>
+        <p:cNvPr id="1" name=""/>
+        <p:cNvGrpSpPr/>
+        <p:nvPr/>
+      </p:nvGrpSpPr>
+      <p:grpSpPr>
+        <a:xfrm>
+          <a:off x="0" y="0"/>
+          <a:ext cx="0" cy="0"/>
+          <a:chOff x="0" y="0"/>
+          <a:chExt cx="0" cy="0"/>
+        </a:xfrm>
+      </p:grpSpPr>
+      <p:sp>
+        <p:nvSpPr>
+          <p:cNvPr id="2" name="Title 1"/>
+          <p:cNvSpPr>
+            <a:spLocks noGrp="1"/>
+          </p:cNvSpPr>
+          <p:nvPr>
+            <p:ph type="title"/>
+          </p:nvPr>
+        </p:nvSpPr>
+        <p:spPr/>
+        <p:txBody>
+          <a:bodyPr/>
+          <a:lstStyle/>
+          <a:p>
+            <a:endParaRPr lang="de-DE"/>
+          </a:p>
+        </p:txBody>
+      </p:sp>
+      <p:sp>
+        <p:nvSpPr>
+          <p:cNvPr id="3" name="Content Placeholder 2"/>
+          <p:cNvSpPr>
+            <a:spLocks noGrp="1"/>
+          </p:cNvSpPr>
+          <p:nvPr>
+            <p:ph idx="1"/>
+          </p:nvPr>
+        </p:nvSpPr>
+        <p:spPr/>
+        <p:txBody>
+          <a:bodyPr/>
+          <a:lstStyle/>
+          <a:p>
+            <a:r>
+              <a:rPr lang="de-DE" dirty="0"/>
+              <a:t>addr2line -e /home/kalantar/dev/crash_investigator/sys/focal/Debug/lib/libcrash_investigator_new_malloc_0020.so -f -C </a:t>
+            </a:r>
+            <a:r>
+              <a:rPr lang="de-DE" dirty="0" smtClean="0"/>
+              <a:t>0x7d75</a:t>
+            </a:r>
+          </a:p>
+          <a:p>
+            <a:r>
+              <a:rPr lang="de-DE" dirty="0" err="1"/>
+              <a:t>nm</a:t>
+            </a:r>
+            <a:r>
+              <a:rPr lang="de-DE" dirty="0"/>
+              <a:t> /home/kalantar/dev/crash_investigator/sys/focal/Debug/lib/libcrash_investigator_new_malloc_0020.so | </a:t>
+            </a:r>
+            <a:r>
+              <a:rPr lang="de-DE" dirty="0" err="1"/>
+              <a:t>grep</a:t>
+            </a:r>
+            <a:r>
+              <a:rPr lang="de-DE"/>
+              <a:t> _ZN18crash_investigator11CMemoryItem4InitEmNS_11FailureTypeEPvPNS_9BacktraceE</a:t>
+            </a:r>
+          </a:p>
+        </p:txBody>
+      </p:sp>
+    </p:spTree>
+    <p:extLst>
+      <p:ext uri="{BB962C8B-B14F-4D97-AF65-F5344CB8AC3E}">
+        <p14:creationId xmlns:p14="http://schemas.microsoft.com/office/powerpoint/2010/main" val="874984380"/>
+      </p:ext>
+    </p:extLst>
+  </p:cSld>
+  <p:clrMapOvr>
+    <a:masterClrMapping/>
+  </p:clrMapOvr>
 </p:sld>
 </file>
 

</xml_diff>

<commit_message>
Feature/22 improve dealloc policy (#23)
* fixed early free/realloc issue
* fixed cases with investigation without C
* makefile fixed
* finding some assert
* some reorder
* added this->deallocTrace = CRASH_INVEST_NULL
* added hint on addr2line and nm usage
* applied last changes on free/realloc fix on windows
* incremented version number in the runner scripts
</commit_message>
<xml_diff>
--- a/docs/crash_investigations.pptx
+++ b/docs/crash_investigations.pptx
@@ -5,7 +5,7 @@
     <p:sldMasterId id="2147483660" r:id="rId1"/>
   </p:sldMasterIdLst>
   <p:notesMasterIdLst>
-    <p:notesMasterId r:id="rId9"/>
+    <p:notesMasterId r:id="rId10"/>
   </p:notesMasterIdLst>
   <p:sldIdLst>
     <p:sldId id="263" r:id="rId2"/>
@@ -15,6 +15,7 @@
     <p:sldId id="339" r:id="rId6"/>
     <p:sldId id="341" r:id="rId7"/>
     <p:sldId id="340" r:id="rId8"/>
+    <p:sldId id="342" r:id="rId9"/>
   </p:sldIdLst>
   <p:sldSz cx="9144000" cy="6858000" type="screen4x3"/>
   <p:notesSz cx="7104063" cy="10234613"/>
@@ -3643,15 +3644,7 @@
           <a:p>
             <a:r>
               <a:rPr lang="en-US" dirty="0" smtClean="0"/>
-              <a:t>Memory </a:t>
-            </a:r>
-            <a:r>
-              <a:rPr lang="en-US" dirty="0" smtClean="0"/>
-              <a:t>handling related </a:t>
-            </a:r>
-            <a:r>
-              <a:rPr lang="en-US" dirty="0" smtClean="0"/>
-              <a:t>crashes</a:t>
+              <a:t>Memory handling related crashes</a:t>
             </a:r>
             <a:endParaRPr lang="de-DE" dirty="0" smtClean="0"/>
           </a:p>
@@ -4309,11 +4302,7 @@
             </a:r>
             <a:r>
               <a:rPr lang="en-US" sz="1200" smtClean="0"/>
-              <a:t>of </a:t>
-            </a:r>
-            <a:r>
-              <a:rPr lang="en-US" sz="1200" smtClean="0"/>
-              <a:t>concurrency.</a:t>
+              <a:t>of concurrency.</a:t>
             </a:r>
             <a:endParaRPr lang="en-US" sz="1200" dirty="0" smtClean="0"/>
           </a:p>
@@ -4704,11 +4693,7 @@
           <a:p>
             <a:r>
               <a:rPr lang="en-US" dirty="0" smtClean="0"/>
-              <a:t>Crash investigator - </a:t>
-            </a:r>
-            <a:r>
-              <a:rPr lang="en-US" dirty="0" smtClean="0"/>
-              <a:t>idea behind</a:t>
+              <a:t>Crash investigator - idea behind</a:t>
             </a:r>
             <a:endParaRPr lang="de-DE" dirty="0"/>
           </a:p>
@@ -4739,15 +4724,7 @@
             </a:pPr>
             <a:r>
               <a:rPr lang="en-US" sz="1600" dirty="0" smtClean="0"/>
-              <a:t>In order to trap memory allocations functions and make some analyze the following </a:t>
-            </a:r>
-            <a:r>
-              <a:rPr lang="en-US" sz="1600" dirty="0" smtClean="0"/>
-              <a:t>can be </a:t>
-            </a:r>
-            <a:r>
-              <a:rPr lang="en-US" sz="1600" dirty="0" smtClean="0"/>
-              <a:t>done</a:t>
+              <a:t>In order to trap memory allocations functions and make some analyze the following can be done</a:t>
             </a:r>
           </a:p>
           <a:p>
@@ -5096,11 +5073,7 @@
           <a:p>
             <a:r>
               <a:rPr lang="en-US" sz="1800" dirty="0" smtClean="0"/>
-              <a:t>Global buffers allocation/deallocation without proper </a:t>
-            </a:r>
-            <a:r>
-              <a:rPr lang="en-US" sz="1800" dirty="0" smtClean="0"/>
-              <a:t>synchronization.</a:t>
+              <a:t>Global buffers allocation/deallocation without proper synchronization.</a:t>
             </a:r>
           </a:p>
           <a:p>
@@ -5633,6 +5606,99 @@
       </p:par>
     </p:tnLst>
   </p:timing>
+</p:sld>
+</file>
+
+<file path=ppt/slides/slide8.xml><?xml version="1.0" encoding="utf-8"?>
+<p:sld xmlns:a="http://schemas.openxmlformats.org/drawingml/2006/main" xmlns:r="http://schemas.openxmlformats.org/officeDocument/2006/relationships" xmlns:p="http://schemas.openxmlformats.org/presentationml/2006/main">
+  <p:cSld>
+    <p:spTree>
+      <p:nvGrpSpPr>
+        <p:cNvPr id="1" name=""/>
+        <p:cNvGrpSpPr/>
+        <p:nvPr/>
+      </p:nvGrpSpPr>
+      <p:grpSpPr>
+        <a:xfrm>
+          <a:off x="0" y="0"/>
+          <a:ext cx="0" cy="0"/>
+          <a:chOff x="0" y="0"/>
+          <a:chExt cx="0" cy="0"/>
+        </a:xfrm>
+      </p:grpSpPr>
+      <p:sp>
+        <p:nvSpPr>
+          <p:cNvPr id="2" name="Title 1"/>
+          <p:cNvSpPr>
+            <a:spLocks noGrp="1"/>
+          </p:cNvSpPr>
+          <p:nvPr>
+            <p:ph type="title"/>
+          </p:nvPr>
+        </p:nvSpPr>
+        <p:spPr/>
+        <p:txBody>
+          <a:bodyPr/>
+          <a:lstStyle/>
+          <a:p>
+            <a:endParaRPr lang="de-DE"/>
+          </a:p>
+        </p:txBody>
+      </p:sp>
+      <p:sp>
+        <p:nvSpPr>
+          <p:cNvPr id="3" name="Content Placeholder 2"/>
+          <p:cNvSpPr>
+            <a:spLocks noGrp="1"/>
+          </p:cNvSpPr>
+          <p:nvPr>
+            <p:ph idx="1"/>
+          </p:nvPr>
+        </p:nvSpPr>
+        <p:spPr/>
+        <p:txBody>
+          <a:bodyPr/>
+          <a:lstStyle/>
+          <a:p>
+            <a:r>
+              <a:rPr lang="de-DE" dirty="0"/>
+              <a:t>addr2line -e /home/kalantar/dev/crash_investigator/sys/focal/Debug/lib/libcrash_investigator_new_malloc_0020.so -f -C </a:t>
+            </a:r>
+            <a:r>
+              <a:rPr lang="de-DE" dirty="0" smtClean="0"/>
+              <a:t>0x7d75</a:t>
+            </a:r>
+          </a:p>
+          <a:p>
+            <a:r>
+              <a:rPr lang="de-DE" dirty="0" err="1"/>
+              <a:t>nm</a:t>
+            </a:r>
+            <a:r>
+              <a:rPr lang="de-DE" dirty="0"/>
+              <a:t> /home/kalantar/dev/crash_investigator/sys/focal/Debug/lib/libcrash_investigator_new_malloc_0020.so | </a:t>
+            </a:r>
+            <a:r>
+              <a:rPr lang="de-DE" dirty="0" err="1"/>
+              <a:t>grep</a:t>
+            </a:r>
+            <a:r>
+              <a:rPr lang="de-DE"/>
+              <a:t> _ZN18crash_investigator11CMemoryItem4InitEmNS_11FailureTypeEPvPNS_9BacktraceE</a:t>
+            </a:r>
+          </a:p>
+        </p:txBody>
+      </p:sp>
+    </p:spTree>
+    <p:extLst>
+      <p:ext uri="{BB962C8B-B14F-4D97-AF65-F5344CB8AC3E}">
+        <p14:creationId xmlns:p14="http://schemas.microsoft.com/office/powerpoint/2010/main" val="874984380"/>
+      </p:ext>
+    </p:extLst>
+  </p:cSld>
+  <p:clrMapOvr>
+    <a:masterClrMapping/>
+  </p:clrMapOvr>
 </p:sld>
 </file>
 

</xml_diff>